<commit_message>
Diss update, lots of new images, entire chapters that hadn't been uploaded yet.
</commit_message>
<xml_diff>
--- a/Documents/Dissertation/Figures.pptx
+++ b/Documents/Dissertation/Figures.pptx
@@ -5,11 +5,14 @@
     <p:sldMasterId id="2147483648" r:id="rId1"/>
   </p:sldMasterIdLst>
   <p:notesMasterIdLst>
-    <p:notesMasterId r:id="rId4"/>
+    <p:notesMasterId r:id="rId7"/>
   </p:notesMasterIdLst>
   <p:sldIdLst>
-    <p:sldId id="257" r:id="rId2"/>
-    <p:sldId id="256" r:id="rId3"/>
+    <p:sldId id="258" r:id="rId2"/>
+    <p:sldId id="257" r:id="rId3"/>
+    <p:sldId id="256" r:id="rId4"/>
+    <p:sldId id="260" r:id="rId5"/>
+    <p:sldId id="259" r:id="rId6"/>
   </p:sldIdLst>
   <p:sldSz cx="12192000" cy="6858000"/>
   <p:notesSz cx="6858000" cy="9144000"/>
@@ -209,7 +212,7 @@
           <a:p>
             <a:fld id="{B8D782B5-82DF-48ED-92BE-C4676CEDADC3}" type="datetimeFigureOut">
               <a:rPr lang="en-US" smtClean="0"/>
-              <a:t>4/18/2021</a:t>
+              <a:t>5/15/2021</a:t>
             </a:fld>
             <a:endParaRPr lang="en-US"/>
           </a:p>
@@ -520,34 +523,7 @@
           <a:bodyPr/>
           <a:lstStyle/>
           <a:p>
-            <a:r>
-              <a:rPr lang="en-US" dirty="0"/>
-              <a:t>Ideas:</a:t>
-            </a:r>
-          </a:p>
-          <a:p>
-            <a:r>
-              <a:rPr lang="en-US" dirty="0"/>
-              <a:t>Even in open loop trajectories, different paths through the atmosphere result in different state distributions. This is due to the aerodynamic nonlinearities affecting the entry vehicle. </a:t>
-            </a:r>
-          </a:p>
-          <a:p>
             <a:endParaRPr lang="en-US" dirty="0"/>
-          </a:p>
-          <a:p>
-            <a:r>
-              <a:rPr lang="en-US" dirty="0"/>
-              <a:t>In addition to using feedback control to tighten the terminal distribution, a reference trajectory can be found that further reduces the terminal distribution. </a:t>
-            </a:r>
-          </a:p>
-          <a:p>
-            <a:endParaRPr lang="en-US" dirty="0"/>
-          </a:p>
-          <a:p>
-            <a:r>
-              <a:rPr lang="en-US" dirty="0"/>
-              <a:t>Despite a lower mean altitude, a higher 3σ low altitude is achieved by reducing the size of the standard deviation. </a:t>
-            </a:r>
           </a:p>
         </p:txBody>
       </p:sp>
@@ -568,7 +544,118 @@
           <a:p>
             <a:fld id="{3E94B478-290D-4B9A-A63F-4B885CDC012D}" type="slidenum">
               <a:rPr lang="en-US" smtClean="0"/>
-              <a:t>2</a:t>
+              <a:t>1</a:t>
+            </a:fld>
+            <a:endParaRPr lang="en-US"/>
+          </a:p>
+        </p:txBody>
+      </p:sp>
+    </p:spTree>
+    <p:extLst>
+      <p:ext uri="{BB962C8B-B14F-4D97-AF65-F5344CB8AC3E}">
+        <p14:creationId xmlns:p14="http://schemas.microsoft.com/office/powerpoint/2010/main" val="3929659613"/>
+      </p:ext>
+    </p:extLst>
+  </p:cSld>
+  <p:clrMapOvr>
+    <a:masterClrMapping/>
+  </p:clrMapOvr>
+</p:notes>
+</file>
+
+<file path=ppt/notesSlides/notesSlide2.xml><?xml version="1.0" encoding="utf-8"?>
+<p:notes xmlns:a="http://schemas.openxmlformats.org/drawingml/2006/main" xmlns:r="http://schemas.openxmlformats.org/officeDocument/2006/relationships" xmlns:p="http://schemas.openxmlformats.org/presentationml/2006/main">
+  <p:cSld>
+    <p:spTree>
+      <p:nvGrpSpPr>
+        <p:cNvPr id="1" name=""/>
+        <p:cNvGrpSpPr/>
+        <p:nvPr/>
+      </p:nvGrpSpPr>
+      <p:grpSpPr>
+        <a:xfrm>
+          <a:off x="0" y="0"/>
+          <a:ext cx="0" cy="0"/>
+          <a:chOff x="0" y="0"/>
+          <a:chExt cx="0" cy="0"/>
+        </a:xfrm>
+      </p:grpSpPr>
+      <p:sp>
+        <p:nvSpPr>
+          <p:cNvPr id="2" name="Slide Image Placeholder 1"/>
+          <p:cNvSpPr>
+            <a:spLocks noGrp="1" noRot="1" noChangeAspect="1"/>
+          </p:cNvSpPr>
+          <p:nvPr>
+            <p:ph type="sldImg"/>
+          </p:nvPr>
+        </p:nvSpPr>
+        <p:spPr/>
+      </p:sp>
+      <p:sp>
+        <p:nvSpPr>
+          <p:cNvPr id="3" name="Notes Placeholder 2"/>
+          <p:cNvSpPr>
+            <a:spLocks noGrp="1"/>
+          </p:cNvSpPr>
+          <p:nvPr>
+            <p:ph type="body" idx="1"/>
+          </p:nvPr>
+        </p:nvSpPr>
+        <p:spPr/>
+        <p:txBody>
+          <a:bodyPr/>
+          <a:lstStyle/>
+          <a:p>
+            <a:r>
+              <a:rPr lang="en-US" dirty="0"/>
+              <a:t>Ideas:</a:t>
+            </a:r>
+          </a:p>
+          <a:p>
+            <a:r>
+              <a:rPr lang="en-US" dirty="0"/>
+              <a:t>Even in open loop trajectories, different paths through the atmosphere result in different state distributions. This is due to the aerodynamic nonlinearities affecting the entry vehicle. </a:t>
+            </a:r>
+          </a:p>
+          <a:p>
+            <a:endParaRPr lang="en-US" dirty="0"/>
+          </a:p>
+          <a:p>
+            <a:r>
+              <a:rPr lang="en-US" dirty="0"/>
+              <a:t>In addition to using feedback control to tighten the terminal distribution, a reference trajectory can be found that further reduces the terminal distribution. </a:t>
+            </a:r>
+          </a:p>
+          <a:p>
+            <a:endParaRPr lang="en-US" dirty="0"/>
+          </a:p>
+          <a:p>
+            <a:r>
+              <a:rPr lang="en-US" dirty="0"/>
+              <a:t>Despite a lower mean altitude, a higher 3σ low altitude is achieved by reducing the size of the standard deviation. </a:t>
+            </a:r>
+          </a:p>
+        </p:txBody>
+      </p:sp>
+      <p:sp>
+        <p:nvSpPr>
+          <p:cNvPr id="4" name="Slide Number Placeholder 3"/>
+          <p:cNvSpPr>
+            <a:spLocks noGrp="1"/>
+          </p:cNvSpPr>
+          <p:nvPr>
+            <p:ph type="sldNum" sz="quarter" idx="5"/>
+          </p:nvPr>
+        </p:nvSpPr>
+        <p:spPr/>
+        <p:txBody>
+          <a:bodyPr/>
+          <a:lstStyle/>
+          <a:p>
+            <a:fld id="{3E94B478-290D-4B9A-A63F-4B885CDC012D}" type="slidenum">
+              <a:rPr lang="en-US" smtClean="0"/>
+              <a:t>3</a:t>
             </a:fld>
             <a:endParaRPr lang="en-US"/>
           </a:p>
@@ -578,6 +665,210 @@
     <p:extLst>
       <p:ext uri="{BB962C8B-B14F-4D97-AF65-F5344CB8AC3E}">
         <p14:creationId xmlns:p14="http://schemas.microsoft.com/office/powerpoint/2010/main" val="1316855335"/>
+      </p:ext>
+    </p:extLst>
+  </p:cSld>
+  <p:clrMapOvr>
+    <a:masterClrMapping/>
+  </p:clrMapOvr>
+</p:notes>
+</file>
+
+<file path=ppt/notesSlides/notesSlide3.xml><?xml version="1.0" encoding="utf-8"?>
+<p:notes xmlns:a="http://schemas.openxmlformats.org/drawingml/2006/main" xmlns:r="http://schemas.openxmlformats.org/officeDocument/2006/relationships" xmlns:p="http://schemas.openxmlformats.org/presentationml/2006/main">
+  <p:cSld>
+    <p:spTree>
+      <p:nvGrpSpPr>
+        <p:cNvPr id="1" name=""/>
+        <p:cNvGrpSpPr/>
+        <p:nvPr/>
+      </p:nvGrpSpPr>
+      <p:grpSpPr>
+        <a:xfrm>
+          <a:off x="0" y="0"/>
+          <a:ext cx="0" cy="0"/>
+          <a:chOff x="0" y="0"/>
+          <a:chExt cx="0" cy="0"/>
+        </a:xfrm>
+      </p:grpSpPr>
+      <p:sp>
+        <p:nvSpPr>
+          <p:cNvPr id="2" name="Slide Image Placeholder 1"/>
+          <p:cNvSpPr>
+            <a:spLocks noGrp="1" noRot="1" noChangeAspect="1"/>
+          </p:cNvSpPr>
+          <p:nvPr>
+            <p:ph type="sldImg"/>
+          </p:nvPr>
+        </p:nvSpPr>
+        <p:spPr/>
+      </p:sp>
+      <p:sp>
+        <p:nvSpPr>
+          <p:cNvPr id="3" name="Notes Placeholder 2"/>
+          <p:cNvSpPr>
+            <a:spLocks noGrp="1"/>
+          </p:cNvSpPr>
+          <p:nvPr>
+            <p:ph type="body" idx="1"/>
+          </p:nvPr>
+        </p:nvSpPr>
+        <p:spPr/>
+        <p:txBody>
+          <a:bodyPr/>
+          <a:lstStyle/>
+          <a:p>
+            <a:r>
+              <a:rPr lang="en-US" dirty="0"/>
+              <a:t>Ideas:</a:t>
+            </a:r>
+          </a:p>
+          <a:p>
+            <a:r>
+              <a:rPr lang="en-US" dirty="0"/>
+              <a:t>Even in open loop trajectories, different paths through the atmosphere result in different state distributions. This is due to the aerodynamic nonlinearities affecting the entry vehicle. </a:t>
+            </a:r>
+          </a:p>
+          <a:p>
+            <a:endParaRPr lang="en-US" dirty="0"/>
+          </a:p>
+          <a:p>
+            <a:r>
+              <a:rPr lang="en-US" dirty="0"/>
+              <a:t>In addition to using feedback control to tighten the terminal distribution, a reference trajectory can be found that further reduces the terminal distribution. </a:t>
+            </a:r>
+          </a:p>
+          <a:p>
+            <a:endParaRPr lang="en-US" dirty="0"/>
+          </a:p>
+          <a:p>
+            <a:r>
+              <a:rPr lang="en-US" dirty="0"/>
+              <a:t>Despite a lower mean altitude, a higher 3σ low altitude is achieved by reducing the size of the standard deviation. </a:t>
+            </a:r>
+          </a:p>
+        </p:txBody>
+      </p:sp>
+      <p:sp>
+        <p:nvSpPr>
+          <p:cNvPr id="4" name="Slide Number Placeholder 3"/>
+          <p:cNvSpPr>
+            <a:spLocks noGrp="1"/>
+          </p:cNvSpPr>
+          <p:nvPr>
+            <p:ph type="sldNum" sz="quarter" idx="5"/>
+          </p:nvPr>
+        </p:nvSpPr>
+        <p:spPr/>
+        <p:txBody>
+          <a:bodyPr/>
+          <a:lstStyle/>
+          <a:p>
+            <a:fld id="{3E94B478-290D-4B9A-A63F-4B885CDC012D}" type="slidenum">
+              <a:rPr lang="en-US" smtClean="0"/>
+              <a:t>4</a:t>
+            </a:fld>
+            <a:endParaRPr lang="en-US"/>
+          </a:p>
+        </p:txBody>
+      </p:sp>
+    </p:spTree>
+    <p:extLst>
+      <p:ext uri="{BB962C8B-B14F-4D97-AF65-F5344CB8AC3E}">
+        <p14:creationId xmlns:p14="http://schemas.microsoft.com/office/powerpoint/2010/main" val="1650177046"/>
+      </p:ext>
+    </p:extLst>
+  </p:cSld>
+  <p:clrMapOvr>
+    <a:masterClrMapping/>
+  </p:clrMapOvr>
+</p:notes>
+</file>
+
+<file path=ppt/notesSlides/notesSlide4.xml><?xml version="1.0" encoding="utf-8"?>
+<p:notes xmlns:a="http://schemas.openxmlformats.org/drawingml/2006/main" xmlns:r="http://schemas.openxmlformats.org/officeDocument/2006/relationships" xmlns:p="http://schemas.openxmlformats.org/presentationml/2006/main">
+  <p:cSld>
+    <p:spTree>
+      <p:nvGrpSpPr>
+        <p:cNvPr id="1" name=""/>
+        <p:cNvGrpSpPr/>
+        <p:nvPr/>
+      </p:nvGrpSpPr>
+      <p:grpSpPr>
+        <a:xfrm>
+          <a:off x="0" y="0"/>
+          <a:ext cx="0" cy="0"/>
+          <a:chOff x="0" y="0"/>
+          <a:chExt cx="0" cy="0"/>
+        </a:xfrm>
+      </p:grpSpPr>
+      <p:sp>
+        <p:nvSpPr>
+          <p:cNvPr id="2" name="Slide Image Placeholder 1"/>
+          <p:cNvSpPr>
+            <a:spLocks noGrp="1" noRot="1" noChangeAspect="1"/>
+          </p:cNvSpPr>
+          <p:nvPr>
+            <p:ph type="sldImg"/>
+          </p:nvPr>
+        </p:nvSpPr>
+        <p:spPr/>
+      </p:sp>
+      <p:sp>
+        <p:nvSpPr>
+          <p:cNvPr id="3" name="Notes Placeholder 2"/>
+          <p:cNvSpPr>
+            <a:spLocks noGrp="1"/>
+          </p:cNvSpPr>
+          <p:nvPr>
+            <p:ph type="body" idx="1"/>
+          </p:nvPr>
+        </p:nvSpPr>
+        <p:spPr/>
+        <p:txBody>
+          <a:bodyPr/>
+          <a:lstStyle/>
+          <a:p>
+            <a:r>
+              <a:rPr lang="en-US" dirty="0"/>
+              <a:t>Open and Closed-Loop Results</a:t>
+            </a:r>
+          </a:p>
+          <a:p>
+            <a:r>
+              <a:rPr lang="en-US" dirty="0"/>
+              <a:t>N = 5000 </a:t>
+            </a:r>
+          </a:p>
+        </p:txBody>
+      </p:sp>
+      <p:sp>
+        <p:nvSpPr>
+          <p:cNvPr id="4" name="Slide Number Placeholder 3"/>
+          <p:cNvSpPr>
+            <a:spLocks noGrp="1"/>
+          </p:cNvSpPr>
+          <p:nvPr>
+            <p:ph type="sldNum" sz="quarter" idx="5"/>
+          </p:nvPr>
+        </p:nvSpPr>
+        <p:spPr/>
+        <p:txBody>
+          <a:bodyPr/>
+          <a:lstStyle/>
+          <a:p>
+            <a:fld id="{3E94B478-290D-4B9A-A63F-4B885CDC012D}" type="slidenum">
+              <a:rPr lang="en-US" smtClean="0"/>
+              <a:t>5</a:t>
+            </a:fld>
+            <a:endParaRPr lang="en-US"/>
+          </a:p>
+        </p:txBody>
+      </p:sp>
+    </p:spTree>
+    <p:extLst>
+      <p:ext uri="{BB962C8B-B14F-4D97-AF65-F5344CB8AC3E}">
+        <p14:creationId xmlns:p14="http://schemas.microsoft.com/office/powerpoint/2010/main" val="3061108355"/>
       </p:ext>
     </p:extLst>
   </p:cSld>
@@ -734,7 +1025,7 @@
           <a:p>
             <a:fld id="{C3BD6E91-CB9B-46DE-9DB7-C686754E38A3}" type="datetimeFigureOut">
               <a:rPr lang="en-US" smtClean="0"/>
-              <a:t>4/18/2021</a:t>
+              <a:t>5/15/2021</a:t>
             </a:fld>
             <a:endParaRPr lang="en-US"/>
           </a:p>
@@ -932,7 +1223,7 @@
           <a:p>
             <a:fld id="{C3BD6E91-CB9B-46DE-9DB7-C686754E38A3}" type="datetimeFigureOut">
               <a:rPr lang="en-US" smtClean="0"/>
-              <a:t>4/18/2021</a:t>
+              <a:t>5/15/2021</a:t>
             </a:fld>
             <a:endParaRPr lang="en-US"/>
           </a:p>
@@ -1140,7 +1431,7 @@
           <a:p>
             <a:fld id="{C3BD6E91-CB9B-46DE-9DB7-C686754E38A3}" type="datetimeFigureOut">
               <a:rPr lang="en-US" smtClean="0"/>
-              <a:t>4/18/2021</a:t>
+              <a:t>5/15/2021</a:t>
             </a:fld>
             <a:endParaRPr lang="en-US"/>
           </a:p>
@@ -1338,7 +1629,7 @@
           <a:p>
             <a:fld id="{C3BD6E91-CB9B-46DE-9DB7-C686754E38A3}" type="datetimeFigureOut">
               <a:rPr lang="en-US" smtClean="0"/>
-              <a:t>4/18/2021</a:t>
+              <a:t>5/15/2021</a:t>
             </a:fld>
             <a:endParaRPr lang="en-US"/>
           </a:p>
@@ -1613,7 +1904,7 @@
           <a:p>
             <a:fld id="{C3BD6E91-CB9B-46DE-9DB7-C686754E38A3}" type="datetimeFigureOut">
               <a:rPr lang="en-US" smtClean="0"/>
-              <a:t>4/18/2021</a:t>
+              <a:t>5/15/2021</a:t>
             </a:fld>
             <a:endParaRPr lang="en-US"/>
           </a:p>
@@ -1878,7 +2169,7 @@
           <a:p>
             <a:fld id="{C3BD6E91-CB9B-46DE-9DB7-C686754E38A3}" type="datetimeFigureOut">
               <a:rPr lang="en-US" smtClean="0"/>
-              <a:t>4/18/2021</a:t>
+              <a:t>5/15/2021</a:t>
             </a:fld>
             <a:endParaRPr lang="en-US"/>
           </a:p>
@@ -2290,7 +2581,7 @@
           <a:p>
             <a:fld id="{C3BD6E91-CB9B-46DE-9DB7-C686754E38A3}" type="datetimeFigureOut">
               <a:rPr lang="en-US" smtClean="0"/>
-              <a:t>4/18/2021</a:t>
+              <a:t>5/15/2021</a:t>
             </a:fld>
             <a:endParaRPr lang="en-US"/>
           </a:p>
@@ -2431,7 +2722,7 @@
           <a:p>
             <a:fld id="{C3BD6E91-CB9B-46DE-9DB7-C686754E38A3}" type="datetimeFigureOut">
               <a:rPr lang="en-US" smtClean="0"/>
-              <a:t>4/18/2021</a:t>
+              <a:t>5/15/2021</a:t>
             </a:fld>
             <a:endParaRPr lang="en-US"/>
           </a:p>
@@ -2544,7 +2835,7 @@
           <a:p>
             <a:fld id="{C3BD6E91-CB9B-46DE-9DB7-C686754E38A3}" type="datetimeFigureOut">
               <a:rPr lang="en-US" smtClean="0"/>
-              <a:t>4/18/2021</a:t>
+              <a:t>5/15/2021</a:t>
             </a:fld>
             <a:endParaRPr lang="en-US"/>
           </a:p>
@@ -2855,7 +3146,7 @@
           <a:p>
             <a:fld id="{C3BD6E91-CB9B-46DE-9DB7-C686754E38A3}" type="datetimeFigureOut">
               <a:rPr lang="en-US" smtClean="0"/>
-              <a:t>4/18/2021</a:t>
+              <a:t>5/15/2021</a:t>
             </a:fld>
             <a:endParaRPr lang="en-US"/>
           </a:p>
@@ -3143,7 +3434,7 @@
           <a:p>
             <a:fld id="{C3BD6E91-CB9B-46DE-9DB7-C686754E38A3}" type="datetimeFigureOut">
               <a:rPr lang="en-US" smtClean="0"/>
-              <a:t>4/18/2021</a:t>
+              <a:t>5/15/2021</a:t>
             </a:fld>
             <a:endParaRPr lang="en-US"/>
           </a:p>
@@ -3384,7 +3675,7 @@
           <a:p>
             <a:fld id="{C3BD6E91-CB9B-46DE-9DB7-C686754E38A3}" type="datetimeFigureOut">
               <a:rPr lang="en-US" smtClean="0"/>
-              <a:t>4/18/2021</a:t>
+              <a:t>5/15/2021</a:t>
             </a:fld>
             <a:endParaRPr lang="en-US"/>
           </a:p>
@@ -3803,6 +4094,791 @@
       </p:grpSpPr>
       <p:grpSp>
         <p:nvGrpSpPr>
+          <p:cNvPr id="19" name="Group 18">
+            <a:extLst>
+              <a:ext uri="{FF2B5EF4-FFF2-40B4-BE49-F238E27FC236}">
+                <a16:creationId xmlns:a16="http://schemas.microsoft.com/office/drawing/2014/main" id="{CDAC0C9A-D2F6-4B13-B41C-C8A5462750E0}"/>
+              </a:ext>
+            </a:extLst>
+          </p:cNvPr>
+          <p:cNvGrpSpPr/>
+          <p:nvPr/>
+        </p:nvGrpSpPr>
+        <p:grpSpPr>
+          <a:xfrm>
+            <a:off x="-3306" y="-209550"/>
+            <a:ext cx="12175850" cy="6858000"/>
+            <a:chOff x="-3306" y="0"/>
+            <a:chExt cx="12175850" cy="6858000"/>
+          </a:xfrm>
+        </p:grpSpPr>
+        <p:sp>
+          <p:nvSpPr>
+            <p:cNvPr id="14" name="Rectangle 13">
+              <a:extLst>
+                <a:ext uri="{FF2B5EF4-FFF2-40B4-BE49-F238E27FC236}">
+                  <a16:creationId xmlns:a16="http://schemas.microsoft.com/office/drawing/2014/main" id="{A2584670-1767-4A16-80B5-C49984D69591}"/>
+                </a:ext>
+              </a:extLst>
+            </p:cNvPr>
+            <p:cNvSpPr/>
+            <p:nvPr/>
+          </p:nvSpPr>
+          <p:spPr>
+            <a:xfrm>
+              <a:off x="8929991" y="0"/>
+              <a:ext cx="3242553" cy="6858000"/>
+            </a:xfrm>
+            <a:prstGeom prst="rect">
+              <a:avLst/>
+            </a:prstGeom>
+            <a:solidFill>
+              <a:srgbClr val="002060">
+                <a:alpha val="40000"/>
+              </a:srgbClr>
+            </a:solidFill>
+          </p:spPr>
+          <p:style>
+            <a:lnRef idx="2">
+              <a:schemeClr val="accent1">
+                <a:shade val="50000"/>
+              </a:schemeClr>
+            </a:lnRef>
+            <a:fillRef idx="1">
+              <a:schemeClr val="accent1"/>
+            </a:fillRef>
+            <a:effectRef idx="0">
+              <a:schemeClr val="accent1"/>
+            </a:effectRef>
+            <a:fontRef idx="minor">
+              <a:schemeClr val="lt1"/>
+            </a:fontRef>
+          </p:style>
+          <p:txBody>
+            <a:bodyPr rtlCol="0" anchor="ctr"/>
+            <a:lstStyle/>
+            <a:p>
+              <a:pPr algn="ctr"/>
+              <a:endParaRPr lang="en-US"/>
+            </a:p>
+          </p:txBody>
+        </p:sp>
+        <p:sp>
+          <p:nvSpPr>
+            <p:cNvPr id="13" name="Rectangle 12">
+              <a:extLst>
+                <a:ext uri="{FF2B5EF4-FFF2-40B4-BE49-F238E27FC236}">
+                  <a16:creationId xmlns:a16="http://schemas.microsoft.com/office/drawing/2014/main" id="{7AD5B5D8-5106-4F59-8417-20F6044A3999}"/>
+                </a:ext>
+              </a:extLst>
+            </p:cNvPr>
+            <p:cNvSpPr/>
+            <p:nvPr/>
+          </p:nvSpPr>
+          <p:spPr>
+            <a:xfrm>
+              <a:off x="5888297" y="0"/>
+              <a:ext cx="3012847" cy="6858000"/>
+            </a:xfrm>
+            <a:prstGeom prst="rect">
+              <a:avLst/>
+            </a:prstGeom>
+            <a:solidFill>
+              <a:srgbClr val="00B0F0">
+                <a:alpha val="40000"/>
+              </a:srgbClr>
+            </a:solidFill>
+          </p:spPr>
+          <p:style>
+            <a:lnRef idx="2">
+              <a:schemeClr val="accent1">
+                <a:shade val="50000"/>
+              </a:schemeClr>
+            </a:lnRef>
+            <a:fillRef idx="1">
+              <a:schemeClr val="accent1"/>
+            </a:fillRef>
+            <a:effectRef idx="0">
+              <a:schemeClr val="accent1"/>
+            </a:effectRef>
+            <a:fontRef idx="minor">
+              <a:schemeClr val="lt1"/>
+            </a:fontRef>
+          </p:style>
+          <p:txBody>
+            <a:bodyPr rtlCol="0" anchor="ctr"/>
+            <a:lstStyle/>
+            <a:p>
+              <a:pPr algn="ctr"/>
+              <a:endParaRPr lang="en-US"/>
+            </a:p>
+          </p:txBody>
+        </p:sp>
+        <p:sp>
+          <p:nvSpPr>
+            <p:cNvPr id="12" name="Rectangle 11">
+              <a:extLst>
+                <a:ext uri="{FF2B5EF4-FFF2-40B4-BE49-F238E27FC236}">
+                  <a16:creationId xmlns:a16="http://schemas.microsoft.com/office/drawing/2014/main" id="{446DAC06-4549-4071-B229-337D719B71FF}"/>
+                </a:ext>
+              </a:extLst>
+            </p:cNvPr>
+            <p:cNvSpPr/>
+            <p:nvPr/>
+          </p:nvSpPr>
+          <p:spPr>
+            <a:xfrm>
+              <a:off x="2880413" y="0"/>
+              <a:ext cx="3000828" cy="6858000"/>
+            </a:xfrm>
+            <a:prstGeom prst="rect">
+              <a:avLst/>
+            </a:prstGeom>
+            <a:solidFill>
+              <a:srgbClr val="FFC000">
+                <a:alpha val="40000"/>
+              </a:srgbClr>
+            </a:solidFill>
+          </p:spPr>
+          <p:style>
+            <a:lnRef idx="2">
+              <a:schemeClr val="accent1">
+                <a:shade val="50000"/>
+              </a:schemeClr>
+            </a:lnRef>
+            <a:fillRef idx="1">
+              <a:schemeClr val="accent1"/>
+            </a:fillRef>
+            <a:effectRef idx="0">
+              <a:schemeClr val="accent1"/>
+            </a:effectRef>
+            <a:fontRef idx="minor">
+              <a:schemeClr val="lt1"/>
+            </a:fontRef>
+          </p:style>
+          <p:txBody>
+            <a:bodyPr rtlCol="0" anchor="ctr"/>
+            <a:lstStyle/>
+            <a:p>
+              <a:pPr algn="ctr"/>
+              <a:endParaRPr lang="en-US"/>
+            </a:p>
+          </p:txBody>
+        </p:sp>
+        <p:sp>
+          <p:nvSpPr>
+            <p:cNvPr id="11" name="Rectangle 10">
+              <a:extLst>
+                <a:ext uri="{FF2B5EF4-FFF2-40B4-BE49-F238E27FC236}">
+                  <a16:creationId xmlns:a16="http://schemas.microsoft.com/office/drawing/2014/main" id="{FD09FE59-1A50-462C-950A-BFB132B68F00}"/>
+                </a:ext>
+              </a:extLst>
+            </p:cNvPr>
+            <p:cNvSpPr/>
+            <p:nvPr/>
+          </p:nvSpPr>
+          <p:spPr>
+            <a:xfrm>
+              <a:off x="-3306" y="0"/>
+              <a:ext cx="2856754" cy="6858000"/>
+            </a:xfrm>
+            <a:prstGeom prst="rect">
+              <a:avLst/>
+            </a:prstGeom>
+            <a:solidFill>
+              <a:srgbClr val="FF0000">
+                <a:alpha val="40000"/>
+              </a:srgbClr>
+            </a:solidFill>
+          </p:spPr>
+          <p:style>
+            <a:lnRef idx="2">
+              <a:schemeClr val="accent1">
+                <a:shade val="50000"/>
+              </a:schemeClr>
+            </a:lnRef>
+            <a:fillRef idx="1">
+              <a:schemeClr val="accent1"/>
+            </a:fillRef>
+            <a:effectRef idx="0">
+              <a:schemeClr val="accent1"/>
+            </a:effectRef>
+            <a:fontRef idx="minor">
+              <a:schemeClr val="lt1"/>
+            </a:fontRef>
+          </p:style>
+          <p:txBody>
+            <a:bodyPr rtlCol="0" anchor="ctr"/>
+            <a:lstStyle/>
+            <a:p>
+              <a:pPr algn="ctr"/>
+              <a:endParaRPr lang="en-US" dirty="0"/>
+            </a:p>
+          </p:txBody>
+        </p:sp>
+        <p:sp>
+          <p:nvSpPr>
+            <p:cNvPr id="15" name="TextBox 14">
+              <a:extLst>
+                <a:ext uri="{FF2B5EF4-FFF2-40B4-BE49-F238E27FC236}">
+                  <a16:creationId xmlns:a16="http://schemas.microsoft.com/office/drawing/2014/main" id="{6AF20C2E-9D5B-4EEF-A299-C2E43FB7B026}"/>
+                </a:ext>
+              </a:extLst>
+            </p:cNvPr>
+            <p:cNvSpPr txBox="1"/>
+            <p:nvPr/>
+          </p:nvSpPr>
+          <p:spPr>
+            <a:xfrm>
+              <a:off x="328741" y="117131"/>
+              <a:ext cx="2336730" cy="369332"/>
+            </a:xfrm>
+            <a:prstGeom prst="rect">
+              <a:avLst/>
+            </a:prstGeom>
+            <a:noFill/>
+          </p:spPr>
+          <p:txBody>
+            <a:bodyPr wrap="none" rtlCol="0">
+              <a:spAutoFit/>
+            </a:bodyPr>
+            <a:lstStyle/>
+            <a:p>
+              <a:r>
+                <a:rPr lang="en-US" dirty="0"/>
+                <a:t>Little to No Work Done</a:t>
+              </a:r>
+            </a:p>
+          </p:txBody>
+        </p:sp>
+        <p:sp>
+          <p:nvSpPr>
+            <p:cNvPr id="16" name="TextBox 15">
+              <a:extLst>
+                <a:ext uri="{FF2B5EF4-FFF2-40B4-BE49-F238E27FC236}">
+                  <a16:creationId xmlns:a16="http://schemas.microsoft.com/office/drawing/2014/main" id="{EA99F817-7753-4226-83A2-E9EC6C6C18BD}"/>
+                </a:ext>
+              </a:extLst>
+            </p:cNvPr>
+            <p:cNvSpPr txBox="1"/>
+            <p:nvPr/>
+          </p:nvSpPr>
+          <p:spPr>
+            <a:xfrm>
+              <a:off x="3798345" y="117131"/>
+              <a:ext cx="1215076" cy="369332"/>
+            </a:xfrm>
+            <a:prstGeom prst="rect">
+              <a:avLst/>
+            </a:prstGeom>
+            <a:noFill/>
+          </p:spPr>
+          <p:txBody>
+            <a:bodyPr wrap="none" rtlCol="0">
+              <a:spAutoFit/>
+            </a:bodyPr>
+            <a:lstStyle/>
+            <a:p>
+              <a:r>
+                <a:rPr lang="en-US" dirty="0"/>
+                <a:t>In Progress</a:t>
+              </a:r>
+            </a:p>
+          </p:txBody>
+        </p:sp>
+        <p:sp>
+          <p:nvSpPr>
+            <p:cNvPr id="17" name="TextBox 16">
+              <a:extLst>
+                <a:ext uri="{FF2B5EF4-FFF2-40B4-BE49-F238E27FC236}">
+                  <a16:creationId xmlns:a16="http://schemas.microsoft.com/office/drawing/2014/main" id="{5DB1DDEF-723A-4BF2-8095-4E7FC45F8322}"/>
+                </a:ext>
+              </a:extLst>
+            </p:cNvPr>
+            <p:cNvSpPr txBox="1"/>
+            <p:nvPr/>
+          </p:nvSpPr>
+          <p:spPr>
+            <a:xfrm>
+              <a:off x="6714428" y="110794"/>
+              <a:ext cx="1826462" cy="646331"/>
+            </a:xfrm>
+            <a:prstGeom prst="rect">
+              <a:avLst/>
+            </a:prstGeom>
+            <a:noFill/>
+          </p:spPr>
+          <p:txBody>
+            <a:bodyPr wrap="none" rtlCol="0">
+              <a:spAutoFit/>
+            </a:bodyPr>
+            <a:lstStyle/>
+            <a:p>
+              <a:r>
+                <a:rPr lang="en-US" dirty="0"/>
+                <a:t>Nearly Done, </a:t>
+              </a:r>
+            </a:p>
+            <a:p>
+              <a:r>
+                <a:rPr lang="en-US" dirty="0"/>
+                <a:t>Finishing Touches</a:t>
+              </a:r>
+            </a:p>
+          </p:txBody>
+        </p:sp>
+        <p:sp>
+          <p:nvSpPr>
+            <p:cNvPr id="18" name="TextBox 17">
+              <a:extLst>
+                <a:ext uri="{FF2B5EF4-FFF2-40B4-BE49-F238E27FC236}">
+                  <a16:creationId xmlns:a16="http://schemas.microsoft.com/office/drawing/2014/main" id="{F4D85B1A-A46E-47A8-B472-A2156256C06F}"/>
+                </a:ext>
+              </a:extLst>
+            </p:cNvPr>
+            <p:cNvSpPr txBox="1"/>
+            <p:nvPr/>
+          </p:nvSpPr>
+          <p:spPr>
+            <a:xfrm>
+              <a:off x="9984918" y="113763"/>
+              <a:ext cx="1339469" cy="646331"/>
+            </a:xfrm>
+            <a:prstGeom prst="rect">
+              <a:avLst/>
+            </a:prstGeom>
+            <a:noFill/>
+          </p:spPr>
+          <p:txBody>
+            <a:bodyPr wrap="none" rtlCol="0">
+              <a:spAutoFit/>
+            </a:bodyPr>
+            <a:lstStyle/>
+            <a:p>
+              <a:r>
+                <a:rPr lang="en-US" dirty="0"/>
+                <a:t>Complete</a:t>
+              </a:r>
+            </a:p>
+            <a:p>
+              <a:r>
+                <a:rPr lang="en-US" dirty="0"/>
+                <a:t>(Tentatively)</a:t>
+              </a:r>
+            </a:p>
+          </p:txBody>
+        </p:sp>
+      </p:grpSp>
+      <p:sp>
+        <p:nvSpPr>
+          <p:cNvPr id="2" name="TextBox 1">
+            <a:extLst>
+              <a:ext uri="{FF2B5EF4-FFF2-40B4-BE49-F238E27FC236}">
+                <a16:creationId xmlns:a16="http://schemas.microsoft.com/office/drawing/2014/main" id="{3EA5EFB2-8693-4730-8432-C8260C051ECC}"/>
+              </a:ext>
+            </a:extLst>
+          </p:cNvPr>
+          <p:cNvSpPr txBox="1"/>
+          <p:nvPr/>
+        </p:nvSpPr>
+        <p:spPr>
+          <a:xfrm>
+            <a:off x="3331229" y="1771660"/>
+            <a:ext cx="1730217" cy="369332"/>
+          </a:xfrm>
+          <a:prstGeom prst="rect">
+            <a:avLst/>
+          </a:prstGeom>
+          <a:noFill/>
+          <a:ln>
+            <a:solidFill>
+              <a:schemeClr val="tx1"/>
+            </a:solidFill>
+          </a:ln>
+        </p:spPr>
+        <p:txBody>
+          <a:bodyPr wrap="none" rtlCol="0">
+            <a:spAutoFit/>
+          </a:bodyPr>
+          <a:lstStyle/>
+          <a:p>
+            <a:r>
+              <a:rPr lang="en-US" dirty="0"/>
+              <a:t>Chapter 1 - Intro</a:t>
+            </a:r>
+          </a:p>
+        </p:txBody>
+      </p:sp>
+      <p:sp>
+        <p:nvSpPr>
+          <p:cNvPr id="3" name="TextBox 2">
+            <a:extLst>
+              <a:ext uri="{FF2B5EF4-FFF2-40B4-BE49-F238E27FC236}">
+                <a16:creationId xmlns:a16="http://schemas.microsoft.com/office/drawing/2014/main" id="{975EFDB7-C36E-410A-BB80-E2F67F809DA8}"/>
+              </a:ext>
+            </a:extLst>
+          </p:cNvPr>
+          <p:cNvSpPr txBox="1"/>
+          <p:nvPr/>
+        </p:nvSpPr>
+        <p:spPr>
+          <a:xfrm>
+            <a:off x="6303876" y="2272556"/>
+            <a:ext cx="2181687" cy="369332"/>
+          </a:xfrm>
+          <a:prstGeom prst="rect">
+            <a:avLst/>
+          </a:prstGeom>
+          <a:noFill/>
+          <a:ln>
+            <a:solidFill>
+              <a:schemeClr val="tx1"/>
+            </a:solidFill>
+          </a:ln>
+        </p:spPr>
+        <p:txBody>
+          <a:bodyPr wrap="none" rtlCol="0">
+            <a:spAutoFit/>
+          </a:bodyPr>
+          <a:lstStyle/>
+          <a:p>
+            <a:r>
+              <a:rPr lang="en-US" dirty="0"/>
+              <a:t>Chapter 2 - Dynamics</a:t>
+            </a:r>
+          </a:p>
+        </p:txBody>
+      </p:sp>
+      <p:sp>
+        <p:nvSpPr>
+          <p:cNvPr id="4" name="TextBox 3">
+            <a:extLst>
+              <a:ext uri="{FF2B5EF4-FFF2-40B4-BE49-F238E27FC236}">
+                <a16:creationId xmlns:a16="http://schemas.microsoft.com/office/drawing/2014/main" id="{90A4A6F0-9C13-42C8-A659-F7FF5FE901D9}"/>
+              </a:ext>
+            </a:extLst>
+          </p:cNvPr>
+          <p:cNvSpPr txBox="1"/>
+          <p:nvPr/>
+        </p:nvSpPr>
+        <p:spPr>
+          <a:xfrm>
+            <a:off x="170622" y="2928358"/>
+            <a:ext cx="2508895" cy="646331"/>
+          </a:xfrm>
+          <a:prstGeom prst="rect">
+            <a:avLst/>
+          </a:prstGeom>
+          <a:noFill/>
+          <a:ln>
+            <a:solidFill>
+              <a:schemeClr val="tx1"/>
+            </a:solidFill>
+          </a:ln>
+        </p:spPr>
+        <p:txBody>
+          <a:bodyPr wrap="square" rtlCol="0">
+            <a:spAutoFit/>
+          </a:bodyPr>
+          <a:lstStyle/>
+          <a:p>
+            <a:r>
+              <a:rPr lang="en-US" dirty="0"/>
+              <a:t>Chapter 3 – Problem Statement??</a:t>
+            </a:r>
+          </a:p>
+        </p:txBody>
+      </p:sp>
+      <p:sp>
+        <p:nvSpPr>
+          <p:cNvPr id="5" name="TextBox 4">
+            <a:extLst>
+              <a:ext uri="{FF2B5EF4-FFF2-40B4-BE49-F238E27FC236}">
+                <a16:creationId xmlns:a16="http://schemas.microsoft.com/office/drawing/2014/main" id="{9617628B-6AA4-403C-AF7E-99442E816A0C}"/>
+              </a:ext>
+            </a:extLst>
+          </p:cNvPr>
+          <p:cNvSpPr txBox="1"/>
+          <p:nvPr/>
+        </p:nvSpPr>
+        <p:spPr>
+          <a:xfrm>
+            <a:off x="3067824" y="805896"/>
+            <a:ext cx="2257028" cy="646331"/>
+          </a:xfrm>
+          <a:prstGeom prst="rect">
+            <a:avLst/>
+          </a:prstGeom>
+          <a:noFill/>
+          <a:ln>
+            <a:solidFill>
+              <a:schemeClr val="tx1"/>
+            </a:solidFill>
+          </a:ln>
+        </p:spPr>
+        <p:txBody>
+          <a:bodyPr wrap="none" rtlCol="0">
+            <a:spAutoFit/>
+          </a:bodyPr>
+          <a:lstStyle/>
+          <a:p>
+            <a:r>
+              <a:rPr lang="en-US" dirty="0"/>
+              <a:t>Chapter 0 – </a:t>
+            </a:r>
+          </a:p>
+          <a:p>
+            <a:r>
+              <a:rPr lang="en-US" dirty="0"/>
+              <a:t>Front Matter, Abstract</a:t>
+            </a:r>
+          </a:p>
+        </p:txBody>
+      </p:sp>
+      <p:sp>
+        <p:nvSpPr>
+          <p:cNvPr id="6" name="TextBox 5">
+            <a:extLst>
+              <a:ext uri="{FF2B5EF4-FFF2-40B4-BE49-F238E27FC236}">
+                <a16:creationId xmlns:a16="http://schemas.microsoft.com/office/drawing/2014/main" id="{52C6614F-CD01-42B0-9AC2-D3A4FE8785D3}"/>
+              </a:ext>
+            </a:extLst>
+          </p:cNvPr>
+          <p:cNvSpPr txBox="1"/>
+          <p:nvPr/>
+        </p:nvSpPr>
+        <p:spPr>
+          <a:xfrm>
+            <a:off x="6303876" y="3678081"/>
+            <a:ext cx="2257028" cy="646331"/>
+          </a:xfrm>
+          <a:prstGeom prst="rect">
+            <a:avLst/>
+          </a:prstGeom>
+          <a:noFill/>
+          <a:ln>
+            <a:solidFill>
+              <a:schemeClr val="tx1"/>
+            </a:solidFill>
+          </a:ln>
+        </p:spPr>
+        <p:txBody>
+          <a:bodyPr wrap="square" rtlCol="0">
+            <a:spAutoFit/>
+          </a:bodyPr>
+          <a:lstStyle/>
+          <a:p>
+            <a:r>
+              <a:rPr lang="en-US" dirty="0"/>
+              <a:t>Chapter 4 – Guidance Strategy</a:t>
+            </a:r>
+          </a:p>
+        </p:txBody>
+      </p:sp>
+      <p:sp>
+        <p:nvSpPr>
+          <p:cNvPr id="7" name="TextBox 6">
+            <a:extLst>
+              <a:ext uri="{FF2B5EF4-FFF2-40B4-BE49-F238E27FC236}">
+                <a16:creationId xmlns:a16="http://schemas.microsoft.com/office/drawing/2014/main" id="{29AB6F83-6C19-4AD0-98C8-CF554F4012D6}"/>
+              </a:ext>
+            </a:extLst>
+          </p:cNvPr>
+          <p:cNvSpPr txBox="1"/>
+          <p:nvPr/>
+        </p:nvSpPr>
+        <p:spPr>
+          <a:xfrm>
+            <a:off x="216054" y="5036826"/>
+            <a:ext cx="2346604" cy="646331"/>
+          </a:xfrm>
+          <a:prstGeom prst="rect">
+            <a:avLst/>
+          </a:prstGeom>
+          <a:noFill/>
+          <a:ln>
+            <a:solidFill>
+              <a:schemeClr val="tx1"/>
+            </a:solidFill>
+          </a:ln>
+        </p:spPr>
+        <p:txBody>
+          <a:bodyPr wrap="none" rtlCol="0">
+            <a:spAutoFit/>
+          </a:bodyPr>
+          <a:lstStyle/>
+          <a:p>
+            <a:r>
+              <a:rPr lang="en-US" dirty="0"/>
+              <a:t>Chapter 6 – </a:t>
+            </a:r>
+          </a:p>
+          <a:p>
+            <a:r>
+              <a:rPr lang="en-US" dirty="0"/>
+              <a:t>Assessment Conditions</a:t>
+            </a:r>
+          </a:p>
+        </p:txBody>
+      </p:sp>
+      <p:sp>
+        <p:nvSpPr>
+          <p:cNvPr id="8" name="TextBox 7">
+            <a:extLst>
+              <a:ext uri="{FF2B5EF4-FFF2-40B4-BE49-F238E27FC236}">
+                <a16:creationId xmlns:a16="http://schemas.microsoft.com/office/drawing/2014/main" id="{530BFE47-CB7D-4662-A3DE-05C77B558530}"/>
+              </a:ext>
+            </a:extLst>
+          </p:cNvPr>
+          <p:cNvSpPr txBox="1"/>
+          <p:nvPr/>
+        </p:nvSpPr>
+        <p:spPr>
+          <a:xfrm>
+            <a:off x="5875072" y="4435206"/>
+            <a:ext cx="3039294" cy="369332"/>
+          </a:xfrm>
+          <a:prstGeom prst="rect">
+            <a:avLst/>
+          </a:prstGeom>
+          <a:noFill/>
+          <a:ln>
+            <a:solidFill>
+              <a:schemeClr val="tx1"/>
+            </a:solidFill>
+          </a:ln>
+        </p:spPr>
+        <p:txBody>
+          <a:bodyPr wrap="none" rtlCol="0">
+            <a:spAutoFit/>
+          </a:bodyPr>
+          <a:lstStyle/>
+          <a:p>
+            <a:r>
+              <a:rPr lang="en-US" dirty="0"/>
+              <a:t>Chapter 5 – Guidance Solution</a:t>
+            </a:r>
+          </a:p>
+        </p:txBody>
+      </p:sp>
+      <p:sp>
+        <p:nvSpPr>
+          <p:cNvPr id="9" name="TextBox 8">
+            <a:extLst>
+              <a:ext uri="{FF2B5EF4-FFF2-40B4-BE49-F238E27FC236}">
+                <a16:creationId xmlns:a16="http://schemas.microsoft.com/office/drawing/2014/main" id="{D3CE65D1-D33E-4D1F-BE4C-F8A348C8A6CA}"/>
+              </a:ext>
+            </a:extLst>
+          </p:cNvPr>
+          <p:cNvSpPr txBox="1"/>
+          <p:nvPr/>
+        </p:nvSpPr>
+        <p:spPr>
+          <a:xfrm>
+            <a:off x="229840" y="6373230"/>
+            <a:ext cx="1263487" cy="369332"/>
+          </a:xfrm>
+          <a:prstGeom prst="rect">
+            <a:avLst/>
+          </a:prstGeom>
+          <a:noFill/>
+          <a:ln>
+            <a:solidFill>
+              <a:schemeClr val="tx1"/>
+            </a:solidFill>
+          </a:ln>
+        </p:spPr>
+        <p:txBody>
+          <a:bodyPr wrap="none" rtlCol="0">
+            <a:spAutoFit/>
+          </a:bodyPr>
+          <a:lstStyle/>
+          <a:p>
+            <a:r>
+              <a:rPr lang="en-US" dirty="0"/>
+              <a:t> Conclusion</a:t>
+            </a:r>
+          </a:p>
+        </p:txBody>
+      </p:sp>
+      <p:sp>
+        <p:nvSpPr>
+          <p:cNvPr id="10" name="TextBox 9">
+            <a:extLst>
+              <a:ext uri="{FF2B5EF4-FFF2-40B4-BE49-F238E27FC236}">
+                <a16:creationId xmlns:a16="http://schemas.microsoft.com/office/drawing/2014/main" id="{D4F871EE-4E63-4319-9C0C-27DB0606F08A}"/>
+              </a:ext>
+            </a:extLst>
+          </p:cNvPr>
+          <p:cNvSpPr txBox="1"/>
+          <p:nvPr/>
+        </p:nvSpPr>
+        <p:spPr>
+          <a:xfrm>
+            <a:off x="229840" y="5672062"/>
+            <a:ext cx="2332818" cy="646331"/>
+          </a:xfrm>
+          <a:prstGeom prst="rect">
+            <a:avLst/>
+          </a:prstGeom>
+          <a:noFill/>
+          <a:ln>
+            <a:solidFill>
+              <a:schemeClr val="tx1"/>
+            </a:solidFill>
+          </a:ln>
+        </p:spPr>
+        <p:txBody>
+          <a:bodyPr wrap="none" rtlCol="0">
+            <a:spAutoFit/>
+          </a:bodyPr>
+          <a:lstStyle/>
+          <a:p>
+            <a:r>
+              <a:rPr lang="en-US" dirty="0"/>
+              <a:t>Chapter 7 – </a:t>
+            </a:r>
+          </a:p>
+          <a:p>
+            <a:r>
+              <a:rPr lang="en-US" dirty="0"/>
+              <a:t>Guidance Performance</a:t>
+            </a:r>
+          </a:p>
+        </p:txBody>
+      </p:sp>
+    </p:spTree>
+    <p:extLst>
+      <p:ext uri="{BB962C8B-B14F-4D97-AF65-F5344CB8AC3E}">
+        <p14:creationId xmlns:p14="http://schemas.microsoft.com/office/powerpoint/2010/main" val="4293765166"/>
+      </p:ext>
+    </p:extLst>
+  </p:cSld>
+  <p:clrMapOvr>
+    <a:masterClrMapping/>
+  </p:clrMapOvr>
+</p:sld>
+</file>
+
+<file path=ppt/slides/slide2.xml><?xml version="1.0" encoding="utf-8"?>
+<p:sld xmlns:a="http://schemas.openxmlformats.org/drawingml/2006/main" xmlns:r="http://schemas.openxmlformats.org/officeDocument/2006/relationships" xmlns:p="http://schemas.openxmlformats.org/presentationml/2006/main">
+  <p:cSld>
+    <p:spTree>
+      <p:nvGrpSpPr>
+        <p:cNvPr id="1" name=""/>
+        <p:cNvGrpSpPr/>
+        <p:nvPr/>
+      </p:nvGrpSpPr>
+      <p:grpSpPr>
+        <a:xfrm>
+          <a:off x="0" y="0"/>
+          <a:ext cx="0" cy="0"/>
+          <a:chOff x="0" y="0"/>
+          <a:chExt cx="0" cy="0"/>
+        </a:xfrm>
+      </p:grpSpPr>
+      <p:grpSp>
+        <p:nvGrpSpPr>
           <p:cNvPr id="2" name="Group 1">
             <a:extLst>
               <a:ext uri="{FF2B5EF4-FFF2-40B4-BE49-F238E27FC236}">
@@ -4338,7 +5414,7 @@
 </p:sld>
 </file>
 
-<file path=ppt/slides/slide2.xml><?xml version="1.0" encoding="utf-8"?>
+<file path=ppt/slides/slide3.xml><?xml version="1.0" encoding="utf-8"?>
 <p:sld xmlns:a="http://schemas.openxmlformats.org/drawingml/2006/main" xmlns:r="http://schemas.openxmlformats.org/officeDocument/2006/relationships" xmlns:p="http://schemas.openxmlformats.org/presentationml/2006/main">
   <p:cSld>
     <p:spTree>
@@ -4369,7 +5445,7 @@
         </p:nvSpPr>
         <p:spPr>
           <a:xfrm>
-            <a:off x="1546123" y="1458615"/>
+            <a:off x="1642375" y="1458615"/>
             <a:ext cx="6282812" cy="2050026"/>
           </a:xfrm>
           <a:custGeom>
@@ -4531,7 +5607,7 @@
         </p:nvSpPr>
         <p:spPr>
           <a:xfrm rot="5400000" flipV="1">
-            <a:off x="7158685" y="2817612"/>
+            <a:off x="7254937" y="2817612"/>
             <a:ext cx="2492478" cy="1131334"/>
           </a:xfrm>
           <a:custGeom>
@@ -4649,7 +5725,7 @@
         </p:nvSpPr>
         <p:spPr>
           <a:xfrm rot="5400000" flipV="1">
-            <a:off x="7843113" y="2942377"/>
+            <a:off x="7939365" y="2942377"/>
             <a:ext cx="1386349" cy="1393076"/>
           </a:xfrm>
           <a:custGeom>
@@ -4775,7 +5851,7 @@
         </p:nvSpPr>
         <p:spPr>
           <a:xfrm rot="2316768">
-            <a:off x="1018167" y="283168"/>
+            <a:off x="1114419" y="283168"/>
             <a:ext cx="893361" cy="2345981"/>
           </a:xfrm>
           <a:prstGeom prst="ellipse">
@@ -4829,7 +5905,7 @@
         </p:nvSpPr>
         <p:spPr>
           <a:xfrm>
-            <a:off x="1580535" y="1463530"/>
+            <a:off x="1676787" y="1463530"/>
             <a:ext cx="6253316" cy="2182761"/>
           </a:xfrm>
           <a:custGeom>
@@ -5090,7 +6166,7 @@
         </p:nvCxnSpPr>
         <p:spPr>
           <a:xfrm flipV="1">
-            <a:off x="7859415" y="3669277"/>
+            <a:off x="7955667" y="3669277"/>
             <a:ext cx="1366690" cy="10996"/>
           </a:xfrm>
           <a:prstGeom prst="line">
@@ -5132,7 +6208,7 @@
         </p:nvCxnSpPr>
         <p:spPr>
           <a:xfrm>
-            <a:off x="7824017" y="908217"/>
+            <a:off x="7920269" y="908217"/>
             <a:ext cx="0" cy="4144296"/>
           </a:xfrm>
           <a:prstGeom prst="line">
@@ -5177,7 +6253,7 @@
         </p:nvCxnSpPr>
         <p:spPr>
           <a:xfrm>
-            <a:off x="7848599" y="3491432"/>
+            <a:off x="7944851" y="3491432"/>
             <a:ext cx="1106752" cy="17209"/>
           </a:xfrm>
           <a:prstGeom prst="line">
@@ -5219,7 +6295,7 @@
         </p:nvSpPr>
         <p:spPr>
           <a:xfrm rot="18891103">
-            <a:off x="5169623" y="5083993"/>
+            <a:off x="5265875" y="5083993"/>
             <a:ext cx="5279294" cy="5279294"/>
           </a:xfrm>
           <a:prstGeom prst="arc">
@@ -5271,7 +6347,7 @@
         </p:nvSpPr>
         <p:spPr>
           <a:xfrm>
-            <a:off x="2498623" y="431163"/>
+            <a:off x="2594875" y="431163"/>
             <a:ext cx="2785186" cy="954107"/>
           </a:xfrm>
           <a:prstGeom prst="rect">
@@ -5312,7 +6388,7 @@
         </p:nvSpPr>
         <p:spPr>
           <a:xfrm>
-            <a:off x="6786595" y="5334140"/>
+            <a:off x="6882847" y="5334140"/>
             <a:ext cx="2183996" cy="461665"/>
           </a:xfrm>
           <a:prstGeom prst="rect">
@@ -5347,7 +6423,7 @@
         </p:nvSpPr>
         <p:spPr>
           <a:xfrm>
-            <a:off x="9314273" y="2291103"/>
+            <a:off x="9410525" y="2291103"/>
             <a:ext cx="1894051" cy="1200329"/>
           </a:xfrm>
           <a:prstGeom prst="rect">
@@ -5382,7 +6458,7 @@
         </p:nvSpPr>
         <p:spPr>
           <a:xfrm>
-            <a:off x="7848599" y="632095"/>
+            <a:off x="7944851" y="632095"/>
             <a:ext cx="1186543" cy="461665"/>
           </a:xfrm>
           <a:prstGeom prst="rect">
@@ -5417,7 +6493,7 @@
         </p:nvGrpSpPr>
         <p:grpSpPr>
           <a:xfrm rot="18643004">
-            <a:off x="1143356" y="1170341"/>
+            <a:off x="1239608" y="1170341"/>
             <a:ext cx="823735" cy="576545"/>
             <a:chOff x="8966577" y="4136717"/>
             <a:chExt cx="1713015" cy="1198967"/>
@@ -5617,6 +6693,2649 @@
     <p:extLst>
       <p:ext uri="{BB962C8B-B14F-4D97-AF65-F5344CB8AC3E}">
         <p14:creationId xmlns:p14="http://schemas.microsoft.com/office/powerpoint/2010/main" val="452108031"/>
+      </p:ext>
+    </p:extLst>
+  </p:cSld>
+  <p:clrMapOvr>
+    <a:masterClrMapping/>
+  </p:clrMapOvr>
+</p:sld>
+</file>
+
+<file path=ppt/slides/slide4.xml><?xml version="1.0" encoding="utf-8"?>
+<p:sld xmlns:a="http://schemas.openxmlformats.org/drawingml/2006/main" xmlns:r="http://schemas.openxmlformats.org/officeDocument/2006/relationships" xmlns:p="http://schemas.openxmlformats.org/presentationml/2006/main">
+  <p:cSld>
+    <p:spTree>
+      <p:nvGrpSpPr>
+        <p:cNvPr id="1" name=""/>
+        <p:cNvGrpSpPr/>
+        <p:nvPr/>
+      </p:nvGrpSpPr>
+      <p:grpSpPr>
+        <a:xfrm>
+          <a:off x="0" y="0"/>
+          <a:ext cx="0" cy="0"/>
+          <a:chOff x="0" y="0"/>
+          <a:chExt cx="0" cy="0"/>
+        </a:xfrm>
+      </p:grpSpPr>
+      <p:sp>
+        <p:nvSpPr>
+          <p:cNvPr id="4" name="Freeform: Shape 3">
+            <a:extLst>
+              <a:ext uri="{FF2B5EF4-FFF2-40B4-BE49-F238E27FC236}">
+                <a16:creationId xmlns:a16="http://schemas.microsoft.com/office/drawing/2014/main" id="{E3A9920C-41F8-4FC7-A83E-A1342FD3FFCF}"/>
+              </a:ext>
+            </a:extLst>
+          </p:cNvPr>
+          <p:cNvSpPr/>
+          <p:nvPr/>
+        </p:nvSpPr>
+        <p:spPr>
+          <a:xfrm>
+            <a:off x="1626333" y="1314237"/>
+            <a:ext cx="6314896" cy="1392300"/>
+          </a:xfrm>
+          <a:custGeom>
+            <a:avLst/>
+            <a:gdLst>
+              <a:gd name="connsiteX0" fmla="*/ 0 w 8657303"/>
+              <a:gd name="connsiteY0" fmla="*/ 0 h 2050026"/>
+              <a:gd name="connsiteX1" fmla="*/ 5014452 w 8657303"/>
+              <a:gd name="connsiteY1" fmla="*/ 1858297 h 2050026"/>
+              <a:gd name="connsiteX2" fmla="*/ 6799007 w 8657303"/>
+              <a:gd name="connsiteY2" fmla="*/ 1696065 h 2050026"/>
+              <a:gd name="connsiteX3" fmla="*/ 8657303 w 8657303"/>
+              <a:gd name="connsiteY3" fmla="*/ 2050026 h 2050026"/>
+              <a:gd name="connsiteX0" fmla="*/ 0 w 8657303"/>
+              <a:gd name="connsiteY0" fmla="*/ 0 h 2050026"/>
+              <a:gd name="connsiteX1" fmla="*/ 2035278 w 8657303"/>
+              <a:gd name="connsiteY1" fmla="*/ 1297859 h 2050026"/>
+              <a:gd name="connsiteX2" fmla="*/ 5014452 w 8657303"/>
+              <a:gd name="connsiteY2" fmla="*/ 1858297 h 2050026"/>
+              <a:gd name="connsiteX3" fmla="*/ 6799007 w 8657303"/>
+              <a:gd name="connsiteY3" fmla="*/ 1696065 h 2050026"/>
+              <a:gd name="connsiteX4" fmla="*/ 8657303 w 8657303"/>
+              <a:gd name="connsiteY4" fmla="*/ 2050026 h 2050026"/>
+              <a:gd name="connsiteX0" fmla="*/ 0 w 8657303"/>
+              <a:gd name="connsiteY0" fmla="*/ 0 h 2050026"/>
+              <a:gd name="connsiteX1" fmla="*/ 2035278 w 8657303"/>
+              <a:gd name="connsiteY1" fmla="*/ 1297859 h 2050026"/>
+              <a:gd name="connsiteX2" fmla="*/ 5014452 w 8657303"/>
+              <a:gd name="connsiteY2" fmla="*/ 1858297 h 2050026"/>
+              <a:gd name="connsiteX3" fmla="*/ 6799007 w 8657303"/>
+              <a:gd name="connsiteY3" fmla="*/ 1696065 h 2050026"/>
+              <a:gd name="connsiteX4" fmla="*/ 7374194 w 8657303"/>
+              <a:gd name="connsiteY4" fmla="*/ 1592826 h 2050026"/>
+              <a:gd name="connsiteX5" fmla="*/ 8657303 w 8657303"/>
+              <a:gd name="connsiteY5" fmla="*/ 2050026 h 2050026"/>
+              <a:gd name="connsiteX0" fmla="*/ 0 w 8657303"/>
+              <a:gd name="connsiteY0" fmla="*/ 0 h 2050026"/>
+              <a:gd name="connsiteX1" fmla="*/ 2035278 w 8657303"/>
+              <a:gd name="connsiteY1" fmla="*/ 1297859 h 2050026"/>
+              <a:gd name="connsiteX2" fmla="*/ 5014452 w 8657303"/>
+              <a:gd name="connsiteY2" fmla="*/ 1858297 h 2050026"/>
+              <a:gd name="connsiteX3" fmla="*/ 6784259 w 8657303"/>
+              <a:gd name="connsiteY3" fmla="*/ 1401097 h 2050026"/>
+              <a:gd name="connsiteX4" fmla="*/ 7374194 w 8657303"/>
+              <a:gd name="connsiteY4" fmla="*/ 1592826 h 2050026"/>
+              <a:gd name="connsiteX5" fmla="*/ 8657303 w 8657303"/>
+              <a:gd name="connsiteY5" fmla="*/ 2050026 h 2050026"/>
+              <a:gd name="connsiteX0" fmla="*/ 0 w 8657303"/>
+              <a:gd name="connsiteY0" fmla="*/ 0 h 2050026"/>
+              <a:gd name="connsiteX1" fmla="*/ 2035278 w 8657303"/>
+              <a:gd name="connsiteY1" fmla="*/ 1297859 h 2050026"/>
+              <a:gd name="connsiteX2" fmla="*/ 5014452 w 8657303"/>
+              <a:gd name="connsiteY2" fmla="*/ 1858297 h 2050026"/>
+              <a:gd name="connsiteX3" fmla="*/ 6784259 w 8657303"/>
+              <a:gd name="connsiteY3" fmla="*/ 1401097 h 2050026"/>
+              <a:gd name="connsiteX4" fmla="*/ 8657303 w 8657303"/>
+              <a:gd name="connsiteY4" fmla="*/ 2050026 h 2050026"/>
+              <a:gd name="connsiteX0" fmla="*/ 0 w 8657303"/>
+              <a:gd name="connsiteY0" fmla="*/ 0 h 2050026"/>
+              <a:gd name="connsiteX1" fmla="*/ 2035278 w 8657303"/>
+              <a:gd name="connsiteY1" fmla="*/ 1297859 h 2050026"/>
+              <a:gd name="connsiteX2" fmla="*/ 5014452 w 8657303"/>
+              <a:gd name="connsiteY2" fmla="*/ 1858297 h 2050026"/>
+              <a:gd name="connsiteX3" fmla="*/ 6702969 w 8657303"/>
+              <a:gd name="connsiteY3" fmla="*/ 1710813 h 2050026"/>
+              <a:gd name="connsiteX4" fmla="*/ 8657303 w 8657303"/>
+              <a:gd name="connsiteY4" fmla="*/ 2050026 h 2050026"/>
+              <a:gd name="connsiteX0" fmla="*/ 0 w 8723617"/>
+              <a:gd name="connsiteY0" fmla="*/ 0 h 1870413"/>
+              <a:gd name="connsiteX1" fmla="*/ 2035278 w 8723617"/>
+              <a:gd name="connsiteY1" fmla="*/ 1297859 h 1870413"/>
+              <a:gd name="connsiteX2" fmla="*/ 5014452 w 8723617"/>
+              <a:gd name="connsiteY2" fmla="*/ 1858297 h 1870413"/>
+              <a:gd name="connsiteX3" fmla="*/ 6702969 w 8723617"/>
+              <a:gd name="connsiteY3" fmla="*/ 1710813 h 1870413"/>
+              <a:gd name="connsiteX4" fmla="*/ 8723617 w 8723617"/>
+              <a:gd name="connsiteY4" fmla="*/ 1520637 h 1870413"/>
+              <a:gd name="connsiteX0" fmla="*/ 0 w 8723617"/>
+              <a:gd name="connsiteY0" fmla="*/ 0 h 1860636"/>
+              <a:gd name="connsiteX1" fmla="*/ 2035278 w 8723617"/>
+              <a:gd name="connsiteY1" fmla="*/ 1297859 h 1860636"/>
+              <a:gd name="connsiteX2" fmla="*/ 5014452 w 8723617"/>
+              <a:gd name="connsiteY2" fmla="*/ 1858297 h 1860636"/>
+              <a:gd name="connsiteX3" fmla="*/ 6393500 w 8723617"/>
+              <a:gd name="connsiteY3" fmla="*/ 1518308 h 1860636"/>
+              <a:gd name="connsiteX4" fmla="*/ 8723617 w 8723617"/>
+              <a:gd name="connsiteY4" fmla="*/ 1520637 h 1860636"/>
+              <a:gd name="connsiteX0" fmla="*/ 0 w 8723617"/>
+              <a:gd name="connsiteY0" fmla="*/ 0 h 1622948"/>
+              <a:gd name="connsiteX1" fmla="*/ 2035278 w 8723617"/>
+              <a:gd name="connsiteY1" fmla="*/ 1297859 h 1622948"/>
+              <a:gd name="connsiteX2" fmla="*/ 4660772 w 8723617"/>
+              <a:gd name="connsiteY2" fmla="*/ 1617665 h 1622948"/>
+              <a:gd name="connsiteX3" fmla="*/ 6393500 w 8723617"/>
+              <a:gd name="connsiteY3" fmla="*/ 1518308 h 1622948"/>
+              <a:gd name="connsiteX4" fmla="*/ 8723617 w 8723617"/>
+              <a:gd name="connsiteY4" fmla="*/ 1520637 h 1622948"/>
+              <a:gd name="connsiteX0" fmla="*/ 0 w 8723617"/>
+              <a:gd name="connsiteY0" fmla="*/ 0 h 1627241"/>
+              <a:gd name="connsiteX1" fmla="*/ 2300537 w 8723617"/>
+              <a:gd name="connsiteY1" fmla="*/ 1201606 h 1627241"/>
+              <a:gd name="connsiteX2" fmla="*/ 4660772 w 8723617"/>
+              <a:gd name="connsiteY2" fmla="*/ 1617665 h 1627241"/>
+              <a:gd name="connsiteX3" fmla="*/ 6393500 w 8723617"/>
+              <a:gd name="connsiteY3" fmla="*/ 1518308 h 1627241"/>
+              <a:gd name="connsiteX4" fmla="*/ 8723617 w 8723617"/>
+              <a:gd name="connsiteY4" fmla="*/ 1520637 h 1627241"/>
+              <a:gd name="connsiteX0" fmla="*/ 0 w 8745722"/>
+              <a:gd name="connsiteY0" fmla="*/ 0 h 1466820"/>
+              <a:gd name="connsiteX1" fmla="*/ 2322642 w 8745722"/>
+              <a:gd name="connsiteY1" fmla="*/ 1041185 h 1466820"/>
+              <a:gd name="connsiteX2" fmla="*/ 4682877 w 8745722"/>
+              <a:gd name="connsiteY2" fmla="*/ 1457244 h 1466820"/>
+              <a:gd name="connsiteX3" fmla="*/ 6415605 w 8745722"/>
+              <a:gd name="connsiteY3" fmla="*/ 1357887 h 1466820"/>
+              <a:gd name="connsiteX4" fmla="*/ 8745722 w 8745722"/>
+              <a:gd name="connsiteY4" fmla="*/ 1360216 h 1466820"/>
+              <a:gd name="connsiteX0" fmla="*/ 0 w 8701512"/>
+              <a:gd name="connsiteY0" fmla="*/ 0 h 1466820"/>
+              <a:gd name="connsiteX1" fmla="*/ 2322642 w 8701512"/>
+              <a:gd name="connsiteY1" fmla="*/ 1041185 h 1466820"/>
+              <a:gd name="connsiteX2" fmla="*/ 4682877 w 8701512"/>
+              <a:gd name="connsiteY2" fmla="*/ 1457244 h 1466820"/>
+              <a:gd name="connsiteX3" fmla="*/ 6415605 w 8701512"/>
+              <a:gd name="connsiteY3" fmla="*/ 1357887 h 1466820"/>
+              <a:gd name="connsiteX4" fmla="*/ 8701512 w 8701512"/>
+              <a:gd name="connsiteY4" fmla="*/ 1392300 h 1466820"/>
+              <a:gd name="connsiteX0" fmla="*/ 0 w 8701512"/>
+              <a:gd name="connsiteY0" fmla="*/ 0 h 1457429"/>
+              <a:gd name="connsiteX1" fmla="*/ 2322642 w 8701512"/>
+              <a:gd name="connsiteY1" fmla="*/ 1041185 h 1457429"/>
+              <a:gd name="connsiteX2" fmla="*/ 4682877 w 8701512"/>
+              <a:gd name="connsiteY2" fmla="*/ 1457244 h 1457429"/>
+              <a:gd name="connsiteX3" fmla="*/ 6260871 w 8701512"/>
+              <a:gd name="connsiteY3" fmla="*/ 1101214 h 1457429"/>
+              <a:gd name="connsiteX4" fmla="*/ 8701512 w 8701512"/>
+              <a:gd name="connsiteY4" fmla="*/ 1392300 h 1457429"/>
+              <a:gd name="connsiteX0" fmla="*/ 0 w 8701512"/>
+              <a:gd name="connsiteY0" fmla="*/ 0 h 1457903"/>
+              <a:gd name="connsiteX1" fmla="*/ 2322642 w 8701512"/>
+              <a:gd name="connsiteY1" fmla="*/ 1041185 h 1457903"/>
+              <a:gd name="connsiteX2" fmla="*/ 4682877 w 8701512"/>
+              <a:gd name="connsiteY2" fmla="*/ 1457244 h 1457903"/>
+              <a:gd name="connsiteX3" fmla="*/ 6680866 w 8701512"/>
+              <a:gd name="connsiteY3" fmla="*/ 1149340 h 1457903"/>
+              <a:gd name="connsiteX4" fmla="*/ 8701512 w 8701512"/>
+              <a:gd name="connsiteY4" fmla="*/ 1392300 h 1457903"/>
+              <a:gd name="connsiteX0" fmla="*/ 0 w 8701512"/>
+              <a:gd name="connsiteY0" fmla="*/ 0 h 1392300"/>
+              <a:gd name="connsiteX1" fmla="*/ 2322642 w 8701512"/>
+              <a:gd name="connsiteY1" fmla="*/ 1041185 h 1392300"/>
+              <a:gd name="connsiteX2" fmla="*/ 4660772 w 8701512"/>
+              <a:gd name="connsiteY2" fmla="*/ 1344950 h 1392300"/>
+              <a:gd name="connsiteX3" fmla="*/ 6680866 w 8701512"/>
+              <a:gd name="connsiteY3" fmla="*/ 1149340 h 1392300"/>
+              <a:gd name="connsiteX4" fmla="*/ 8701512 w 8701512"/>
+              <a:gd name="connsiteY4" fmla="*/ 1392300 h 1392300"/>
+            </a:gdLst>
+            <a:ahLst/>
+            <a:cxnLst>
+              <a:cxn ang="0">
+                <a:pos x="connsiteX0" y="connsiteY0"/>
+              </a:cxn>
+              <a:cxn ang="0">
+                <a:pos x="connsiteX1" y="connsiteY1"/>
+              </a:cxn>
+              <a:cxn ang="0">
+                <a:pos x="connsiteX2" y="connsiteY2"/>
+              </a:cxn>
+              <a:cxn ang="0">
+                <a:pos x="connsiteX3" y="connsiteY3"/>
+              </a:cxn>
+              <a:cxn ang="0">
+                <a:pos x="connsiteX4" y="connsiteY4"/>
+              </a:cxn>
+            </a:cxnLst>
+            <a:rect l="l" t="t" r="r" b="b"/>
+            <a:pathLst>
+              <a:path w="8701512" h="1392300">
+                <a:moveTo>
+                  <a:pt x="0" y="0"/>
+                </a:moveTo>
+                <a:cubicBezTo>
+                  <a:pt x="398207" y="162232"/>
+                  <a:pt x="1545847" y="817027"/>
+                  <a:pt x="2322642" y="1041185"/>
+                </a:cubicBezTo>
+                <a:cubicBezTo>
+                  <a:pt x="3099437" y="1265343"/>
+                  <a:pt x="3934401" y="1326924"/>
+                  <a:pt x="4660772" y="1344950"/>
+                </a:cubicBezTo>
+                <a:cubicBezTo>
+                  <a:pt x="5387143" y="1362976"/>
+                  <a:pt x="6073724" y="1117385"/>
+                  <a:pt x="6680866" y="1149340"/>
+                </a:cubicBezTo>
+                <a:cubicBezTo>
+                  <a:pt x="7288008" y="1181295"/>
+                  <a:pt x="8311294" y="1257106"/>
+                  <a:pt x="8701512" y="1392300"/>
+                </a:cubicBezTo>
+              </a:path>
+            </a:pathLst>
+          </a:custGeom>
+          <a:noFill/>
+          <a:ln w="38100">
+            <a:solidFill>
+              <a:srgbClr val="FF0000"/>
+            </a:solidFill>
+          </a:ln>
+        </p:spPr>
+        <p:style>
+          <a:lnRef idx="2">
+            <a:schemeClr val="accent1">
+              <a:shade val="50000"/>
+            </a:schemeClr>
+          </a:lnRef>
+          <a:fillRef idx="1">
+            <a:schemeClr val="accent1"/>
+          </a:fillRef>
+          <a:effectRef idx="0">
+            <a:schemeClr val="accent1"/>
+          </a:effectRef>
+          <a:fontRef idx="minor">
+            <a:schemeClr val="lt1"/>
+          </a:fontRef>
+        </p:style>
+        <p:txBody>
+          <a:bodyPr rtlCol="0" anchor="ctr"/>
+          <a:lstStyle/>
+          <a:p>
+            <a:pPr algn="ctr"/>
+            <a:endParaRPr lang="en-US"/>
+          </a:p>
+        </p:txBody>
+      </p:sp>
+      <p:sp>
+        <p:nvSpPr>
+          <p:cNvPr id="6" name="Freeform: Shape 5">
+            <a:extLst>
+              <a:ext uri="{FF2B5EF4-FFF2-40B4-BE49-F238E27FC236}">
+                <a16:creationId xmlns:a16="http://schemas.microsoft.com/office/drawing/2014/main" id="{CCDE7DF1-EC7B-400A-AE8A-A616DDA29963}"/>
+              </a:ext>
+            </a:extLst>
+          </p:cNvPr>
+          <p:cNvSpPr/>
+          <p:nvPr/>
+        </p:nvSpPr>
+        <p:spPr>
+          <a:xfrm rot="5400000" flipV="1">
+            <a:off x="7254937" y="1999470"/>
+            <a:ext cx="2492478" cy="1131334"/>
+          </a:xfrm>
+          <a:custGeom>
+            <a:avLst/>
+            <a:gdLst>
+              <a:gd name="connsiteX0" fmla="*/ 0 w 2492478"/>
+              <a:gd name="connsiteY0" fmla="*/ 0 h 0"/>
+              <a:gd name="connsiteX1" fmla="*/ 2492478 w 2492478"/>
+              <a:gd name="connsiteY1" fmla="*/ 0 h 0"/>
+              <a:gd name="connsiteX0" fmla="*/ 0 w 10000"/>
+              <a:gd name="connsiteY0" fmla="*/ 0 h 36190"/>
+              <a:gd name="connsiteX1" fmla="*/ 5858 w 10000"/>
+              <a:gd name="connsiteY1" fmla="*/ 36190 h 36190"/>
+              <a:gd name="connsiteX2" fmla="*/ 10000 w 10000"/>
+              <a:gd name="connsiteY2" fmla="*/ 0 h 36190"/>
+              <a:gd name="connsiteX0" fmla="*/ 0 w 10000"/>
+              <a:gd name="connsiteY0" fmla="*/ 0 h 36528"/>
+              <a:gd name="connsiteX1" fmla="*/ 5858 w 10000"/>
+              <a:gd name="connsiteY1" fmla="*/ 36190 h 36528"/>
+              <a:gd name="connsiteX2" fmla="*/ 7929 w 10000"/>
+              <a:gd name="connsiteY2" fmla="*/ 19524 h 36528"/>
+              <a:gd name="connsiteX3" fmla="*/ 10000 w 10000"/>
+              <a:gd name="connsiteY3" fmla="*/ 0 h 36528"/>
+              <a:gd name="connsiteX0" fmla="*/ 0 w 10000"/>
+              <a:gd name="connsiteY0" fmla="*/ 0 h 36528"/>
+              <a:gd name="connsiteX1" fmla="*/ 5325 w 10000"/>
+              <a:gd name="connsiteY1" fmla="*/ 36190 h 36528"/>
+              <a:gd name="connsiteX2" fmla="*/ 7929 w 10000"/>
+              <a:gd name="connsiteY2" fmla="*/ 19524 h 36528"/>
+              <a:gd name="connsiteX3" fmla="*/ 10000 w 10000"/>
+              <a:gd name="connsiteY3" fmla="*/ 0 h 36528"/>
+            </a:gdLst>
+            <a:ahLst/>
+            <a:cxnLst>
+              <a:cxn ang="0">
+                <a:pos x="connsiteX0" y="connsiteY0"/>
+              </a:cxn>
+              <a:cxn ang="0">
+                <a:pos x="connsiteX1" y="connsiteY1"/>
+              </a:cxn>
+              <a:cxn ang="0">
+                <a:pos x="connsiteX2" y="connsiteY2"/>
+              </a:cxn>
+              <a:cxn ang="0">
+                <a:pos x="connsiteX3" y="connsiteY3"/>
+              </a:cxn>
+            </a:cxnLst>
+            <a:rect l="l" t="t" r="r" b="b"/>
+            <a:pathLst>
+              <a:path w="10000" h="36528">
+                <a:moveTo>
+                  <a:pt x="0" y="0"/>
+                </a:moveTo>
+                <a:cubicBezTo>
+                  <a:pt x="1677" y="0"/>
+                  <a:pt x="3648" y="36190"/>
+                  <a:pt x="5325" y="36190"/>
+                </a:cubicBezTo>
+                <a:cubicBezTo>
+                  <a:pt x="6390" y="38809"/>
+                  <a:pt x="7239" y="25556"/>
+                  <a:pt x="7929" y="19524"/>
+                </a:cubicBezTo>
+                <a:cubicBezTo>
+                  <a:pt x="8619" y="13492"/>
+                  <a:pt x="9398" y="2619"/>
+                  <a:pt x="10000" y="0"/>
+                </a:cubicBezTo>
+              </a:path>
+            </a:pathLst>
+          </a:custGeom>
+          <a:noFill/>
+          <a:ln w="31750">
+            <a:solidFill>
+              <a:srgbClr val="FF0000"/>
+            </a:solidFill>
+          </a:ln>
+        </p:spPr>
+        <p:style>
+          <a:lnRef idx="2">
+            <a:schemeClr val="accent1">
+              <a:shade val="50000"/>
+            </a:schemeClr>
+          </a:lnRef>
+          <a:fillRef idx="1">
+            <a:schemeClr val="accent1"/>
+          </a:fillRef>
+          <a:effectRef idx="0">
+            <a:schemeClr val="accent1"/>
+          </a:effectRef>
+          <a:fontRef idx="minor">
+            <a:schemeClr val="lt1"/>
+          </a:fontRef>
+        </p:style>
+        <p:txBody>
+          <a:bodyPr rtlCol="0" anchor="ctr"/>
+          <a:lstStyle/>
+          <a:p>
+            <a:pPr algn="ctr"/>
+            <a:endParaRPr lang="en-US"/>
+          </a:p>
+        </p:txBody>
+      </p:sp>
+      <p:sp>
+        <p:nvSpPr>
+          <p:cNvPr id="8" name="Freeform: Shape 7">
+            <a:extLst>
+              <a:ext uri="{FF2B5EF4-FFF2-40B4-BE49-F238E27FC236}">
+                <a16:creationId xmlns:a16="http://schemas.microsoft.com/office/drawing/2014/main" id="{5E3B8C62-DFBB-4026-A44F-73D95F83A5A1}"/>
+              </a:ext>
+            </a:extLst>
+          </p:cNvPr>
+          <p:cNvSpPr/>
+          <p:nvPr/>
+        </p:nvSpPr>
+        <p:spPr>
+          <a:xfrm rot="5400000" flipV="1">
+            <a:off x="7939365" y="2124235"/>
+            <a:ext cx="1386349" cy="1393076"/>
+          </a:xfrm>
+          <a:custGeom>
+            <a:avLst/>
+            <a:gdLst>
+              <a:gd name="connsiteX0" fmla="*/ 0 w 2492478"/>
+              <a:gd name="connsiteY0" fmla="*/ 0 h 0"/>
+              <a:gd name="connsiteX1" fmla="*/ 2492478 w 2492478"/>
+              <a:gd name="connsiteY1" fmla="*/ 0 h 0"/>
+              <a:gd name="connsiteX0" fmla="*/ 0 w 10000"/>
+              <a:gd name="connsiteY0" fmla="*/ 0 h 36190"/>
+              <a:gd name="connsiteX1" fmla="*/ 5858 w 10000"/>
+              <a:gd name="connsiteY1" fmla="*/ 36190 h 36190"/>
+              <a:gd name="connsiteX2" fmla="*/ 10000 w 10000"/>
+              <a:gd name="connsiteY2" fmla="*/ 0 h 36190"/>
+              <a:gd name="connsiteX0" fmla="*/ 0 w 10000"/>
+              <a:gd name="connsiteY0" fmla="*/ 0 h 36528"/>
+              <a:gd name="connsiteX1" fmla="*/ 5858 w 10000"/>
+              <a:gd name="connsiteY1" fmla="*/ 36190 h 36528"/>
+              <a:gd name="connsiteX2" fmla="*/ 7929 w 10000"/>
+              <a:gd name="connsiteY2" fmla="*/ 19524 h 36528"/>
+              <a:gd name="connsiteX3" fmla="*/ 10000 w 10000"/>
+              <a:gd name="connsiteY3" fmla="*/ 0 h 36528"/>
+              <a:gd name="connsiteX0" fmla="*/ 0 w 10000"/>
+              <a:gd name="connsiteY0" fmla="*/ 0 h 36528"/>
+              <a:gd name="connsiteX1" fmla="*/ 5325 w 10000"/>
+              <a:gd name="connsiteY1" fmla="*/ 36190 h 36528"/>
+              <a:gd name="connsiteX2" fmla="*/ 7929 w 10000"/>
+              <a:gd name="connsiteY2" fmla="*/ 19524 h 36528"/>
+              <a:gd name="connsiteX3" fmla="*/ 10000 w 10000"/>
+              <a:gd name="connsiteY3" fmla="*/ 0 h 36528"/>
+              <a:gd name="connsiteX0" fmla="*/ 0 w 10000"/>
+              <a:gd name="connsiteY0" fmla="*/ 0 h 44979"/>
+              <a:gd name="connsiteX1" fmla="*/ 5219 w 10000"/>
+              <a:gd name="connsiteY1" fmla="*/ 44762 h 44979"/>
+              <a:gd name="connsiteX2" fmla="*/ 7929 w 10000"/>
+              <a:gd name="connsiteY2" fmla="*/ 19524 h 44979"/>
+              <a:gd name="connsiteX3" fmla="*/ 10000 w 10000"/>
+              <a:gd name="connsiteY3" fmla="*/ 0 h 44979"/>
+            </a:gdLst>
+            <a:ahLst/>
+            <a:cxnLst>
+              <a:cxn ang="0">
+                <a:pos x="connsiteX0" y="connsiteY0"/>
+              </a:cxn>
+              <a:cxn ang="0">
+                <a:pos x="connsiteX1" y="connsiteY1"/>
+              </a:cxn>
+              <a:cxn ang="0">
+                <a:pos x="connsiteX2" y="connsiteY2"/>
+              </a:cxn>
+              <a:cxn ang="0">
+                <a:pos x="connsiteX3" y="connsiteY3"/>
+              </a:cxn>
+            </a:cxnLst>
+            <a:rect l="l" t="t" r="r" b="b"/>
+            <a:pathLst>
+              <a:path w="10000" h="44979">
+                <a:moveTo>
+                  <a:pt x="0" y="0"/>
+                </a:moveTo>
+                <a:cubicBezTo>
+                  <a:pt x="1677" y="0"/>
+                  <a:pt x="3542" y="44762"/>
+                  <a:pt x="5219" y="44762"/>
+                </a:cubicBezTo>
+                <a:cubicBezTo>
+                  <a:pt x="6284" y="47381"/>
+                  <a:pt x="7239" y="25556"/>
+                  <a:pt x="7929" y="19524"/>
+                </a:cubicBezTo>
+                <a:cubicBezTo>
+                  <a:pt x="8619" y="13492"/>
+                  <a:pt x="9398" y="2619"/>
+                  <a:pt x="10000" y="0"/>
+                </a:cubicBezTo>
+              </a:path>
+            </a:pathLst>
+          </a:custGeom>
+          <a:noFill/>
+          <a:ln w="31750">
+            <a:solidFill>
+              <a:schemeClr val="tx2"/>
+            </a:solidFill>
+          </a:ln>
+        </p:spPr>
+        <p:style>
+          <a:lnRef idx="2">
+            <a:schemeClr val="accent1">
+              <a:shade val="50000"/>
+            </a:schemeClr>
+          </a:lnRef>
+          <a:fillRef idx="1">
+            <a:schemeClr val="accent1"/>
+          </a:fillRef>
+          <a:effectRef idx="0">
+            <a:schemeClr val="accent1"/>
+          </a:effectRef>
+          <a:fontRef idx="minor">
+            <a:schemeClr val="lt1"/>
+          </a:fontRef>
+        </p:style>
+        <p:txBody>
+          <a:bodyPr rtlCol="0" anchor="ctr"/>
+          <a:lstStyle/>
+          <a:p>
+            <a:pPr algn="ctr"/>
+            <a:endParaRPr lang="en-US"/>
+          </a:p>
+        </p:txBody>
+      </p:sp>
+      <p:sp>
+        <p:nvSpPr>
+          <p:cNvPr id="9" name="Oval 8">
+            <a:extLst>
+              <a:ext uri="{FF2B5EF4-FFF2-40B4-BE49-F238E27FC236}">
+                <a16:creationId xmlns:a16="http://schemas.microsoft.com/office/drawing/2014/main" id="{9EDE3B36-3AF0-4437-AC1D-AE23D0354DF0}"/>
+              </a:ext>
+            </a:extLst>
+          </p:cNvPr>
+          <p:cNvSpPr/>
+          <p:nvPr/>
+        </p:nvSpPr>
+        <p:spPr>
+          <a:xfrm rot="2316768">
+            <a:off x="1098175" y="152015"/>
+            <a:ext cx="893361" cy="2345981"/>
+          </a:xfrm>
+          <a:prstGeom prst="ellipse">
+            <a:avLst/>
+          </a:prstGeom>
+          <a:solidFill>
+            <a:srgbClr val="FF0000">
+              <a:alpha val="33000"/>
+            </a:srgbClr>
+          </a:solidFill>
+          <a:ln>
+            <a:noFill/>
+          </a:ln>
+        </p:spPr>
+        <p:style>
+          <a:lnRef idx="2">
+            <a:schemeClr val="accent1">
+              <a:shade val="50000"/>
+            </a:schemeClr>
+          </a:lnRef>
+          <a:fillRef idx="1">
+            <a:schemeClr val="accent1"/>
+          </a:fillRef>
+          <a:effectRef idx="0">
+            <a:schemeClr val="accent1"/>
+          </a:effectRef>
+          <a:fontRef idx="minor">
+            <a:schemeClr val="lt1"/>
+          </a:fontRef>
+        </p:style>
+        <p:txBody>
+          <a:bodyPr rtlCol="0" anchor="ctr"/>
+          <a:lstStyle/>
+          <a:p>
+            <a:pPr algn="ctr"/>
+            <a:endParaRPr lang="en-US"/>
+          </a:p>
+        </p:txBody>
+      </p:sp>
+      <p:sp>
+        <p:nvSpPr>
+          <p:cNvPr id="10" name="Freeform: Shape 9">
+            <a:extLst>
+              <a:ext uri="{FF2B5EF4-FFF2-40B4-BE49-F238E27FC236}">
+                <a16:creationId xmlns:a16="http://schemas.microsoft.com/office/drawing/2014/main" id="{46242A4C-70C8-45C0-B7CB-39596E5DA273}"/>
+              </a:ext>
+            </a:extLst>
+          </p:cNvPr>
+          <p:cNvSpPr/>
+          <p:nvPr/>
+        </p:nvSpPr>
+        <p:spPr>
+          <a:xfrm>
+            <a:off x="1612617" y="1287068"/>
+            <a:ext cx="6317485" cy="1673867"/>
+          </a:xfrm>
+          <a:custGeom>
+            <a:avLst/>
+            <a:gdLst>
+              <a:gd name="connsiteX0" fmla="*/ 0 w 8657303"/>
+              <a:gd name="connsiteY0" fmla="*/ 0 h 2050026"/>
+              <a:gd name="connsiteX1" fmla="*/ 5014452 w 8657303"/>
+              <a:gd name="connsiteY1" fmla="*/ 1858297 h 2050026"/>
+              <a:gd name="connsiteX2" fmla="*/ 6799007 w 8657303"/>
+              <a:gd name="connsiteY2" fmla="*/ 1696065 h 2050026"/>
+              <a:gd name="connsiteX3" fmla="*/ 8657303 w 8657303"/>
+              <a:gd name="connsiteY3" fmla="*/ 2050026 h 2050026"/>
+              <a:gd name="connsiteX0" fmla="*/ 0 w 8657303"/>
+              <a:gd name="connsiteY0" fmla="*/ 0 h 2050026"/>
+              <a:gd name="connsiteX1" fmla="*/ 2035278 w 8657303"/>
+              <a:gd name="connsiteY1" fmla="*/ 1297859 h 2050026"/>
+              <a:gd name="connsiteX2" fmla="*/ 5014452 w 8657303"/>
+              <a:gd name="connsiteY2" fmla="*/ 1858297 h 2050026"/>
+              <a:gd name="connsiteX3" fmla="*/ 6799007 w 8657303"/>
+              <a:gd name="connsiteY3" fmla="*/ 1696065 h 2050026"/>
+              <a:gd name="connsiteX4" fmla="*/ 8657303 w 8657303"/>
+              <a:gd name="connsiteY4" fmla="*/ 2050026 h 2050026"/>
+              <a:gd name="connsiteX0" fmla="*/ 0 w 8657303"/>
+              <a:gd name="connsiteY0" fmla="*/ 0 h 2050026"/>
+              <a:gd name="connsiteX1" fmla="*/ 2035278 w 8657303"/>
+              <a:gd name="connsiteY1" fmla="*/ 1297859 h 2050026"/>
+              <a:gd name="connsiteX2" fmla="*/ 5014452 w 8657303"/>
+              <a:gd name="connsiteY2" fmla="*/ 1858297 h 2050026"/>
+              <a:gd name="connsiteX3" fmla="*/ 6799007 w 8657303"/>
+              <a:gd name="connsiteY3" fmla="*/ 1696065 h 2050026"/>
+              <a:gd name="connsiteX4" fmla="*/ 7374194 w 8657303"/>
+              <a:gd name="connsiteY4" fmla="*/ 1592826 h 2050026"/>
+              <a:gd name="connsiteX5" fmla="*/ 8657303 w 8657303"/>
+              <a:gd name="connsiteY5" fmla="*/ 2050026 h 2050026"/>
+              <a:gd name="connsiteX0" fmla="*/ 0 w 8657303"/>
+              <a:gd name="connsiteY0" fmla="*/ 0 h 2050026"/>
+              <a:gd name="connsiteX1" fmla="*/ 2035278 w 8657303"/>
+              <a:gd name="connsiteY1" fmla="*/ 1297859 h 2050026"/>
+              <a:gd name="connsiteX2" fmla="*/ 5014452 w 8657303"/>
+              <a:gd name="connsiteY2" fmla="*/ 1858297 h 2050026"/>
+              <a:gd name="connsiteX3" fmla="*/ 6784259 w 8657303"/>
+              <a:gd name="connsiteY3" fmla="*/ 1401097 h 2050026"/>
+              <a:gd name="connsiteX4" fmla="*/ 7374194 w 8657303"/>
+              <a:gd name="connsiteY4" fmla="*/ 1592826 h 2050026"/>
+              <a:gd name="connsiteX5" fmla="*/ 8657303 w 8657303"/>
+              <a:gd name="connsiteY5" fmla="*/ 2050026 h 2050026"/>
+              <a:gd name="connsiteX0" fmla="*/ 0 w 8657303"/>
+              <a:gd name="connsiteY0" fmla="*/ 0 h 2050026"/>
+              <a:gd name="connsiteX1" fmla="*/ 2035278 w 8657303"/>
+              <a:gd name="connsiteY1" fmla="*/ 1297859 h 2050026"/>
+              <a:gd name="connsiteX2" fmla="*/ 5014452 w 8657303"/>
+              <a:gd name="connsiteY2" fmla="*/ 1858297 h 2050026"/>
+              <a:gd name="connsiteX3" fmla="*/ 6784259 w 8657303"/>
+              <a:gd name="connsiteY3" fmla="*/ 1401097 h 2050026"/>
+              <a:gd name="connsiteX4" fmla="*/ 8657303 w 8657303"/>
+              <a:gd name="connsiteY4" fmla="*/ 2050026 h 2050026"/>
+              <a:gd name="connsiteX0" fmla="*/ 0 w 8657303"/>
+              <a:gd name="connsiteY0" fmla="*/ 0 h 2050026"/>
+              <a:gd name="connsiteX1" fmla="*/ 2035278 w 8657303"/>
+              <a:gd name="connsiteY1" fmla="*/ 1297859 h 2050026"/>
+              <a:gd name="connsiteX2" fmla="*/ 3732531 w 8657303"/>
+              <a:gd name="connsiteY2" fmla="*/ 1941871 h 2050026"/>
+              <a:gd name="connsiteX3" fmla="*/ 5014452 w 8657303"/>
+              <a:gd name="connsiteY3" fmla="*/ 1858297 h 2050026"/>
+              <a:gd name="connsiteX4" fmla="*/ 6784259 w 8657303"/>
+              <a:gd name="connsiteY4" fmla="*/ 1401097 h 2050026"/>
+              <a:gd name="connsiteX5" fmla="*/ 8657303 w 8657303"/>
+              <a:gd name="connsiteY5" fmla="*/ 2050026 h 2050026"/>
+              <a:gd name="connsiteX0" fmla="*/ 0 w 8393113"/>
+              <a:gd name="connsiteY0" fmla="*/ 0 h 2035277"/>
+              <a:gd name="connsiteX1" fmla="*/ 2035278 w 8393113"/>
+              <a:gd name="connsiteY1" fmla="*/ 1297859 h 2035277"/>
+              <a:gd name="connsiteX2" fmla="*/ 3732531 w 8393113"/>
+              <a:gd name="connsiteY2" fmla="*/ 1941871 h 2035277"/>
+              <a:gd name="connsiteX3" fmla="*/ 5014452 w 8393113"/>
+              <a:gd name="connsiteY3" fmla="*/ 1858297 h 2035277"/>
+              <a:gd name="connsiteX4" fmla="*/ 6784259 w 8393113"/>
+              <a:gd name="connsiteY4" fmla="*/ 1401097 h 2035277"/>
+              <a:gd name="connsiteX5" fmla="*/ 8393113 w 8393113"/>
+              <a:gd name="connsiteY5" fmla="*/ 2035277 h 2035277"/>
+              <a:gd name="connsiteX0" fmla="*/ 0 w 8454081"/>
+              <a:gd name="connsiteY0" fmla="*/ 0 h 2035277"/>
+              <a:gd name="connsiteX1" fmla="*/ 2035278 w 8454081"/>
+              <a:gd name="connsiteY1" fmla="*/ 1297859 h 2035277"/>
+              <a:gd name="connsiteX2" fmla="*/ 3732531 w 8454081"/>
+              <a:gd name="connsiteY2" fmla="*/ 1941871 h 2035277"/>
+              <a:gd name="connsiteX3" fmla="*/ 5014452 w 8454081"/>
+              <a:gd name="connsiteY3" fmla="*/ 1858297 h 2035277"/>
+              <a:gd name="connsiteX4" fmla="*/ 6784259 w 8454081"/>
+              <a:gd name="connsiteY4" fmla="*/ 1401097 h 2035277"/>
+              <a:gd name="connsiteX5" fmla="*/ 8454081 w 8454081"/>
+              <a:gd name="connsiteY5" fmla="*/ 2035277 h 2035277"/>
+              <a:gd name="connsiteX0" fmla="*/ 0 w 8616659"/>
+              <a:gd name="connsiteY0" fmla="*/ 0 h 2182761"/>
+              <a:gd name="connsiteX1" fmla="*/ 2197856 w 8616659"/>
+              <a:gd name="connsiteY1" fmla="*/ 1445343 h 2182761"/>
+              <a:gd name="connsiteX2" fmla="*/ 3895109 w 8616659"/>
+              <a:gd name="connsiteY2" fmla="*/ 2089355 h 2182761"/>
+              <a:gd name="connsiteX3" fmla="*/ 5177030 w 8616659"/>
+              <a:gd name="connsiteY3" fmla="*/ 2005781 h 2182761"/>
+              <a:gd name="connsiteX4" fmla="*/ 6946837 w 8616659"/>
+              <a:gd name="connsiteY4" fmla="*/ 1548581 h 2182761"/>
+              <a:gd name="connsiteX5" fmla="*/ 8616659 w 8616659"/>
+              <a:gd name="connsiteY5" fmla="*/ 2182761 h 2182761"/>
+              <a:gd name="connsiteX0" fmla="*/ 0 w 8616659"/>
+              <a:gd name="connsiteY0" fmla="*/ 0 h 2182761"/>
+              <a:gd name="connsiteX1" fmla="*/ 1466253 w 8616659"/>
+              <a:gd name="connsiteY1" fmla="*/ 1194621 h 2182761"/>
+              <a:gd name="connsiteX2" fmla="*/ 3895109 w 8616659"/>
+              <a:gd name="connsiteY2" fmla="*/ 2089355 h 2182761"/>
+              <a:gd name="connsiteX3" fmla="*/ 5177030 w 8616659"/>
+              <a:gd name="connsiteY3" fmla="*/ 2005781 h 2182761"/>
+              <a:gd name="connsiteX4" fmla="*/ 6946837 w 8616659"/>
+              <a:gd name="connsiteY4" fmla="*/ 1548581 h 2182761"/>
+              <a:gd name="connsiteX5" fmla="*/ 8616659 w 8616659"/>
+              <a:gd name="connsiteY5" fmla="*/ 2182761 h 2182761"/>
+              <a:gd name="connsiteX0" fmla="*/ 0 w 8616659"/>
+              <a:gd name="connsiteY0" fmla="*/ 0 h 2182761"/>
+              <a:gd name="connsiteX1" fmla="*/ 1466253 w 8616659"/>
+              <a:gd name="connsiteY1" fmla="*/ 1194621 h 2182761"/>
+              <a:gd name="connsiteX2" fmla="*/ 3895109 w 8616659"/>
+              <a:gd name="connsiteY2" fmla="*/ 2089355 h 2182761"/>
+              <a:gd name="connsiteX3" fmla="*/ 5177030 w 8616659"/>
+              <a:gd name="connsiteY3" fmla="*/ 2005781 h 2182761"/>
+              <a:gd name="connsiteX4" fmla="*/ 6946837 w 8616659"/>
+              <a:gd name="connsiteY4" fmla="*/ 1548581 h 2182761"/>
+              <a:gd name="connsiteX5" fmla="*/ 8616659 w 8616659"/>
+              <a:gd name="connsiteY5" fmla="*/ 2182761 h 2182761"/>
+              <a:gd name="connsiteX0" fmla="*/ 0 w 8616659"/>
+              <a:gd name="connsiteY0" fmla="*/ 0 h 2182761"/>
+              <a:gd name="connsiteX1" fmla="*/ 1466253 w 8616659"/>
+              <a:gd name="connsiteY1" fmla="*/ 1194621 h 2182761"/>
+              <a:gd name="connsiteX2" fmla="*/ 3895109 w 8616659"/>
+              <a:gd name="connsiteY2" fmla="*/ 2089355 h 2182761"/>
+              <a:gd name="connsiteX3" fmla="*/ 5177030 w 8616659"/>
+              <a:gd name="connsiteY3" fmla="*/ 2005781 h 2182761"/>
+              <a:gd name="connsiteX4" fmla="*/ 6946837 w 8616659"/>
+              <a:gd name="connsiteY4" fmla="*/ 1548581 h 2182761"/>
+              <a:gd name="connsiteX5" fmla="*/ 8616659 w 8616659"/>
+              <a:gd name="connsiteY5" fmla="*/ 2182761 h 2182761"/>
+              <a:gd name="connsiteX0" fmla="*/ 0 w 8616659"/>
+              <a:gd name="connsiteY0" fmla="*/ 0 h 2182761"/>
+              <a:gd name="connsiteX1" fmla="*/ 1466253 w 8616659"/>
+              <a:gd name="connsiteY1" fmla="*/ 1194621 h 2182761"/>
+              <a:gd name="connsiteX2" fmla="*/ 3895109 w 8616659"/>
+              <a:gd name="connsiteY2" fmla="*/ 2089355 h 2182761"/>
+              <a:gd name="connsiteX3" fmla="*/ 5177030 w 8616659"/>
+              <a:gd name="connsiteY3" fmla="*/ 2005781 h 2182761"/>
+              <a:gd name="connsiteX4" fmla="*/ 6946837 w 8616659"/>
+              <a:gd name="connsiteY4" fmla="*/ 1548581 h 2182761"/>
+              <a:gd name="connsiteX5" fmla="*/ 8616659 w 8616659"/>
+              <a:gd name="connsiteY5" fmla="*/ 2182761 h 2182761"/>
+              <a:gd name="connsiteX0" fmla="*/ 0 w 8616659"/>
+              <a:gd name="connsiteY0" fmla="*/ 0 h 2236396"/>
+              <a:gd name="connsiteX1" fmla="*/ 3895109 w 8616659"/>
+              <a:gd name="connsiteY1" fmla="*/ 2089355 h 2236396"/>
+              <a:gd name="connsiteX2" fmla="*/ 5177030 w 8616659"/>
+              <a:gd name="connsiteY2" fmla="*/ 2005781 h 2236396"/>
+              <a:gd name="connsiteX3" fmla="*/ 6946837 w 8616659"/>
+              <a:gd name="connsiteY3" fmla="*/ 1548581 h 2236396"/>
+              <a:gd name="connsiteX4" fmla="*/ 8616659 w 8616659"/>
+              <a:gd name="connsiteY4" fmla="*/ 2182761 h 2236396"/>
+              <a:gd name="connsiteX0" fmla="*/ 0 w 8616659"/>
+              <a:gd name="connsiteY0" fmla="*/ 0 h 2182761"/>
+              <a:gd name="connsiteX1" fmla="*/ 3895109 w 8616659"/>
+              <a:gd name="connsiteY1" fmla="*/ 2089355 h 2182761"/>
+              <a:gd name="connsiteX2" fmla="*/ 6946837 w 8616659"/>
+              <a:gd name="connsiteY2" fmla="*/ 1548581 h 2182761"/>
+              <a:gd name="connsiteX3" fmla="*/ 8616659 w 8616659"/>
+              <a:gd name="connsiteY3" fmla="*/ 2182761 h 2182761"/>
+              <a:gd name="connsiteX0" fmla="*/ 0 w 8705080"/>
+              <a:gd name="connsiteY0" fmla="*/ 0 h 2054424"/>
+              <a:gd name="connsiteX1" fmla="*/ 3983530 w 8705080"/>
+              <a:gd name="connsiteY1" fmla="*/ 1961018 h 2054424"/>
+              <a:gd name="connsiteX2" fmla="*/ 7035258 w 8705080"/>
+              <a:gd name="connsiteY2" fmla="*/ 1420244 h 2054424"/>
+              <a:gd name="connsiteX3" fmla="*/ 8705080 w 8705080"/>
+              <a:gd name="connsiteY3" fmla="*/ 2054424 h 2054424"/>
+              <a:gd name="connsiteX0" fmla="*/ 0 w 8705080"/>
+              <a:gd name="connsiteY0" fmla="*/ 0 h 2005164"/>
+              <a:gd name="connsiteX1" fmla="*/ 3983530 w 8705080"/>
+              <a:gd name="connsiteY1" fmla="*/ 1961018 h 2005164"/>
+              <a:gd name="connsiteX2" fmla="*/ 7035258 w 8705080"/>
+              <a:gd name="connsiteY2" fmla="*/ 1420244 h 2005164"/>
+              <a:gd name="connsiteX3" fmla="*/ 8705080 w 8705080"/>
+              <a:gd name="connsiteY3" fmla="*/ 1589203 h 2005164"/>
+              <a:gd name="connsiteX0" fmla="*/ 0 w 8705080"/>
+              <a:gd name="connsiteY0" fmla="*/ 0 h 1990889"/>
+              <a:gd name="connsiteX1" fmla="*/ 3983530 w 8705080"/>
+              <a:gd name="connsiteY1" fmla="*/ 1961018 h 1990889"/>
+              <a:gd name="connsiteX2" fmla="*/ 7278412 w 8705080"/>
+              <a:gd name="connsiteY2" fmla="*/ 1243781 h 1990889"/>
+              <a:gd name="connsiteX3" fmla="*/ 8705080 w 8705080"/>
+              <a:gd name="connsiteY3" fmla="*/ 1589203 h 1990889"/>
+              <a:gd name="connsiteX0" fmla="*/ 0 w 8705080"/>
+              <a:gd name="connsiteY0" fmla="*/ 0 h 1697836"/>
+              <a:gd name="connsiteX1" fmla="*/ 4049844 w 8705080"/>
+              <a:gd name="connsiteY1" fmla="*/ 1656218 h 1697836"/>
+              <a:gd name="connsiteX2" fmla="*/ 7278412 w 8705080"/>
+              <a:gd name="connsiteY2" fmla="*/ 1243781 h 1697836"/>
+              <a:gd name="connsiteX3" fmla="*/ 8705080 w 8705080"/>
+              <a:gd name="connsiteY3" fmla="*/ 1589203 h 1697836"/>
+              <a:gd name="connsiteX0" fmla="*/ 0 w 8705080"/>
+              <a:gd name="connsiteY0" fmla="*/ 0 h 1673867"/>
+              <a:gd name="connsiteX1" fmla="*/ 4049844 w 8705080"/>
+              <a:gd name="connsiteY1" fmla="*/ 1656218 h 1673867"/>
+              <a:gd name="connsiteX2" fmla="*/ 7720511 w 8705080"/>
+              <a:gd name="connsiteY2" fmla="*/ 922939 h 1673867"/>
+              <a:gd name="connsiteX3" fmla="*/ 8705080 w 8705080"/>
+              <a:gd name="connsiteY3" fmla="*/ 1589203 h 1673867"/>
+            </a:gdLst>
+            <a:ahLst/>
+            <a:cxnLst>
+              <a:cxn ang="0">
+                <a:pos x="connsiteX0" y="connsiteY0"/>
+              </a:cxn>
+              <a:cxn ang="0">
+                <a:pos x="connsiteX1" y="connsiteY1"/>
+              </a:cxn>
+              <a:cxn ang="0">
+                <a:pos x="connsiteX2" y="connsiteY2"/>
+              </a:cxn>
+              <a:cxn ang="0">
+                <a:pos x="connsiteX3" y="connsiteY3"/>
+              </a:cxn>
+            </a:cxnLst>
+            <a:rect l="l" t="t" r="r" b="b"/>
+            <a:pathLst>
+              <a:path w="8705080" h="1673867">
+                <a:moveTo>
+                  <a:pt x="0" y="0"/>
+                </a:moveTo>
+                <a:cubicBezTo>
+                  <a:pt x="811481" y="435282"/>
+                  <a:pt x="2763092" y="1502395"/>
+                  <a:pt x="4049844" y="1656218"/>
+                </a:cubicBezTo>
+                <a:cubicBezTo>
+                  <a:pt x="5336596" y="1810041"/>
+                  <a:pt x="6933586" y="907371"/>
+                  <a:pt x="7720511" y="922939"/>
+                </a:cubicBezTo>
+                <a:cubicBezTo>
+                  <a:pt x="8327653" y="954894"/>
+                  <a:pt x="8314862" y="1454009"/>
+                  <a:pt x="8705080" y="1589203"/>
+                </a:cubicBezTo>
+              </a:path>
+            </a:pathLst>
+          </a:custGeom>
+          <a:noFill/>
+          <a:ln w="38100">
+            <a:solidFill>
+              <a:schemeClr val="tx2"/>
+            </a:solidFill>
+          </a:ln>
+        </p:spPr>
+        <p:style>
+          <a:lnRef idx="2">
+            <a:schemeClr val="accent1">
+              <a:shade val="50000"/>
+            </a:schemeClr>
+          </a:lnRef>
+          <a:fillRef idx="1">
+            <a:schemeClr val="accent1"/>
+          </a:fillRef>
+          <a:effectRef idx="0">
+            <a:schemeClr val="accent1"/>
+          </a:effectRef>
+          <a:fontRef idx="minor">
+            <a:schemeClr val="lt1"/>
+          </a:fontRef>
+        </p:style>
+        <p:txBody>
+          <a:bodyPr rtlCol="0" anchor="ctr"/>
+          <a:lstStyle/>
+          <a:p>
+            <a:pPr algn="ctr"/>
+            <a:endParaRPr lang="en-US"/>
+          </a:p>
+        </p:txBody>
+      </p:sp>
+      <p:cxnSp>
+        <p:nvCxnSpPr>
+          <p:cNvPr id="12" name="Straight Connector 11">
+            <a:extLst>
+              <a:ext uri="{FF2B5EF4-FFF2-40B4-BE49-F238E27FC236}">
+                <a16:creationId xmlns:a16="http://schemas.microsoft.com/office/drawing/2014/main" id="{D212E302-8B16-49D9-A33F-DC17C36374D3}"/>
+              </a:ext>
+            </a:extLst>
+          </p:cNvPr>
+          <p:cNvCxnSpPr>
+            <a:cxnSpLocks/>
+            <a:endCxn id="8" idx="1"/>
+          </p:cNvCxnSpPr>
+          <p:nvPr/>
+        </p:nvCxnSpPr>
+        <p:spPr>
+          <a:xfrm flipV="1">
+            <a:off x="7955667" y="2851135"/>
+            <a:ext cx="1366690" cy="10996"/>
+          </a:xfrm>
+          <a:prstGeom prst="line">
+            <a:avLst/>
+          </a:prstGeom>
+          <a:ln w="19050">
+            <a:solidFill>
+              <a:schemeClr val="tx1"/>
+            </a:solidFill>
+            <a:prstDash val="dash"/>
+          </a:ln>
+        </p:spPr>
+        <p:style>
+          <a:lnRef idx="1">
+            <a:schemeClr val="accent1"/>
+          </a:lnRef>
+          <a:fillRef idx="0">
+            <a:schemeClr val="accent1"/>
+          </a:fillRef>
+          <a:effectRef idx="0">
+            <a:schemeClr val="accent1"/>
+          </a:effectRef>
+          <a:fontRef idx="minor">
+            <a:schemeClr val="tx1"/>
+          </a:fontRef>
+        </p:style>
+      </p:cxnSp>
+      <p:cxnSp>
+        <p:nvCxnSpPr>
+          <p:cNvPr id="14" name="Straight Connector 13">
+            <a:extLst>
+              <a:ext uri="{FF2B5EF4-FFF2-40B4-BE49-F238E27FC236}">
+                <a16:creationId xmlns:a16="http://schemas.microsoft.com/office/drawing/2014/main" id="{66D9DD78-341F-42B5-8935-63D840ECA4B0}"/>
+              </a:ext>
+            </a:extLst>
+          </p:cNvPr>
+          <p:cNvCxnSpPr/>
+          <p:nvPr/>
+        </p:nvCxnSpPr>
+        <p:spPr>
+          <a:xfrm>
+            <a:off x="7920269" y="908217"/>
+            <a:ext cx="0" cy="4144296"/>
+          </a:xfrm>
+          <a:prstGeom prst="line">
+            <a:avLst/>
+          </a:prstGeom>
+          <a:ln w="22225">
+            <a:solidFill>
+              <a:schemeClr val="tx1"/>
+            </a:solidFill>
+            <a:headEnd type="triangle" w="lg" len="lg"/>
+            <a:tailEnd type="none" w="med" len="med"/>
+          </a:ln>
+        </p:spPr>
+        <p:style>
+          <a:lnRef idx="1">
+            <a:schemeClr val="accent1"/>
+          </a:lnRef>
+          <a:fillRef idx="0">
+            <a:schemeClr val="accent1"/>
+          </a:fillRef>
+          <a:effectRef idx="0">
+            <a:schemeClr val="accent1"/>
+          </a:effectRef>
+          <a:fontRef idx="minor">
+            <a:schemeClr val="tx1"/>
+          </a:fontRef>
+        </p:style>
+      </p:cxnSp>
+      <p:cxnSp>
+        <p:nvCxnSpPr>
+          <p:cNvPr id="16" name="Straight Connector 15">
+            <a:extLst>
+              <a:ext uri="{FF2B5EF4-FFF2-40B4-BE49-F238E27FC236}">
+                <a16:creationId xmlns:a16="http://schemas.microsoft.com/office/drawing/2014/main" id="{D92AE430-F1EE-468C-A70D-D80E6CD6784C}"/>
+              </a:ext>
+            </a:extLst>
+          </p:cNvPr>
+          <p:cNvCxnSpPr>
+            <a:cxnSpLocks/>
+          </p:cNvCxnSpPr>
+          <p:nvPr/>
+        </p:nvCxnSpPr>
+        <p:spPr>
+          <a:xfrm>
+            <a:off x="7944851" y="2673290"/>
+            <a:ext cx="1106752" cy="17209"/>
+          </a:xfrm>
+          <a:prstGeom prst="line">
+            <a:avLst/>
+          </a:prstGeom>
+          <a:ln w="19050">
+            <a:solidFill>
+              <a:schemeClr val="tx1"/>
+            </a:solidFill>
+            <a:prstDash val="dash"/>
+          </a:ln>
+        </p:spPr>
+        <p:style>
+          <a:lnRef idx="1">
+            <a:schemeClr val="accent1"/>
+          </a:lnRef>
+          <a:fillRef idx="0">
+            <a:schemeClr val="accent1"/>
+          </a:fillRef>
+          <a:effectRef idx="0">
+            <a:schemeClr val="accent1"/>
+          </a:effectRef>
+          <a:fontRef idx="minor">
+            <a:schemeClr val="tx1"/>
+          </a:fontRef>
+        </p:style>
+      </p:cxnSp>
+      <p:sp>
+        <p:nvSpPr>
+          <p:cNvPr id="22" name="Arc 21">
+            <a:extLst>
+              <a:ext uri="{FF2B5EF4-FFF2-40B4-BE49-F238E27FC236}">
+                <a16:creationId xmlns:a16="http://schemas.microsoft.com/office/drawing/2014/main" id="{53D8F225-80A1-4BCE-A2F0-409733168AB9}"/>
+              </a:ext>
+            </a:extLst>
+          </p:cNvPr>
+          <p:cNvSpPr/>
+          <p:nvPr/>
+        </p:nvSpPr>
+        <p:spPr>
+          <a:xfrm rot="18891103">
+            <a:off x="5265875" y="5083993"/>
+            <a:ext cx="5279294" cy="5279294"/>
+          </a:xfrm>
+          <a:prstGeom prst="arc">
+            <a:avLst/>
+          </a:prstGeom>
+          <a:noFill/>
+          <a:ln w="88900">
+            <a:solidFill>
+              <a:schemeClr val="accent2">
+                <a:lumMod val="75000"/>
+              </a:schemeClr>
+            </a:solidFill>
+          </a:ln>
+        </p:spPr>
+        <p:style>
+          <a:lnRef idx="1">
+            <a:schemeClr val="accent1"/>
+          </a:lnRef>
+          <a:fillRef idx="0">
+            <a:schemeClr val="accent1"/>
+          </a:fillRef>
+          <a:effectRef idx="0">
+            <a:schemeClr val="accent1"/>
+          </a:effectRef>
+          <a:fontRef idx="minor">
+            <a:schemeClr val="tx1"/>
+          </a:fontRef>
+        </p:style>
+        <p:txBody>
+          <a:bodyPr rtlCol="0" anchor="ctr"/>
+          <a:lstStyle/>
+          <a:p>
+            <a:pPr algn="ctr"/>
+            <a:endParaRPr lang="en-US"/>
+          </a:p>
+        </p:txBody>
+      </p:sp>
+      <p:sp>
+        <p:nvSpPr>
+          <p:cNvPr id="24" name="TextBox 23">
+            <a:extLst>
+              <a:ext uri="{FF2B5EF4-FFF2-40B4-BE49-F238E27FC236}">
+                <a16:creationId xmlns:a16="http://schemas.microsoft.com/office/drawing/2014/main" id="{A592BFD6-EB81-4BED-AC61-BFD618415C20}"/>
+              </a:ext>
+            </a:extLst>
+          </p:cNvPr>
+          <p:cNvSpPr txBox="1"/>
+          <p:nvPr/>
+        </p:nvSpPr>
+        <p:spPr>
+          <a:xfrm>
+            <a:off x="2382099" y="459317"/>
+            <a:ext cx="2785186" cy="954107"/>
+          </a:xfrm>
+          <a:prstGeom prst="rect">
+            <a:avLst/>
+          </a:prstGeom>
+          <a:noFill/>
+        </p:spPr>
+        <p:txBody>
+          <a:bodyPr wrap="none" rtlCol="0">
+            <a:spAutoFit/>
+          </a:bodyPr>
+          <a:lstStyle/>
+          <a:p>
+            <a:r>
+              <a:rPr lang="en-US" sz="2800" dirty="0"/>
+              <a:t>State distribution </a:t>
+            </a:r>
+          </a:p>
+          <a:p>
+            <a:r>
+              <a:rPr lang="en-US" sz="2800" dirty="0"/>
+              <a:t>at entry interface</a:t>
+            </a:r>
+          </a:p>
+        </p:txBody>
+      </p:sp>
+      <p:sp>
+        <p:nvSpPr>
+          <p:cNvPr id="25" name="TextBox 24">
+            <a:extLst>
+              <a:ext uri="{FF2B5EF4-FFF2-40B4-BE49-F238E27FC236}">
+                <a16:creationId xmlns:a16="http://schemas.microsoft.com/office/drawing/2014/main" id="{F8EB0CB4-9760-40A2-AEE1-D0FA2723F227}"/>
+              </a:ext>
+            </a:extLst>
+          </p:cNvPr>
+          <p:cNvSpPr txBox="1"/>
+          <p:nvPr/>
+        </p:nvSpPr>
+        <p:spPr>
+          <a:xfrm>
+            <a:off x="6882847" y="5334140"/>
+            <a:ext cx="2183996" cy="461665"/>
+          </a:xfrm>
+          <a:prstGeom prst="rect">
+            <a:avLst/>
+          </a:prstGeom>
+          <a:noFill/>
+        </p:spPr>
+        <p:txBody>
+          <a:bodyPr wrap="none" rtlCol="0">
+            <a:spAutoFit/>
+          </a:bodyPr>
+          <a:lstStyle/>
+          <a:p>
+            <a:r>
+              <a:rPr lang="en-US" sz="2400" dirty="0"/>
+              <a:t>Martian Surface</a:t>
+            </a:r>
+          </a:p>
+        </p:txBody>
+      </p:sp>
+      <p:sp>
+        <p:nvSpPr>
+          <p:cNvPr id="27" name="TextBox 26">
+            <a:extLst>
+              <a:ext uri="{FF2B5EF4-FFF2-40B4-BE49-F238E27FC236}">
+                <a16:creationId xmlns:a16="http://schemas.microsoft.com/office/drawing/2014/main" id="{9438317C-FB4A-4576-8AB5-5A448DC9649B}"/>
+              </a:ext>
+            </a:extLst>
+          </p:cNvPr>
+          <p:cNvSpPr txBox="1"/>
+          <p:nvPr/>
+        </p:nvSpPr>
+        <p:spPr>
+          <a:xfrm>
+            <a:off x="9410525" y="1986305"/>
+            <a:ext cx="1894051" cy="1200329"/>
+          </a:xfrm>
+          <a:prstGeom prst="rect">
+            <a:avLst/>
+          </a:prstGeom>
+          <a:noFill/>
+        </p:spPr>
+        <p:txBody>
+          <a:bodyPr wrap="square" rtlCol="0">
+            <a:spAutoFit/>
+          </a:bodyPr>
+          <a:lstStyle/>
+          <a:p>
+            <a:r>
+              <a:rPr lang="en-US" sz="2400" dirty="0"/>
+              <a:t>Terminal Altitude Distributions</a:t>
+            </a:r>
+          </a:p>
+        </p:txBody>
+      </p:sp>
+      <p:sp>
+        <p:nvSpPr>
+          <p:cNvPr id="28" name="TextBox 27">
+            <a:extLst>
+              <a:ext uri="{FF2B5EF4-FFF2-40B4-BE49-F238E27FC236}">
+                <a16:creationId xmlns:a16="http://schemas.microsoft.com/office/drawing/2014/main" id="{64D506B2-A438-42B3-9AFB-ECF214D50AD0}"/>
+              </a:ext>
+            </a:extLst>
+          </p:cNvPr>
+          <p:cNvSpPr txBox="1"/>
+          <p:nvPr/>
+        </p:nvSpPr>
+        <p:spPr>
+          <a:xfrm>
+            <a:off x="7944851" y="632095"/>
+            <a:ext cx="1186543" cy="461665"/>
+          </a:xfrm>
+          <a:prstGeom prst="rect">
+            <a:avLst/>
+          </a:prstGeom>
+          <a:noFill/>
+        </p:spPr>
+        <p:txBody>
+          <a:bodyPr wrap="none" rtlCol="0">
+            <a:spAutoFit/>
+          </a:bodyPr>
+          <a:lstStyle/>
+          <a:p>
+            <a:r>
+              <a:rPr lang="en-US" sz="2400" dirty="0"/>
+              <a:t>Altitude</a:t>
+            </a:r>
+          </a:p>
+        </p:txBody>
+      </p:sp>
+      <p:grpSp>
+        <p:nvGrpSpPr>
+          <p:cNvPr id="29" name="Group 28">
+            <a:extLst>
+              <a:ext uri="{FF2B5EF4-FFF2-40B4-BE49-F238E27FC236}">
+                <a16:creationId xmlns:a16="http://schemas.microsoft.com/office/drawing/2014/main" id="{ADCBDEFE-691A-4FFF-A8AF-E13B023FDC49}"/>
+              </a:ext>
+            </a:extLst>
+          </p:cNvPr>
+          <p:cNvGrpSpPr/>
+          <p:nvPr/>
+        </p:nvGrpSpPr>
+        <p:grpSpPr>
+          <a:xfrm rot="18643004">
+            <a:off x="1223364" y="1039188"/>
+            <a:ext cx="823735" cy="576545"/>
+            <a:chOff x="8966577" y="4136717"/>
+            <a:chExt cx="1713015" cy="1198967"/>
+          </a:xfrm>
+          <a:gradFill>
+            <a:gsLst>
+              <a:gs pos="0">
+                <a:schemeClr val="accent1">
+                  <a:lumMod val="5000"/>
+                  <a:lumOff val="95000"/>
+                </a:schemeClr>
+              </a:gs>
+              <a:gs pos="74000">
+                <a:schemeClr val="accent1">
+                  <a:lumMod val="45000"/>
+                  <a:lumOff val="55000"/>
+                </a:schemeClr>
+              </a:gs>
+              <a:gs pos="83000">
+                <a:schemeClr val="accent1">
+                  <a:lumMod val="45000"/>
+                  <a:lumOff val="55000"/>
+                </a:schemeClr>
+              </a:gs>
+              <a:gs pos="100000">
+                <a:schemeClr val="accent1">
+                  <a:lumMod val="30000"/>
+                  <a:lumOff val="70000"/>
+                </a:schemeClr>
+              </a:gs>
+            </a:gsLst>
+            <a:lin ang="5400000" scaled="1"/>
+          </a:gradFill>
+        </p:grpSpPr>
+        <p:sp>
+          <p:nvSpPr>
+            <p:cNvPr id="30" name="Isosceles Triangle 29">
+              <a:extLst>
+                <a:ext uri="{FF2B5EF4-FFF2-40B4-BE49-F238E27FC236}">
+                  <a16:creationId xmlns:a16="http://schemas.microsoft.com/office/drawing/2014/main" id="{094853E4-2A7C-4480-99BC-52E0E58CC951}"/>
+                </a:ext>
+              </a:extLst>
+            </p:cNvPr>
+            <p:cNvSpPr/>
+            <p:nvPr/>
+          </p:nvSpPr>
+          <p:spPr>
+            <a:xfrm>
+              <a:off x="9413823" y="4136717"/>
+              <a:ext cx="815174" cy="181640"/>
+            </a:xfrm>
+            <a:prstGeom prst="triangle">
+              <a:avLst/>
+            </a:prstGeom>
+            <a:grpFill/>
+            <a:ln w="25400">
+              <a:solidFill>
+                <a:schemeClr val="tx1"/>
+              </a:solidFill>
+            </a:ln>
+          </p:spPr>
+          <p:style>
+            <a:lnRef idx="2">
+              <a:schemeClr val="accent1">
+                <a:shade val="50000"/>
+              </a:schemeClr>
+            </a:lnRef>
+            <a:fillRef idx="1">
+              <a:schemeClr val="accent1"/>
+            </a:fillRef>
+            <a:effectRef idx="0">
+              <a:schemeClr val="accent1"/>
+            </a:effectRef>
+            <a:fontRef idx="minor">
+              <a:schemeClr val="lt1"/>
+            </a:fontRef>
+          </p:style>
+          <p:txBody>
+            <a:bodyPr rtlCol="0" anchor="ctr"/>
+            <a:lstStyle/>
+            <a:p>
+              <a:pPr algn="ctr"/>
+              <a:endParaRPr lang="en-US"/>
+            </a:p>
+          </p:txBody>
+        </p:sp>
+        <p:sp>
+          <p:nvSpPr>
+            <p:cNvPr id="31" name="Flowchart: Delay 30">
+              <a:extLst>
+                <a:ext uri="{FF2B5EF4-FFF2-40B4-BE49-F238E27FC236}">
+                  <a16:creationId xmlns:a16="http://schemas.microsoft.com/office/drawing/2014/main" id="{09265F01-94F1-447E-BCD4-3C8A53A3B853}"/>
+                </a:ext>
+              </a:extLst>
+            </p:cNvPr>
+            <p:cNvSpPr/>
+            <p:nvPr/>
+          </p:nvSpPr>
+          <p:spPr>
+            <a:xfrm rot="5400000">
+              <a:off x="9700276" y="4002117"/>
+              <a:ext cx="245617" cy="1713015"/>
+            </a:xfrm>
+            <a:prstGeom prst="flowChartDelay">
+              <a:avLst/>
+            </a:prstGeom>
+            <a:grpFill/>
+            <a:ln w="22225">
+              <a:solidFill>
+                <a:schemeClr val="tx1"/>
+              </a:solidFill>
+            </a:ln>
+          </p:spPr>
+          <p:style>
+            <a:lnRef idx="2">
+              <a:schemeClr val="accent1">
+                <a:shade val="50000"/>
+              </a:schemeClr>
+            </a:lnRef>
+            <a:fillRef idx="1">
+              <a:schemeClr val="accent1"/>
+            </a:fillRef>
+            <a:effectRef idx="0">
+              <a:schemeClr val="accent1"/>
+            </a:effectRef>
+            <a:fontRef idx="minor">
+              <a:schemeClr val="lt1"/>
+            </a:fontRef>
+          </p:style>
+          <p:txBody>
+            <a:bodyPr rtlCol="0" anchor="ctr"/>
+            <a:lstStyle/>
+            <a:p>
+              <a:pPr algn="ctr"/>
+              <a:endParaRPr lang="en-US"/>
+            </a:p>
+          </p:txBody>
+        </p:sp>
+        <p:sp>
+          <p:nvSpPr>
+            <p:cNvPr id="32" name="Diagonal Stripe 31">
+              <a:extLst>
+                <a:ext uri="{FF2B5EF4-FFF2-40B4-BE49-F238E27FC236}">
+                  <a16:creationId xmlns:a16="http://schemas.microsoft.com/office/drawing/2014/main" id="{F2E9A081-4FA7-4459-B4DC-46911436213A}"/>
+                </a:ext>
+              </a:extLst>
+            </p:cNvPr>
+            <p:cNvSpPr/>
+            <p:nvPr/>
+          </p:nvSpPr>
+          <p:spPr>
+            <a:xfrm rot="2698873">
+              <a:off x="9223890" y="4145934"/>
+              <a:ext cx="1204654" cy="1189750"/>
+            </a:xfrm>
+            <a:prstGeom prst="diagStripe">
+              <a:avLst/>
+            </a:prstGeom>
+            <a:grpFill/>
+            <a:ln w="25400">
+              <a:solidFill>
+                <a:schemeClr val="tx1"/>
+              </a:solidFill>
+            </a:ln>
+          </p:spPr>
+          <p:style>
+            <a:lnRef idx="2">
+              <a:schemeClr val="accent1">
+                <a:shade val="50000"/>
+              </a:schemeClr>
+            </a:lnRef>
+            <a:fillRef idx="1">
+              <a:schemeClr val="accent1"/>
+            </a:fillRef>
+            <a:effectRef idx="0">
+              <a:schemeClr val="accent1"/>
+            </a:effectRef>
+            <a:fontRef idx="minor">
+              <a:schemeClr val="lt1"/>
+            </a:fontRef>
+          </p:style>
+          <p:txBody>
+            <a:bodyPr rtlCol="0" anchor="ctr"/>
+            <a:lstStyle/>
+            <a:p>
+              <a:pPr algn="ctr"/>
+              <a:endParaRPr lang="en-US">
+                <a:solidFill>
+                  <a:schemeClr val="tx1"/>
+                </a:solidFill>
+              </a:endParaRPr>
+            </a:p>
+          </p:txBody>
+        </p:sp>
+      </p:grpSp>
+      <p:sp>
+        <p:nvSpPr>
+          <p:cNvPr id="19" name="Freeform: Shape 18">
+            <a:extLst>
+              <a:ext uri="{FF2B5EF4-FFF2-40B4-BE49-F238E27FC236}">
+                <a16:creationId xmlns:a16="http://schemas.microsoft.com/office/drawing/2014/main" id="{7D80AD1F-36AB-4458-A246-6DE6C1472133}"/>
+              </a:ext>
+            </a:extLst>
+          </p:cNvPr>
+          <p:cNvSpPr/>
+          <p:nvPr/>
+        </p:nvSpPr>
+        <p:spPr>
+          <a:xfrm flipV="1">
+            <a:off x="7316221" y="4306043"/>
+            <a:ext cx="1143813" cy="757827"/>
+          </a:xfrm>
+          <a:custGeom>
+            <a:avLst/>
+            <a:gdLst>
+              <a:gd name="connsiteX0" fmla="*/ 0 w 2492478"/>
+              <a:gd name="connsiteY0" fmla="*/ 0 h 0"/>
+              <a:gd name="connsiteX1" fmla="*/ 2492478 w 2492478"/>
+              <a:gd name="connsiteY1" fmla="*/ 0 h 0"/>
+              <a:gd name="connsiteX0" fmla="*/ 0 w 10000"/>
+              <a:gd name="connsiteY0" fmla="*/ 0 h 36190"/>
+              <a:gd name="connsiteX1" fmla="*/ 5858 w 10000"/>
+              <a:gd name="connsiteY1" fmla="*/ 36190 h 36190"/>
+              <a:gd name="connsiteX2" fmla="*/ 10000 w 10000"/>
+              <a:gd name="connsiteY2" fmla="*/ 0 h 36190"/>
+              <a:gd name="connsiteX0" fmla="*/ 0 w 10000"/>
+              <a:gd name="connsiteY0" fmla="*/ 0 h 36528"/>
+              <a:gd name="connsiteX1" fmla="*/ 5858 w 10000"/>
+              <a:gd name="connsiteY1" fmla="*/ 36190 h 36528"/>
+              <a:gd name="connsiteX2" fmla="*/ 7929 w 10000"/>
+              <a:gd name="connsiteY2" fmla="*/ 19524 h 36528"/>
+              <a:gd name="connsiteX3" fmla="*/ 10000 w 10000"/>
+              <a:gd name="connsiteY3" fmla="*/ 0 h 36528"/>
+              <a:gd name="connsiteX0" fmla="*/ 0 w 10000"/>
+              <a:gd name="connsiteY0" fmla="*/ 0 h 36528"/>
+              <a:gd name="connsiteX1" fmla="*/ 5325 w 10000"/>
+              <a:gd name="connsiteY1" fmla="*/ 36190 h 36528"/>
+              <a:gd name="connsiteX2" fmla="*/ 7929 w 10000"/>
+              <a:gd name="connsiteY2" fmla="*/ 19524 h 36528"/>
+              <a:gd name="connsiteX3" fmla="*/ 10000 w 10000"/>
+              <a:gd name="connsiteY3" fmla="*/ 0 h 36528"/>
+            </a:gdLst>
+            <a:ahLst/>
+            <a:cxnLst>
+              <a:cxn ang="0">
+                <a:pos x="connsiteX0" y="connsiteY0"/>
+              </a:cxn>
+              <a:cxn ang="0">
+                <a:pos x="connsiteX1" y="connsiteY1"/>
+              </a:cxn>
+              <a:cxn ang="0">
+                <a:pos x="connsiteX2" y="connsiteY2"/>
+              </a:cxn>
+              <a:cxn ang="0">
+                <a:pos x="connsiteX3" y="connsiteY3"/>
+              </a:cxn>
+            </a:cxnLst>
+            <a:rect l="l" t="t" r="r" b="b"/>
+            <a:pathLst>
+              <a:path w="10000" h="36528">
+                <a:moveTo>
+                  <a:pt x="0" y="0"/>
+                </a:moveTo>
+                <a:cubicBezTo>
+                  <a:pt x="1677" y="0"/>
+                  <a:pt x="3648" y="36190"/>
+                  <a:pt x="5325" y="36190"/>
+                </a:cubicBezTo>
+                <a:cubicBezTo>
+                  <a:pt x="6390" y="38809"/>
+                  <a:pt x="7239" y="25556"/>
+                  <a:pt x="7929" y="19524"/>
+                </a:cubicBezTo>
+                <a:cubicBezTo>
+                  <a:pt x="8619" y="13492"/>
+                  <a:pt x="9398" y="2619"/>
+                  <a:pt x="10000" y="0"/>
+                </a:cubicBezTo>
+              </a:path>
+            </a:pathLst>
+          </a:custGeom>
+          <a:noFill/>
+          <a:ln w="31750">
+            <a:solidFill>
+              <a:srgbClr val="FF0000"/>
+            </a:solidFill>
+          </a:ln>
+        </p:spPr>
+        <p:style>
+          <a:lnRef idx="2">
+            <a:schemeClr val="accent1">
+              <a:shade val="50000"/>
+            </a:schemeClr>
+          </a:lnRef>
+          <a:fillRef idx="1">
+            <a:schemeClr val="accent1"/>
+          </a:fillRef>
+          <a:effectRef idx="0">
+            <a:schemeClr val="accent1"/>
+          </a:effectRef>
+          <a:fontRef idx="minor">
+            <a:schemeClr val="lt1"/>
+          </a:fontRef>
+        </p:style>
+        <p:txBody>
+          <a:bodyPr rtlCol="0" anchor="ctr"/>
+          <a:lstStyle/>
+          <a:p>
+            <a:pPr algn="ctr"/>
+            <a:endParaRPr lang="en-US"/>
+          </a:p>
+        </p:txBody>
+      </p:sp>
+      <p:sp>
+        <p:nvSpPr>
+          <p:cNvPr id="20" name="Freeform: Shape 19">
+            <a:extLst>
+              <a:ext uri="{FF2B5EF4-FFF2-40B4-BE49-F238E27FC236}">
+                <a16:creationId xmlns:a16="http://schemas.microsoft.com/office/drawing/2014/main" id="{22D0991E-54C4-4E50-AB5A-C4B3808F2FE8}"/>
+              </a:ext>
+            </a:extLst>
+          </p:cNvPr>
+          <p:cNvSpPr/>
+          <p:nvPr/>
+        </p:nvSpPr>
+        <p:spPr>
+          <a:xfrm flipV="1">
+            <a:off x="7538182" y="4116174"/>
+            <a:ext cx="750540" cy="933155"/>
+          </a:xfrm>
+          <a:custGeom>
+            <a:avLst/>
+            <a:gdLst>
+              <a:gd name="connsiteX0" fmla="*/ 0 w 2492478"/>
+              <a:gd name="connsiteY0" fmla="*/ 0 h 0"/>
+              <a:gd name="connsiteX1" fmla="*/ 2492478 w 2492478"/>
+              <a:gd name="connsiteY1" fmla="*/ 0 h 0"/>
+              <a:gd name="connsiteX0" fmla="*/ 0 w 10000"/>
+              <a:gd name="connsiteY0" fmla="*/ 0 h 36190"/>
+              <a:gd name="connsiteX1" fmla="*/ 5858 w 10000"/>
+              <a:gd name="connsiteY1" fmla="*/ 36190 h 36190"/>
+              <a:gd name="connsiteX2" fmla="*/ 10000 w 10000"/>
+              <a:gd name="connsiteY2" fmla="*/ 0 h 36190"/>
+              <a:gd name="connsiteX0" fmla="*/ 0 w 10000"/>
+              <a:gd name="connsiteY0" fmla="*/ 0 h 36528"/>
+              <a:gd name="connsiteX1" fmla="*/ 5858 w 10000"/>
+              <a:gd name="connsiteY1" fmla="*/ 36190 h 36528"/>
+              <a:gd name="connsiteX2" fmla="*/ 7929 w 10000"/>
+              <a:gd name="connsiteY2" fmla="*/ 19524 h 36528"/>
+              <a:gd name="connsiteX3" fmla="*/ 10000 w 10000"/>
+              <a:gd name="connsiteY3" fmla="*/ 0 h 36528"/>
+              <a:gd name="connsiteX0" fmla="*/ 0 w 10000"/>
+              <a:gd name="connsiteY0" fmla="*/ 0 h 36528"/>
+              <a:gd name="connsiteX1" fmla="*/ 5325 w 10000"/>
+              <a:gd name="connsiteY1" fmla="*/ 36190 h 36528"/>
+              <a:gd name="connsiteX2" fmla="*/ 7929 w 10000"/>
+              <a:gd name="connsiteY2" fmla="*/ 19524 h 36528"/>
+              <a:gd name="connsiteX3" fmla="*/ 10000 w 10000"/>
+              <a:gd name="connsiteY3" fmla="*/ 0 h 36528"/>
+              <a:gd name="connsiteX0" fmla="*/ 0 w 10000"/>
+              <a:gd name="connsiteY0" fmla="*/ 0 h 44979"/>
+              <a:gd name="connsiteX1" fmla="*/ 5219 w 10000"/>
+              <a:gd name="connsiteY1" fmla="*/ 44762 h 44979"/>
+              <a:gd name="connsiteX2" fmla="*/ 7929 w 10000"/>
+              <a:gd name="connsiteY2" fmla="*/ 19524 h 44979"/>
+              <a:gd name="connsiteX3" fmla="*/ 10000 w 10000"/>
+              <a:gd name="connsiteY3" fmla="*/ 0 h 44979"/>
+            </a:gdLst>
+            <a:ahLst/>
+            <a:cxnLst>
+              <a:cxn ang="0">
+                <a:pos x="connsiteX0" y="connsiteY0"/>
+              </a:cxn>
+              <a:cxn ang="0">
+                <a:pos x="connsiteX1" y="connsiteY1"/>
+              </a:cxn>
+              <a:cxn ang="0">
+                <a:pos x="connsiteX2" y="connsiteY2"/>
+              </a:cxn>
+              <a:cxn ang="0">
+                <a:pos x="connsiteX3" y="connsiteY3"/>
+              </a:cxn>
+            </a:cxnLst>
+            <a:rect l="l" t="t" r="r" b="b"/>
+            <a:pathLst>
+              <a:path w="10000" h="44979">
+                <a:moveTo>
+                  <a:pt x="0" y="0"/>
+                </a:moveTo>
+                <a:cubicBezTo>
+                  <a:pt x="1677" y="0"/>
+                  <a:pt x="3542" y="44762"/>
+                  <a:pt x="5219" y="44762"/>
+                </a:cubicBezTo>
+                <a:cubicBezTo>
+                  <a:pt x="6284" y="47381"/>
+                  <a:pt x="7239" y="25556"/>
+                  <a:pt x="7929" y="19524"/>
+                </a:cubicBezTo>
+                <a:cubicBezTo>
+                  <a:pt x="8619" y="13492"/>
+                  <a:pt x="9398" y="2619"/>
+                  <a:pt x="10000" y="0"/>
+                </a:cubicBezTo>
+              </a:path>
+            </a:pathLst>
+          </a:custGeom>
+          <a:noFill/>
+          <a:ln w="31750">
+            <a:solidFill>
+              <a:schemeClr val="tx2"/>
+            </a:solidFill>
+          </a:ln>
+        </p:spPr>
+        <p:style>
+          <a:lnRef idx="2">
+            <a:schemeClr val="accent1">
+              <a:shade val="50000"/>
+            </a:schemeClr>
+          </a:lnRef>
+          <a:fillRef idx="1">
+            <a:schemeClr val="accent1"/>
+          </a:fillRef>
+          <a:effectRef idx="0">
+            <a:schemeClr val="accent1"/>
+          </a:effectRef>
+          <a:fontRef idx="minor">
+            <a:schemeClr val="lt1"/>
+          </a:fontRef>
+        </p:style>
+        <p:txBody>
+          <a:bodyPr rtlCol="0" anchor="ctr"/>
+          <a:lstStyle/>
+          <a:p>
+            <a:pPr algn="ctr"/>
+            <a:endParaRPr lang="en-US"/>
+          </a:p>
+        </p:txBody>
+      </p:sp>
+      <p:sp>
+        <p:nvSpPr>
+          <p:cNvPr id="21" name="TextBox 20">
+            <a:extLst>
+              <a:ext uri="{FF2B5EF4-FFF2-40B4-BE49-F238E27FC236}">
+                <a16:creationId xmlns:a16="http://schemas.microsoft.com/office/drawing/2014/main" id="{8B3DED73-C7C5-48EE-89B9-5BDA209B2EDA}"/>
+              </a:ext>
+            </a:extLst>
+          </p:cNvPr>
+          <p:cNvSpPr txBox="1"/>
+          <p:nvPr/>
+        </p:nvSpPr>
+        <p:spPr>
+          <a:xfrm>
+            <a:off x="5498371" y="3898442"/>
+            <a:ext cx="1894051" cy="1200329"/>
+          </a:xfrm>
+          <a:prstGeom prst="rect">
+            <a:avLst/>
+          </a:prstGeom>
+          <a:noFill/>
+        </p:spPr>
+        <p:txBody>
+          <a:bodyPr wrap="square" rtlCol="0">
+            <a:spAutoFit/>
+          </a:bodyPr>
+          <a:lstStyle/>
+          <a:p>
+            <a:r>
+              <a:rPr lang="en-US" sz="2400" dirty="0"/>
+              <a:t>Terminal Range Distributions</a:t>
+            </a:r>
+          </a:p>
+        </p:txBody>
+      </p:sp>
+      <p:cxnSp>
+        <p:nvCxnSpPr>
+          <p:cNvPr id="23" name="Straight Connector 22">
+            <a:extLst>
+              <a:ext uri="{FF2B5EF4-FFF2-40B4-BE49-F238E27FC236}">
+                <a16:creationId xmlns:a16="http://schemas.microsoft.com/office/drawing/2014/main" id="{1D8955BC-2703-47D1-A58B-5D62C15BBB4F}"/>
+              </a:ext>
+            </a:extLst>
+          </p:cNvPr>
+          <p:cNvCxnSpPr>
+            <a:cxnSpLocks/>
+          </p:cNvCxnSpPr>
+          <p:nvPr/>
+        </p:nvCxnSpPr>
+        <p:spPr>
+          <a:xfrm flipH="1">
+            <a:off x="7941229" y="5047829"/>
+            <a:ext cx="2393764" cy="0"/>
+          </a:xfrm>
+          <a:prstGeom prst="line">
+            <a:avLst/>
+          </a:prstGeom>
+          <a:ln w="22225">
+            <a:solidFill>
+              <a:schemeClr val="tx1"/>
+            </a:solidFill>
+            <a:headEnd type="triangle" w="lg" len="lg"/>
+            <a:tailEnd type="none" w="med" len="med"/>
+          </a:ln>
+        </p:spPr>
+        <p:style>
+          <a:lnRef idx="1">
+            <a:schemeClr val="accent1"/>
+          </a:lnRef>
+          <a:fillRef idx="0">
+            <a:schemeClr val="accent1"/>
+          </a:fillRef>
+          <a:effectRef idx="0">
+            <a:schemeClr val="accent1"/>
+          </a:effectRef>
+          <a:fontRef idx="minor">
+            <a:schemeClr val="tx1"/>
+          </a:fontRef>
+        </p:style>
+      </p:cxnSp>
+      <p:sp>
+        <p:nvSpPr>
+          <p:cNvPr id="3" name="Rectangle 2">
+            <a:extLst>
+              <a:ext uri="{FF2B5EF4-FFF2-40B4-BE49-F238E27FC236}">
+                <a16:creationId xmlns:a16="http://schemas.microsoft.com/office/drawing/2014/main" id="{FF1110AC-4887-4767-BBDF-C2A3BD57A548}"/>
+              </a:ext>
+            </a:extLst>
+          </p:cNvPr>
+          <p:cNvSpPr/>
+          <p:nvPr/>
+        </p:nvSpPr>
+        <p:spPr>
+          <a:xfrm>
+            <a:off x="463818" y="300010"/>
+            <a:ext cx="10685445" cy="5649773"/>
+          </a:xfrm>
+          <a:prstGeom prst="rect">
+            <a:avLst/>
+          </a:prstGeom>
+          <a:noFill/>
+          <a:ln>
+            <a:solidFill>
+              <a:schemeClr val="tx1"/>
+            </a:solidFill>
+          </a:ln>
+        </p:spPr>
+        <p:style>
+          <a:lnRef idx="2">
+            <a:schemeClr val="accent1">
+              <a:shade val="50000"/>
+            </a:schemeClr>
+          </a:lnRef>
+          <a:fillRef idx="1">
+            <a:schemeClr val="accent1"/>
+          </a:fillRef>
+          <a:effectRef idx="0">
+            <a:schemeClr val="accent1"/>
+          </a:effectRef>
+          <a:fontRef idx="minor">
+            <a:schemeClr val="lt1"/>
+          </a:fontRef>
+        </p:style>
+        <p:txBody>
+          <a:bodyPr rtlCol="0" anchor="ctr"/>
+          <a:lstStyle/>
+          <a:p>
+            <a:pPr algn="ctr"/>
+            <a:endParaRPr lang="en-US"/>
+          </a:p>
+        </p:txBody>
+      </p:sp>
+      <p:sp>
+        <p:nvSpPr>
+          <p:cNvPr id="26" name="TextBox 25">
+            <a:extLst>
+              <a:ext uri="{FF2B5EF4-FFF2-40B4-BE49-F238E27FC236}">
+                <a16:creationId xmlns:a16="http://schemas.microsoft.com/office/drawing/2014/main" id="{3AD37B21-9EEF-4569-8F84-7CD5E4C2DE3D}"/>
+              </a:ext>
+            </a:extLst>
+          </p:cNvPr>
+          <p:cNvSpPr txBox="1"/>
+          <p:nvPr/>
+        </p:nvSpPr>
+        <p:spPr>
+          <a:xfrm>
+            <a:off x="10101453" y="5047829"/>
+            <a:ext cx="956352" cy="461665"/>
+          </a:xfrm>
+          <a:prstGeom prst="rect">
+            <a:avLst/>
+          </a:prstGeom>
+          <a:noFill/>
+        </p:spPr>
+        <p:txBody>
+          <a:bodyPr wrap="none" rtlCol="0">
+            <a:spAutoFit/>
+          </a:bodyPr>
+          <a:lstStyle/>
+          <a:p>
+            <a:r>
+              <a:rPr lang="en-US" sz="2400" dirty="0"/>
+              <a:t>Range</a:t>
+            </a:r>
+          </a:p>
+        </p:txBody>
+      </p:sp>
+    </p:spTree>
+    <p:extLst>
+      <p:ext uri="{BB962C8B-B14F-4D97-AF65-F5344CB8AC3E}">
+        <p14:creationId xmlns:p14="http://schemas.microsoft.com/office/powerpoint/2010/main" val="4160281"/>
+      </p:ext>
+    </p:extLst>
+  </p:cSld>
+  <p:clrMapOvr>
+    <a:masterClrMapping/>
+  </p:clrMapOvr>
+</p:sld>
+</file>
+
+<file path=ppt/slides/slide5.xml><?xml version="1.0" encoding="utf-8"?>
+<p:sld xmlns:a="http://schemas.openxmlformats.org/drawingml/2006/main" xmlns:r="http://schemas.openxmlformats.org/officeDocument/2006/relationships" xmlns:p="http://schemas.openxmlformats.org/presentationml/2006/main">
+  <p:cSld>
+    <p:spTree>
+      <p:nvGrpSpPr>
+        <p:cNvPr id="1" name=""/>
+        <p:cNvGrpSpPr/>
+        <p:nvPr/>
+      </p:nvGrpSpPr>
+      <p:grpSpPr>
+        <a:xfrm>
+          <a:off x="0" y="0"/>
+          <a:ext cx="0" cy="0"/>
+          <a:chOff x="0" y="0"/>
+          <a:chExt cx="0" cy="0"/>
+        </a:xfrm>
+      </p:grpSpPr>
+      <p:graphicFrame>
+        <p:nvGraphicFramePr>
+          <p:cNvPr id="2" name="Table 2">
+            <a:extLst>
+              <a:ext uri="{FF2B5EF4-FFF2-40B4-BE49-F238E27FC236}">
+                <a16:creationId xmlns:a16="http://schemas.microsoft.com/office/drawing/2014/main" id="{50683AAC-C428-45B9-8C5F-69C8298D119F}"/>
+              </a:ext>
+            </a:extLst>
+          </p:cNvPr>
+          <p:cNvGraphicFramePr>
+            <a:graphicFrameLocks noGrp="1"/>
+          </p:cNvGraphicFramePr>
+          <p:nvPr>
+            <p:extLst>
+              <p:ext uri="{D42A27DB-BD31-4B8C-83A1-F6EECF244321}">
+                <p14:modId xmlns:p14="http://schemas.microsoft.com/office/powerpoint/2010/main" val="2443480260"/>
+              </p:ext>
+            </p:extLst>
+          </p:nvPr>
+        </p:nvGraphicFramePr>
+        <p:xfrm>
+          <a:off x="850900" y="1043516"/>
+          <a:ext cx="8128000" cy="1752600"/>
+        </p:xfrm>
+        <a:graphic>
+          <a:graphicData uri="http://schemas.openxmlformats.org/drawingml/2006/table">
+            <a:tbl>
+              <a:tblPr firstRow="1" bandRow="1">
+                <a:tableStyleId>{073A0DAA-6AF3-43AB-8588-CEC1D06C72B9}</a:tableStyleId>
+              </a:tblPr>
+              <a:tblGrid>
+                <a:gridCol w="2235200">
+                  <a:extLst>
+                    <a:ext uri="{9D8B030D-6E8A-4147-A177-3AD203B41FA5}">
+                      <a16:colId xmlns:a16="http://schemas.microsoft.com/office/drawing/2014/main" val="1924441651"/>
+                    </a:ext>
+                  </a:extLst>
+                </a:gridCol>
+                <a:gridCol w="1581150">
+                  <a:extLst>
+                    <a:ext uri="{9D8B030D-6E8A-4147-A177-3AD203B41FA5}">
+                      <a16:colId xmlns:a16="http://schemas.microsoft.com/office/drawing/2014/main" val="22700561"/>
+                    </a:ext>
+                  </a:extLst>
+                </a:gridCol>
+                <a:gridCol w="1428750">
+                  <a:extLst>
+                    <a:ext uri="{9D8B030D-6E8A-4147-A177-3AD203B41FA5}">
+                      <a16:colId xmlns:a16="http://schemas.microsoft.com/office/drawing/2014/main" val="2645291537"/>
+                    </a:ext>
+                  </a:extLst>
+                </a:gridCol>
+                <a:gridCol w="1562100">
+                  <a:extLst>
+                    <a:ext uri="{9D8B030D-6E8A-4147-A177-3AD203B41FA5}">
+                      <a16:colId xmlns:a16="http://schemas.microsoft.com/office/drawing/2014/main" val="670994595"/>
+                    </a:ext>
+                  </a:extLst>
+                </a:gridCol>
+                <a:gridCol w="1320800">
+                  <a:extLst>
+                    <a:ext uri="{9D8B030D-6E8A-4147-A177-3AD203B41FA5}">
+                      <a16:colId xmlns:a16="http://schemas.microsoft.com/office/drawing/2014/main" val="2424154585"/>
+                    </a:ext>
+                  </a:extLst>
+                </a:gridCol>
+              </a:tblGrid>
+              <a:tr h="370840">
+                <a:tc>
+                  <a:txBody>
+                    <a:bodyPr/>
+                    <a:lstStyle/>
+                    <a:p>
+                      <a:endParaRPr lang="en-US" b="1"/>
+                    </a:p>
+                  </a:txBody>
+                  <a:tcPr/>
+                </a:tc>
+                <a:tc>
+                  <a:txBody>
+                    <a:bodyPr/>
+                    <a:lstStyle/>
+                    <a:p>
+                      <a:r>
+                        <a:rPr lang="en-US" dirty="0"/>
+                        <a:t>Mean Altitude (km)</a:t>
+                      </a:r>
+                    </a:p>
+                  </a:txBody>
+                  <a:tcPr/>
+                </a:tc>
+                <a:tc>
+                  <a:txBody>
+                    <a:bodyPr/>
+                    <a:lstStyle/>
+                    <a:p>
+                      <a:r>
+                        <a:rPr lang="en-US" dirty="0"/>
+                        <a:t>Std Altitude (km)</a:t>
+                      </a:r>
+                    </a:p>
+                  </a:txBody>
+                  <a:tcPr/>
+                </a:tc>
+                <a:tc>
+                  <a:txBody>
+                    <a:bodyPr/>
+                    <a:lstStyle/>
+                    <a:p>
+                      <a:r>
+                        <a:rPr lang="en-US" dirty="0"/>
+                        <a:t>Mean Range (km)</a:t>
+                      </a:r>
+                    </a:p>
+                  </a:txBody>
+                  <a:tcPr/>
+                </a:tc>
+                <a:tc>
+                  <a:txBody>
+                    <a:bodyPr/>
+                    <a:lstStyle/>
+                    <a:p>
+                      <a:r>
+                        <a:rPr lang="en-US" dirty="0"/>
+                        <a:t>Std Range (km)</a:t>
+                      </a:r>
+                    </a:p>
+                  </a:txBody>
+                  <a:tcPr/>
+                </a:tc>
+                <a:extLst>
+                  <a:ext uri="{0D108BD9-81ED-4DB2-BD59-A6C34878D82A}">
+                    <a16:rowId xmlns:a16="http://schemas.microsoft.com/office/drawing/2014/main" val="566004689"/>
+                  </a:ext>
+                </a:extLst>
+              </a:tr>
+              <a:tr h="370840">
+                <a:tc>
+                  <a:txBody>
+                    <a:bodyPr/>
+                    <a:lstStyle/>
+                    <a:p>
+                      <a:r>
+                        <a:rPr lang="en-US" b="1" dirty="0"/>
+                        <a:t>Linear Propagation</a:t>
+                      </a:r>
+                    </a:p>
+                  </a:txBody>
+                  <a:tcPr/>
+                </a:tc>
+                <a:tc>
+                  <a:txBody>
+                    <a:bodyPr/>
+                    <a:lstStyle/>
+                    <a:p>
+                      <a:r>
+                        <a:rPr lang="en-US" dirty="0"/>
+                        <a:t>10.566</a:t>
+                      </a:r>
+                    </a:p>
+                  </a:txBody>
+                  <a:tcPr/>
+                </a:tc>
+                <a:tc>
+                  <a:txBody>
+                    <a:bodyPr/>
+                    <a:lstStyle/>
+                    <a:p>
+                      <a:r>
+                        <a:rPr lang="en-US" dirty="0"/>
+                        <a:t>0.739</a:t>
+                      </a:r>
+                    </a:p>
+                  </a:txBody>
+                  <a:tcPr/>
+                </a:tc>
+                <a:tc>
+                  <a:txBody>
+                    <a:bodyPr/>
+                    <a:lstStyle/>
+                    <a:p>
+                      <a:r>
+                        <a:rPr lang="en-US" dirty="0"/>
+                        <a:t>307.367</a:t>
+                      </a:r>
+                    </a:p>
+                  </a:txBody>
+                  <a:tcPr/>
+                </a:tc>
+                <a:tc>
+                  <a:txBody>
+                    <a:bodyPr/>
+                    <a:lstStyle/>
+                    <a:p>
+                      <a:r>
+                        <a:rPr lang="en-US" dirty="0"/>
+                        <a:t>25.747</a:t>
+                      </a:r>
+                    </a:p>
+                  </a:txBody>
+                  <a:tcPr/>
+                </a:tc>
+                <a:extLst>
+                  <a:ext uri="{0D108BD9-81ED-4DB2-BD59-A6C34878D82A}">
+                    <a16:rowId xmlns:a16="http://schemas.microsoft.com/office/drawing/2014/main" val="568773808"/>
+                  </a:ext>
+                </a:extLst>
+              </a:tr>
+              <a:tr h="370840">
+                <a:tc>
+                  <a:txBody>
+                    <a:bodyPr/>
+                    <a:lstStyle/>
+                    <a:p>
+                      <a:r>
+                        <a:rPr lang="en-US" b="1" dirty="0"/>
+                        <a:t>Unscented Transform</a:t>
+                      </a:r>
+                    </a:p>
+                  </a:txBody>
+                  <a:tcPr/>
+                </a:tc>
+                <a:tc>
+                  <a:txBody>
+                    <a:bodyPr/>
+                    <a:lstStyle/>
+                    <a:p>
+                      <a:r>
+                        <a:rPr lang="en-US" dirty="0"/>
+                        <a:t>11.917</a:t>
+                      </a:r>
+                    </a:p>
+                  </a:txBody>
+                  <a:tcPr/>
+                </a:tc>
+                <a:tc>
+                  <a:txBody>
+                    <a:bodyPr/>
+                    <a:lstStyle/>
+                    <a:p>
+                      <a:r>
+                        <a:rPr lang="en-US" dirty="0"/>
+                        <a:t>0.985</a:t>
+                      </a:r>
+                    </a:p>
+                  </a:txBody>
+                  <a:tcPr/>
+                </a:tc>
+                <a:tc>
+                  <a:txBody>
+                    <a:bodyPr/>
+                    <a:lstStyle/>
+                    <a:p>
+                      <a:r>
+                        <a:rPr lang="en-US" dirty="0"/>
+                        <a:t>307.707</a:t>
+                      </a:r>
+                    </a:p>
+                  </a:txBody>
+                  <a:tcPr/>
+                </a:tc>
+                <a:tc>
+                  <a:txBody>
+                    <a:bodyPr/>
+                    <a:lstStyle/>
+                    <a:p>
+                      <a:r>
+                        <a:rPr lang="en-US" dirty="0"/>
+                        <a:t>24.780</a:t>
+                      </a:r>
+                    </a:p>
+                  </a:txBody>
+                  <a:tcPr/>
+                </a:tc>
+                <a:extLst>
+                  <a:ext uri="{0D108BD9-81ED-4DB2-BD59-A6C34878D82A}">
+                    <a16:rowId xmlns:a16="http://schemas.microsoft.com/office/drawing/2014/main" val="1013138907"/>
+                  </a:ext>
+                </a:extLst>
+              </a:tr>
+              <a:tr h="370840">
+                <a:tc>
+                  <a:txBody>
+                    <a:bodyPr/>
+                    <a:lstStyle/>
+                    <a:p>
+                      <a:r>
+                        <a:rPr lang="en-US" b="1" dirty="0"/>
+                        <a:t>Monte Carlo</a:t>
+                      </a:r>
+                    </a:p>
+                  </a:txBody>
+                  <a:tcPr/>
+                </a:tc>
+                <a:tc>
+                  <a:txBody>
+                    <a:bodyPr/>
+                    <a:lstStyle/>
+                    <a:p>
+                      <a:r>
+                        <a:rPr lang="en-US" dirty="0"/>
+                        <a:t>11.754</a:t>
+                      </a:r>
+                    </a:p>
+                  </a:txBody>
+                  <a:tcPr anchor="ctr"/>
+                </a:tc>
+                <a:tc>
+                  <a:txBody>
+                    <a:bodyPr/>
+                    <a:lstStyle/>
+                    <a:p>
+                      <a:r>
+                        <a:rPr lang="en-US" dirty="0"/>
+                        <a:t>0.920</a:t>
+                      </a:r>
+                    </a:p>
+                  </a:txBody>
+                  <a:tcPr anchor="ctr"/>
+                </a:tc>
+                <a:tc>
+                  <a:txBody>
+                    <a:bodyPr/>
+                    <a:lstStyle/>
+                    <a:p>
+                      <a:r>
+                        <a:rPr lang="en-US" dirty="0"/>
+                        <a:t>308.485</a:t>
+                      </a:r>
+                    </a:p>
+                  </a:txBody>
+                  <a:tcPr/>
+                </a:tc>
+                <a:tc>
+                  <a:txBody>
+                    <a:bodyPr/>
+                    <a:lstStyle/>
+                    <a:p>
+                      <a:r>
+                        <a:rPr lang="en-US" dirty="0"/>
+                        <a:t>24.596</a:t>
+                      </a:r>
+                    </a:p>
+                  </a:txBody>
+                  <a:tcPr/>
+                </a:tc>
+                <a:extLst>
+                  <a:ext uri="{0D108BD9-81ED-4DB2-BD59-A6C34878D82A}">
+                    <a16:rowId xmlns:a16="http://schemas.microsoft.com/office/drawing/2014/main" val="336328220"/>
+                  </a:ext>
+                </a:extLst>
+              </a:tr>
+            </a:tbl>
+          </a:graphicData>
+        </a:graphic>
+      </p:graphicFrame>
+      <p:graphicFrame>
+        <p:nvGraphicFramePr>
+          <p:cNvPr id="3" name="Table 2">
+            <a:extLst>
+              <a:ext uri="{FF2B5EF4-FFF2-40B4-BE49-F238E27FC236}">
+                <a16:creationId xmlns:a16="http://schemas.microsoft.com/office/drawing/2014/main" id="{748745B1-7B3F-4E19-9C1F-62E82CD8E1EF}"/>
+              </a:ext>
+            </a:extLst>
+          </p:cNvPr>
+          <p:cNvGraphicFramePr>
+            <a:graphicFrameLocks noGrp="1"/>
+          </p:cNvGraphicFramePr>
+          <p:nvPr>
+            <p:extLst>
+              <p:ext uri="{D42A27DB-BD31-4B8C-83A1-F6EECF244321}">
+                <p14:modId xmlns:p14="http://schemas.microsoft.com/office/powerpoint/2010/main" val="554254375"/>
+              </p:ext>
+            </p:extLst>
+          </p:nvPr>
+        </p:nvGraphicFramePr>
+        <p:xfrm>
+          <a:off x="850900" y="3429000"/>
+          <a:ext cx="8128000" cy="2113280"/>
+        </p:xfrm>
+        <a:graphic>
+          <a:graphicData uri="http://schemas.openxmlformats.org/drawingml/2006/table">
+            <a:tbl>
+              <a:tblPr firstRow="1" bandRow="1">
+                <a:tableStyleId>{073A0DAA-6AF3-43AB-8588-CEC1D06C72B9}</a:tableStyleId>
+              </a:tblPr>
+              <a:tblGrid>
+                <a:gridCol w="2235200">
+                  <a:extLst>
+                    <a:ext uri="{9D8B030D-6E8A-4147-A177-3AD203B41FA5}">
+                      <a16:colId xmlns:a16="http://schemas.microsoft.com/office/drawing/2014/main" val="1924441651"/>
+                    </a:ext>
+                  </a:extLst>
+                </a:gridCol>
+                <a:gridCol w="1581150">
+                  <a:extLst>
+                    <a:ext uri="{9D8B030D-6E8A-4147-A177-3AD203B41FA5}">
+                      <a16:colId xmlns:a16="http://schemas.microsoft.com/office/drawing/2014/main" val="22700561"/>
+                    </a:ext>
+                  </a:extLst>
+                </a:gridCol>
+                <a:gridCol w="1428750">
+                  <a:extLst>
+                    <a:ext uri="{9D8B030D-6E8A-4147-A177-3AD203B41FA5}">
+                      <a16:colId xmlns:a16="http://schemas.microsoft.com/office/drawing/2014/main" val="2645291537"/>
+                    </a:ext>
+                  </a:extLst>
+                </a:gridCol>
+                <a:gridCol w="1562100">
+                  <a:extLst>
+                    <a:ext uri="{9D8B030D-6E8A-4147-A177-3AD203B41FA5}">
+                      <a16:colId xmlns:a16="http://schemas.microsoft.com/office/drawing/2014/main" val="670994595"/>
+                    </a:ext>
+                  </a:extLst>
+                </a:gridCol>
+                <a:gridCol w="1320800">
+                  <a:extLst>
+                    <a:ext uri="{9D8B030D-6E8A-4147-A177-3AD203B41FA5}">
+                      <a16:colId xmlns:a16="http://schemas.microsoft.com/office/drawing/2014/main" val="2424154585"/>
+                    </a:ext>
+                  </a:extLst>
+                </a:gridCol>
+              </a:tblGrid>
+              <a:tr h="370840">
+                <a:tc>
+                  <a:txBody>
+                    <a:bodyPr/>
+                    <a:lstStyle/>
+                    <a:p>
+                      <a:endParaRPr lang="en-US" b="1"/>
+                    </a:p>
+                  </a:txBody>
+                  <a:tcPr/>
+                </a:tc>
+                <a:tc>
+                  <a:txBody>
+                    <a:bodyPr/>
+                    <a:lstStyle/>
+                    <a:p>
+                      <a:r>
+                        <a:rPr lang="en-US" dirty="0"/>
+                        <a:t>Mean Altitude (km)</a:t>
+                      </a:r>
+                    </a:p>
+                  </a:txBody>
+                  <a:tcPr/>
+                </a:tc>
+                <a:tc>
+                  <a:txBody>
+                    <a:bodyPr/>
+                    <a:lstStyle/>
+                    <a:p>
+                      <a:r>
+                        <a:rPr lang="en-US" dirty="0"/>
+                        <a:t>Std Altitude (km)</a:t>
+                      </a:r>
+                    </a:p>
+                  </a:txBody>
+                  <a:tcPr/>
+                </a:tc>
+                <a:tc>
+                  <a:txBody>
+                    <a:bodyPr/>
+                    <a:lstStyle/>
+                    <a:p>
+                      <a:r>
+                        <a:rPr lang="en-US" dirty="0"/>
+                        <a:t>Mean Range (km)</a:t>
+                      </a:r>
+                    </a:p>
+                  </a:txBody>
+                  <a:tcPr/>
+                </a:tc>
+                <a:tc>
+                  <a:txBody>
+                    <a:bodyPr/>
+                    <a:lstStyle/>
+                    <a:p>
+                      <a:r>
+                        <a:rPr lang="en-US" dirty="0"/>
+                        <a:t>Std Range (km)</a:t>
+                      </a:r>
+                    </a:p>
+                  </a:txBody>
+                  <a:tcPr/>
+                </a:tc>
+                <a:extLst>
+                  <a:ext uri="{0D108BD9-81ED-4DB2-BD59-A6C34878D82A}">
+                    <a16:rowId xmlns:a16="http://schemas.microsoft.com/office/drawing/2014/main" val="566004689"/>
+                  </a:ext>
+                </a:extLst>
+              </a:tr>
+              <a:tr h="337395">
+                <a:tc>
+                  <a:txBody>
+                    <a:bodyPr/>
+                    <a:lstStyle/>
+                    <a:p>
+                      <a:r>
+                        <a:rPr lang="en-US" b="1" dirty="0"/>
+                        <a:t>Linear Propagation</a:t>
+                      </a:r>
+                    </a:p>
+                  </a:txBody>
+                  <a:tcPr/>
+                </a:tc>
+                <a:tc>
+                  <a:txBody>
+                    <a:bodyPr/>
+                    <a:lstStyle/>
+                    <a:p>
+                      <a:r>
+                        <a:rPr lang="en-US" dirty="0"/>
+                        <a:t>10.742</a:t>
+                      </a:r>
+                    </a:p>
+                  </a:txBody>
+                  <a:tcPr/>
+                </a:tc>
+                <a:tc>
+                  <a:txBody>
+                    <a:bodyPr/>
+                    <a:lstStyle/>
+                    <a:p>
+                      <a:r>
+                        <a:rPr lang="en-US" dirty="0"/>
+                        <a:t>0.189</a:t>
+                      </a:r>
+                    </a:p>
+                  </a:txBody>
+                  <a:tcPr/>
+                </a:tc>
+                <a:tc>
+                  <a:txBody>
+                    <a:bodyPr/>
+                    <a:lstStyle/>
+                    <a:p>
+                      <a:r>
+                        <a:rPr lang="en-US" dirty="0"/>
+                        <a:t>307.367</a:t>
+                      </a:r>
+                    </a:p>
+                  </a:txBody>
+                  <a:tcPr/>
+                </a:tc>
+                <a:tc>
+                  <a:txBody>
+                    <a:bodyPr/>
+                    <a:lstStyle/>
+                    <a:p>
+                      <a:r>
+                        <a:rPr lang="en-US" dirty="0"/>
+                        <a:t>3.270</a:t>
+                      </a:r>
+                    </a:p>
+                  </a:txBody>
+                  <a:tcPr/>
+                </a:tc>
+                <a:extLst>
+                  <a:ext uri="{0D108BD9-81ED-4DB2-BD59-A6C34878D82A}">
+                    <a16:rowId xmlns:a16="http://schemas.microsoft.com/office/drawing/2014/main" val="568773808"/>
+                  </a:ext>
+                </a:extLst>
+              </a:tr>
+              <a:tr h="185420">
+                <a:tc>
+                  <a:txBody>
+                    <a:bodyPr/>
+                    <a:lstStyle/>
+                    <a:p>
+                      <a:r>
+                        <a:rPr lang="en-US" b="1" dirty="0"/>
+                        <a:t>Linear Prop, No Sat</a:t>
+                      </a:r>
+                    </a:p>
+                  </a:txBody>
+                  <a:tcPr/>
+                </a:tc>
+                <a:tc>
+                  <a:txBody>
+                    <a:bodyPr/>
+                    <a:lstStyle/>
+                    <a:p>
+                      <a:r>
+                        <a:rPr lang="en-US" dirty="0"/>
+                        <a:t>10.948</a:t>
+                      </a:r>
+                    </a:p>
+                  </a:txBody>
+                  <a:tcPr/>
+                </a:tc>
+                <a:tc>
+                  <a:txBody>
+                    <a:bodyPr/>
+                    <a:lstStyle/>
+                    <a:p>
+                      <a:r>
+                        <a:rPr lang="en-US" dirty="0"/>
+                        <a:t>0.293</a:t>
+                      </a:r>
+                    </a:p>
+                  </a:txBody>
+                  <a:tcPr/>
+                </a:tc>
+                <a:tc>
+                  <a:txBody>
+                    <a:bodyPr/>
+                    <a:lstStyle/>
+                    <a:p>
+                      <a:r>
+                        <a:rPr lang="en-US" dirty="0"/>
+                        <a:t>307.367</a:t>
+                      </a:r>
+                    </a:p>
+                  </a:txBody>
+                  <a:tcPr/>
+                </a:tc>
+                <a:tc>
+                  <a:txBody>
+                    <a:bodyPr/>
+                    <a:lstStyle/>
+                    <a:p>
+                      <a:r>
+                        <a:rPr lang="en-US" dirty="0"/>
+                        <a:t>2.437</a:t>
+                      </a:r>
+                    </a:p>
+                  </a:txBody>
+                  <a:tcPr/>
+                </a:tc>
+                <a:extLst>
+                  <a:ext uri="{0D108BD9-81ED-4DB2-BD59-A6C34878D82A}">
+                    <a16:rowId xmlns:a16="http://schemas.microsoft.com/office/drawing/2014/main" val="363519881"/>
+                  </a:ext>
+                </a:extLst>
+              </a:tr>
+              <a:tr h="370840">
+                <a:tc>
+                  <a:txBody>
+                    <a:bodyPr/>
+                    <a:lstStyle/>
+                    <a:p>
+                      <a:r>
+                        <a:rPr lang="en-US" b="1" dirty="0"/>
+                        <a:t>Unscented Transform</a:t>
+                      </a:r>
+                    </a:p>
+                  </a:txBody>
+                  <a:tcPr/>
+                </a:tc>
+                <a:tc>
+                  <a:txBody>
+                    <a:bodyPr/>
+                    <a:lstStyle/>
+                    <a:p>
+                      <a:r>
+                        <a:rPr lang="en-US" dirty="0"/>
+                        <a:t>11.938</a:t>
+                      </a:r>
+                    </a:p>
+                  </a:txBody>
+                  <a:tcPr/>
+                </a:tc>
+                <a:tc>
+                  <a:txBody>
+                    <a:bodyPr/>
+                    <a:lstStyle/>
+                    <a:p>
+                      <a:r>
+                        <a:rPr lang="en-US" dirty="0"/>
+                        <a:t>1.064</a:t>
+                      </a:r>
+                    </a:p>
+                  </a:txBody>
+                  <a:tcPr/>
+                </a:tc>
+                <a:tc>
+                  <a:txBody>
+                    <a:bodyPr/>
+                    <a:lstStyle/>
+                    <a:p>
+                      <a:r>
+                        <a:rPr lang="en-US" dirty="0"/>
+                        <a:t>302.667</a:t>
+                      </a:r>
+                    </a:p>
+                  </a:txBody>
+                  <a:tcPr/>
+                </a:tc>
+                <a:tc>
+                  <a:txBody>
+                    <a:bodyPr/>
+                    <a:lstStyle/>
+                    <a:p>
+                      <a:r>
+                        <a:rPr lang="en-US" dirty="0"/>
+                        <a:t>3.511</a:t>
+                      </a:r>
+                    </a:p>
+                  </a:txBody>
+                  <a:tcPr/>
+                </a:tc>
+                <a:extLst>
+                  <a:ext uri="{0D108BD9-81ED-4DB2-BD59-A6C34878D82A}">
+                    <a16:rowId xmlns:a16="http://schemas.microsoft.com/office/drawing/2014/main" val="1013138907"/>
+                  </a:ext>
+                </a:extLst>
+              </a:tr>
+              <a:tr h="370840">
+                <a:tc>
+                  <a:txBody>
+                    <a:bodyPr/>
+                    <a:lstStyle/>
+                    <a:p>
+                      <a:r>
+                        <a:rPr lang="en-US" b="1" dirty="0"/>
+                        <a:t>Monte Carlo</a:t>
+                      </a:r>
+                    </a:p>
+                  </a:txBody>
+                  <a:tcPr/>
+                </a:tc>
+                <a:tc>
+                  <a:txBody>
+                    <a:bodyPr/>
+                    <a:lstStyle/>
+                    <a:p>
+                      <a:r>
+                        <a:rPr lang="en-US" dirty="0"/>
+                        <a:t>11.820</a:t>
+                      </a:r>
+                    </a:p>
+                  </a:txBody>
+                  <a:tcPr anchor="ctr"/>
+                </a:tc>
+                <a:tc>
+                  <a:txBody>
+                    <a:bodyPr/>
+                    <a:lstStyle/>
+                    <a:p>
+                      <a:r>
+                        <a:rPr lang="en-US" dirty="0"/>
+                        <a:t>0.941</a:t>
+                      </a:r>
+                    </a:p>
+                  </a:txBody>
+                  <a:tcPr anchor="ctr"/>
+                </a:tc>
+                <a:tc>
+                  <a:txBody>
+                    <a:bodyPr/>
+                    <a:lstStyle/>
+                    <a:p>
+                      <a:r>
+                        <a:rPr lang="en-US" dirty="0"/>
+                        <a:t>301.790</a:t>
+                      </a:r>
+                    </a:p>
+                  </a:txBody>
+                  <a:tcPr/>
+                </a:tc>
+                <a:tc>
+                  <a:txBody>
+                    <a:bodyPr/>
+                    <a:lstStyle/>
+                    <a:p>
+                      <a:r>
+                        <a:rPr lang="en-US" dirty="0"/>
+                        <a:t>3.163</a:t>
+                      </a:r>
+                    </a:p>
+                  </a:txBody>
+                  <a:tcPr/>
+                </a:tc>
+                <a:extLst>
+                  <a:ext uri="{0D108BD9-81ED-4DB2-BD59-A6C34878D82A}">
+                    <a16:rowId xmlns:a16="http://schemas.microsoft.com/office/drawing/2014/main" val="336328220"/>
+                  </a:ext>
+                </a:extLst>
+              </a:tr>
+            </a:tbl>
+          </a:graphicData>
+        </a:graphic>
+      </p:graphicFrame>
+    </p:spTree>
+    <p:extLst>
+      <p:ext uri="{BB962C8B-B14F-4D97-AF65-F5344CB8AC3E}">
+        <p14:creationId xmlns:p14="http://schemas.microsoft.com/office/powerpoint/2010/main" val="177401208"/>
       </p:ext>
     </p:extLst>
   </p:cSld>

</xml_diff>

<commit_message>
Tons of updates for notebook and documents
</commit_message>
<xml_diff>
--- a/Documents/Dissertation/Figures.pptx
+++ b/Documents/Dissertation/Figures.pptx
@@ -5,7 +5,7 @@
     <p:sldMasterId id="2147483648" r:id="rId1"/>
   </p:sldMasterIdLst>
   <p:notesMasterIdLst>
-    <p:notesMasterId r:id="rId9"/>
+    <p:notesMasterId r:id="rId10"/>
   </p:notesMasterIdLst>
   <p:sldIdLst>
     <p:sldId id="258" r:id="rId2"/>
@@ -15,6 +15,7 @@
     <p:sldId id="259" r:id="rId6"/>
     <p:sldId id="261" r:id="rId7"/>
     <p:sldId id="262" r:id="rId8"/>
+    <p:sldId id="263" r:id="rId9"/>
   </p:sldIdLst>
   <p:sldSz cx="12192000" cy="6858000"/>
   <p:notesSz cx="6858000" cy="9144000"/>
@@ -115,7 +116,7 @@
   </p:defaultTextStyle>
   <p:extLst>
     <p:ext uri="{EFAFB233-063F-42B5-8137-9DF3F51BA10A}">
-      <p15:sldGuideLst xmlns:p15="http://schemas.microsoft.com/office/powerpoint/2012/main" xmlns="">
+      <p15:sldGuideLst xmlns:p15="http://schemas.microsoft.com/office/powerpoint/2012/main">
         <p15:guide id="1" orient="horz" pos="2160" userDrawn="1">
           <p15:clr>
             <a:srgbClr val="A4A3A4"/>
@@ -214,7 +215,7 @@
           <a:p>
             <a:fld id="{B8D782B5-82DF-48ED-92BE-C4676CEDADC3}" type="datetimeFigureOut">
               <a:rPr lang="en-US" smtClean="0"/>
-              <a:t>5/23/2021</a:t>
+              <a:t>5/24/2021</a:t>
             </a:fld>
             <a:endParaRPr lang="en-US"/>
           </a:p>
@@ -880,6 +881,180 @@
 </p:notes>
 </file>
 
+<file path=ppt/notesSlides/notesSlide5.xml><?xml version="1.0" encoding="utf-8"?>
+<p:notes xmlns:a="http://schemas.openxmlformats.org/drawingml/2006/main" xmlns:r="http://schemas.openxmlformats.org/officeDocument/2006/relationships" xmlns:p="http://schemas.openxmlformats.org/presentationml/2006/main">
+  <p:cSld>
+    <p:spTree>
+      <p:nvGrpSpPr>
+        <p:cNvPr id="1" name=""/>
+        <p:cNvGrpSpPr/>
+        <p:nvPr/>
+      </p:nvGrpSpPr>
+      <p:grpSpPr>
+        <a:xfrm>
+          <a:off x="0" y="0"/>
+          <a:ext cx="0" cy="0"/>
+          <a:chOff x="0" y="0"/>
+          <a:chExt cx="0" cy="0"/>
+        </a:xfrm>
+      </p:grpSpPr>
+      <p:sp>
+        <p:nvSpPr>
+          <p:cNvPr id="2" name="Slide Image Placeholder 1"/>
+          <p:cNvSpPr>
+            <a:spLocks noGrp="1" noRot="1" noChangeAspect="1"/>
+          </p:cNvSpPr>
+          <p:nvPr>
+            <p:ph type="sldImg"/>
+          </p:nvPr>
+        </p:nvSpPr>
+        <p:spPr/>
+      </p:sp>
+      <p:sp>
+        <p:nvSpPr>
+          <p:cNvPr id="3" name="Notes Placeholder 2"/>
+          <p:cNvSpPr>
+            <a:spLocks noGrp="1"/>
+          </p:cNvSpPr>
+          <p:nvPr>
+            <p:ph type="body" idx="1"/>
+          </p:nvPr>
+        </p:nvSpPr>
+        <p:spPr/>
+        <p:txBody>
+          <a:bodyPr/>
+          <a:lstStyle/>
+          <a:p>
+            <a:r>
+              <a:rPr lang="en-US" dirty="0"/>
+              <a:t>Screenshot at 61% on laptop</a:t>
+            </a:r>
+          </a:p>
+        </p:txBody>
+      </p:sp>
+      <p:sp>
+        <p:nvSpPr>
+          <p:cNvPr id="4" name="Slide Number Placeholder 3"/>
+          <p:cNvSpPr>
+            <a:spLocks noGrp="1"/>
+          </p:cNvSpPr>
+          <p:nvPr>
+            <p:ph type="sldNum" sz="quarter" idx="5"/>
+          </p:nvPr>
+        </p:nvSpPr>
+        <p:spPr/>
+        <p:txBody>
+          <a:bodyPr/>
+          <a:lstStyle/>
+          <a:p>
+            <a:fld id="{3E94B478-290D-4B9A-A63F-4B885CDC012D}" type="slidenum">
+              <a:rPr lang="en-US" smtClean="0"/>
+              <a:t>7</a:t>
+            </a:fld>
+            <a:endParaRPr lang="en-US"/>
+          </a:p>
+        </p:txBody>
+      </p:sp>
+    </p:spTree>
+    <p:extLst>
+      <p:ext uri="{BB962C8B-B14F-4D97-AF65-F5344CB8AC3E}">
+        <p14:creationId xmlns:p14="http://schemas.microsoft.com/office/powerpoint/2010/main" val="3038953043"/>
+      </p:ext>
+    </p:extLst>
+  </p:cSld>
+  <p:clrMapOvr>
+    <a:masterClrMapping/>
+  </p:clrMapOvr>
+</p:notes>
+</file>
+
+<file path=ppt/notesSlides/notesSlide6.xml><?xml version="1.0" encoding="utf-8"?>
+<p:notes xmlns:a="http://schemas.openxmlformats.org/drawingml/2006/main" xmlns:r="http://schemas.openxmlformats.org/officeDocument/2006/relationships" xmlns:p="http://schemas.openxmlformats.org/presentationml/2006/main">
+  <p:cSld>
+    <p:spTree>
+      <p:nvGrpSpPr>
+        <p:cNvPr id="1" name=""/>
+        <p:cNvGrpSpPr/>
+        <p:nvPr/>
+      </p:nvGrpSpPr>
+      <p:grpSpPr>
+        <a:xfrm>
+          <a:off x="0" y="0"/>
+          <a:ext cx="0" cy="0"/>
+          <a:chOff x="0" y="0"/>
+          <a:chExt cx="0" cy="0"/>
+        </a:xfrm>
+      </p:grpSpPr>
+      <p:sp>
+        <p:nvSpPr>
+          <p:cNvPr id="2" name="Slide Image Placeholder 1"/>
+          <p:cNvSpPr>
+            <a:spLocks noGrp="1" noRot="1" noChangeAspect="1"/>
+          </p:cNvSpPr>
+          <p:nvPr>
+            <p:ph type="sldImg"/>
+          </p:nvPr>
+        </p:nvSpPr>
+        <p:spPr/>
+      </p:sp>
+      <p:sp>
+        <p:nvSpPr>
+          <p:cNvPr id="3" name="Notes Placeholder 2"/>
+          <p:cNvSpPr>
+            <a:spLocks noGrp="1"/>
+          </p:cNvSpPr>
+          <p:nvPr>
+            <p:ph type="body" idx="1"/>
+          </p:nvPr>
+        </p:nvSpPr>
+        <p:spPr/>
+        <p:txBody>
+          <a:bodyPr/>
+          <a:lstStyle/>
+          <a:p>
+            <a:r>
+              <a:rPr lang="en-US" dirty="0"/>
+              <a:t>Screenshot at 61% on laptop</a:t>
+            </a:r>
+          </a:p>
+        </p:txBody>
+      </p:sp>
+      <p:sp>
+        <p:nvSpPr>
+          <p:cNvPr id="4" name="Slide Number Placeholder 3"/>
+          <p:cNvSpPr>
+            <a:spLocks noGrp="1"/>
+          </p:cNvSpPr>
+          <p:nvPr>
+            <p:ph type="sldNum" sz="quarter" idx="5"/>
+          </p:nvPr>
+        </p:nvSpPr>
+        <p:spPr/>
+        <p:txBody>
+          <a:bodyPr/>
+          <a:lstStyle/>
+          <a:p>
+            <a:fld id="{3E94B478-290D-4B9A-A63F-4B885CDC012D}" type="slidenum">
+              <a:rPr lang="en-US" smtClean="0"/>
+              <a:t>8</a:t>
+            </a:fld>
+            <a:endParaRPr lang="en-US"/>
+          </a:p>
+        </p:txBody>
+      </p:sp>
+    </p:spTree>
+    <p:extLst>
+      <p:ext uri="{BB962C8B-B14F-4D97-AF65-F5344CB8AC3E}">
+        <p14:creationId xmlns:p14="http://schemas.microsoft.com/office/powerpoint/2010/main" val="2485206384"/>
+      </p:ext>
+    </p:extLst>
+  </p:cSld>
+  <p:clrMapOvr>
+    <a:masterClrMapping/>
+  </p:clrMapOvr>
+</p:notes>
+</file>
+
 <file path=ppt/slideLayouts/slideLayout1.xml><?xml version="1.0" encoding="utf-8"?>
 <p:sldLayout xmlns:a="http://schemas.openxmlformats.org/drawingml/2006/main" xmlns:r="http://schemas.openxmlformats.org/officeDocument/2006/relationships" xmlns:p="http://schemas.openxmlformats.org/presentationml/2006/main" type="title" preserve="1">
   <p:cSld name="Title Slide">
@@ -902,7 +1077,7 @@
           <p:cNvPr id="2" name="Title 1">
             <a:extLst>
               <a:ext uri="{FF2B5EF4-FFF2-40B4-BE49-F238E27FC236}">
-                <a16:creationId xmlns:a16="http://schemas.microsoft.com/office/drawing/2014/main" xmlns="" id="{F247391F-D9B5-4CAE-8211-48C6B0182B3C}"/>
+                <a16:creationId xmlns:a16="http://schemas.microsoft.com/office/drawing/2014/main" id="{F247391F-D9B5-4CAE-8211-48C6B0182B3C}"/>
               </a:ext>
             </a:extLst>
           </p:cNvPr>
@@ -939,7 +1114,7 @@
           <p:cNvPr id="3" name="Subtitle 2">
             <a:extLst>
               <a:ext uri="{FF2B5EF4-FFF2-40B4-BE49-F238E27FC236}">
-                <a16:creationId xmlns:a16="http://schemas.microsoft.com/office/drawing/2014/main" xmlns="" id="{80A8541C-2CCE-48A9-A845-70748223395C}"/>
+                <a16:creationId xmlns:a16="http://schemas.microsoft.com/office/drawing/2014/main" id="{80A8541C-2CCE-48A9-A845-70748223395C}"/>
               </a:ext>
             </a:extLst>
           </p:cNvPr>
@@ -1009,7 +1184,7 @@
           <p:cNvPr id="4" name="Date Placeholder 3">
             <a:extLst>
               <a:ext uri="{FF2B5EF4-FFF2-40B4-BE49-F238E27FC236}">
-                <a16:creationId xmlns:a16="http://schemas.microsoft.com/office/drawing/2014/main" xmlns="" id="{BCD12D23-2530-4FB8-A4C8-18C90CCD4CF5}"/>
+                <a16:creationId xmlns:a16="http://schemas.microsoft.com/office/drawing/2014/main" id="{BCD12D23-2530-4FB8-A4C8-18C90CCD4CF5}"/>
               </a:ext>
             </a:extLst>
           </p:cNvPr>
@@ -1027,7 +1202,7 @@
           <a:p>
             <a:fld id="{C3BD6E91-CB9B-46DE-9DB7-C686754E38A3}" type="datetimeFigureOut">
               <a:rPr lang="en-US" smtClean="0"/>
-              <a:t>5/23/2021</a:t>
+              <a:t>5/24/2021</a:t>
             </a:fld>
             <a:endParaRPr lang="en-US"/>
           </a:p>
@@ -1038,7 +1213,7 @@
           <p:cNvPr id="5" name="Footer Placeholder 4">
             <a:extLst>
               <a:ext uri="{FF2B5EF4-FFF2-40B4-BE49-F238E27FC236}">
-                <a16:creationId xmlns:a16="http://schemas.microsoft.com/office/drawing/2014/main" xmlns="" id="{D57CF010-2BBF-43F8-B33D-1D3DBD83E857}"/>
+                <a16:creationId xmlns:a16="http://schemas.microsoft.com/office/drawing/2014/main" id="{D57CF010-2BBF-43F8-B33D-1D3DBD83E857}"/>
               </a:ext>
             </a:extLst>
           </p:cNvPr>
@@ -1063,7 +1238,7 @@
           <p:cNvPr id="6" name="Slide Number Placeholder 5">
             <a:extLst>
               <a:ext uri="{FF2B5EF4-FFF2-40B4-BE49-F238E27FC236}">
-                <a16:creationId xmlns:a16="http://schemas.microsoft.com/office/drawing/2014/main" xmlns="" id="{30C029BA-BFF8-415B-AFAD-D4F05770D8B8}"/>
+                <a16:creationId xmlns:a16="http://schemas.microsoft.com/office/drawing/2014/main" id="{30C029BA-BFF8-415B-AFAD-D4F05770D8B8}"/>
               </a:ext>
             </a:extLst>
           </p:cNvPr>
@@ -1122,7 +1297,7 @@
           <p:cNvPr id="2" name="Title 1">
             <a:extLst>
               <a:ext uri="{FF2B5EF4-FFF2-40B4-BE49-F238E27FC236}">
-                <a16:creationId xmlns:a16="http://schemas.microsoft.com/office/drawing/2014/main" xmlns="" id="{8B82FCB5-364C-49EE-8BF8-A2EB7CE661E0}"/>
+                <a16:creationId xmlns:a16="http://schemas.microsoft.com/office/drawing/2014/main" id="{8B82FCB5-364C-49EE-8BF8-A2EB7CE661E0}"/>
               </a:ext>
             </a:extLst>
           </p:cNvPr>
@@ -1150,7 +1325,7 @@
           <p:cNvPr id="3" name="Vertical Text Placeholder 2">
             <a:extLst>
               <a:ext uri="{FF2B5EF4-FFF2-40B4-BE49-F238E27FC236}">
-                <a16:creationId xmlns:a16="http://schemas.microsoft.com/office/drawing/2014/main" xmlns="" id="{E3CBB75F-595A-4DEA-A340-F6E98FFE1B14}"/>
+                <a16:creationId xmlns:a16="http://schemas.microsoft.com/office/drawing/2014/main" id="{E3CBB75F-595A-4DEA-A340-F6E98FFE1B14}"/>
               </a:ext>
             </a:extLst>
           </p:cNvPr>
@@ -1207,7 +1382,7 @@
           <p:cNvPr id="4" name="Date Placeholder 3">
             <a:extLst>
               <a:ext uri="{FF2B5EF4-FFF2-40B4-BE49-F238E27FC236}">
-                <a16:creationId xmlns:a16="http://schemas.microsoft.com/office/drawing/2014/main" xmlns="" id="{7DA9772C-6D03-44E9-AD19-89B61F5F45E2}"/>
+                <a16:creationId xmlns:a16="http://schemas.microsoft.com/office/drawing/2014/main" id="{7DA9772C-6D03-44E9-AD19-89B61F5F45E2}"/>
               </a:ext>
             </a:extLst>
           </p:cNvPr>
@@ -1225,7 +1400,7 @@
           <a:p>
             <a:fld id="{C3BD6E91-CB9B-46DE-9DB7-C686754E38A3}" type="datetimeFigureOut">
               <a:rPr lang="en-US" smtClean="0"/>
-              <a:t>5/23/2021</a:t>
+              <a:t>5/24/2021</a:t>
             </a:fld>
             <a:endParaRPr lang="en-US"/>
           </a:p>
@@ -1236,7 +1411,7 @@
           <p:cNvPr id="5" name="Footer Placeholder 4">
             <a:extLst>
               <a:ext uri="{FF2B5EF4-FFF2-40B4-BE49-F238E27FC236}">
-                <a16:creationId xmlns:a16="http://schemas.microsoft.com/office/drawing/2014/main" xmlns="" id="{8AFEF94F-D7C2-4B87-BBCC-F1D033389D8B}"/>
+                <a16:creationId xmlns:a16="http://schemas.microsoft.com/office/drawing/2014/main" id="{8AFEF94F-D7C2-4B87-BBCC-F1D033389D8B}"/>
               </a:ext>
             </a:extLst>
           </p:cNvPr>
@@ -1261,7 +1436,7 @@
           <p:cNvPr id="6" name="Slide Number Placeholder 5">
             <a:extLst>
               <a:ext uri="{FF2B5EF4-FFF2-40B4-BE49-F238E27FC236}">
-                <a16:creationId xmlns:a16="http://schemas.microsoft.com/office/drawing/2014/main" xmlns="" id="{F8067072-2DCB-4B7E-A9B9-93C6AC202BA1}"/>
+                <a16:creationId xmlns:a16="http://schemas.microsoft.com/office/drawing/2014/main" id="{F8067072-2DCB-4B7E-A9B9-93C6AC202BA1}"/>
               </a:ext>
             </a:extLst>
           </p:cNvPr>
@@ -1320,7 +1495,7 @@
           <p:cNvPr id="2" name="Vertical Title 1">
             <a:extLst>
               <a:ext uri="{FF2B5EF4-FFF2-40B4-BE49-F238E27FC236}">
-                <a16:creationId xmlns:a16="http://schemas.microsoft.com/office/drawing/2014/main" xmlns="" id="{387670EE-7E3D-40B1-81D1-3928B3EAE49C}"/>
+                <a16:creationId xmlns:a16="http://schemas.microsoft.com/office/drawing/2014/main" id="{387670EE-7E3D-40B1-81D1-3928B3EAE49C}"/>
               </a:ext>
             </a:extLst>
           </p:cNvPr>
@@ -1353,7 +1528,7 @@
           <p:cNvPr id="3" name="Vertical Text Placeholder 2">
             <a:extLst>
               <a:ext uri="{FF2B5EF4-FFF2-40B4-BE49-F238E27FC236}">
-                <a16:creationId xmlns:a16="http://schemas.microsoft.com/office/drawing/2014/main" xmlns="" id="{10C402E5-6703-443C-9E46-AA1113937686}"/>
+                <a16:creationId xmlns:a16="http://schemas.microsoft.com/office/drawing/2014/main" id="{10C402E5-6703-443C-9E46-AA1113937686}"/>
               </a:ext>
             </a:extLst>
           </p:cNvPr>
@@ -1415,7 +1590,7 @@
           <p:cNvPr id="4" name="Date Placeholder 3">
             <a:extLst>
               <a:ext uri="{FF2B5EF4-FFF2-40B4-BE49-F238E27FC236}">
-                <a16:creationId xmlns:a16="http://schemas.microsoft.com/office/drawing/2014/main" xmlns="" id="{5B06FEDE-9258-43E8-8DAD-27D0855EFAD3}"/>
+                <a16:creationId xmlns:a16="http://schemas.microsoft.com/office/drawing/2014/main" id="{5B06FEDE-9258-43E8-8DAD-27D0855EFAD3}"/>
               </a:ext>
             </a:extLst>
           </p:cNvPr>
@@ -1433,7 +1608,7 @@
           <a:p>
             <a:fld id="{C3BD6E91-CB9B-46DE-9DB7-C686754E38A3}" type="datetimeFigureOut">
               <a:rPr lang="en-US" smtClean="0"/>
-              <a:t>5/23/2021</a:t>
+              <a:t>5/24/2021</a:t>
             </a:fld>
             <a:endParaRPr lang="en-US"/>
           </a:p>
@@ -1444,7 +1619,7 @@
           <p:cNvPr id="5" name="Footer Placeholder 4">
             <a:extLst>
               <a:ext uri="{FF2B5EF4-FFF2-40B4-BE49-F238E27FC236}">
-                <a16:creationId xmlns:a16="http://schemas.microsoft.com/office/drawing/2014/main" xmlns="" id="{8DE6F0D7-59AF-4555-84F1-6392ADB24326}"/>
+                <a16:creationId xmlns:a16="http://schemas.microsoft.com/office/drawing/2014/main" id="{8DE6F0D7-59AF-4555-84F1-6392ADB24326}"/>
               </a:ext>
             </a:extLst>
           </p:cNvPr>
@@ -1469,7 +1644,7 @@
           <p:cNvPr id="6" name="Slide Number Placeholder 5">
             <a:extLst>
               <a:ext uri="{FF2B5EF4-FFF2-40B4-BE49-F238E27FC236}">
-                <a16:creationId xmlns:a16="http://schemas.microsoft.com/office/drawing/2014/main" xmlns="" id="{38EA3BE4-CE33-403D-BF17-FC8E0C03A640}"/>
+                <a16:creationId xmlns:a16="http://schemas.microsoft.com/office/drawing/2014/main" id="{38EA3BE4-CE33-403D-BF17-FC8E0C03A640}"/>
               </a:ext>
             </a:extLst>
           </p:cNvPr>
@@ -1528,7 +1703,7 @@
           <p:cNvPr id="2" name="Title 1">
             <a:extLst>
               <a:ext uri="{FF2B5EF4-FFF2-40B4-BE49-F238E27FC236}">
-                <a16:creationId xmlns:a16="http://schemas.microsoft.com/office/drawing/2014/main" xmlns="" id="{F4C70816-4C0D-48EE-8658-962696B68406}"/>
+                <a16:creationId xmlns:a16="http://schemas.microsoft.com/office/drawing/2014/main" id="{F4C70816-4C0D-48EE-8658-962696B68406}"/>
               </a:ext>
             </a:extLst>
           </p:cNvPr>
@@ -1556,7 +1731,7 @@
           <p:cNvPr id="3" name="Content Placeholder 2">
             <a:extLst>
               <a:ext uri="{FF2B5EF4-FFF2-40B4-BE49-F238E27FC236}">
-                <a16:creationId xmlns:a16="http://schemas.microsoft.com/office/drawing/2014/main" xmlns="" id="{969AB54B-86F2-45B8-8A3F-07E0FCE02DA3}"/>
+                <a16:creationId xmlns:a16="http://schemas.microsoft.com/office/drawing/2014/main" id="{969AB54B-86F2-45B8-8A3F-07E0FCE02DA3}"/>
               </a:ext>
             </a:extLst>
           </p:cNvPr>
@@ -1613,7 +1788,7 @@
           <p:cNvPr id="4" name="Date Placeholder 3">
             <a:extLst>
               <a:ext uri="{FF2B5EF4-FFF2-40B4-BE49-F238E27FC236}">
-                <a16:creationId xmlns:a16="http://schemas.microsoft.com/office/drawing/2014/main" xmlns="" id="{E82175CA-1152-4E09-B069-7C63143AB90A}"/>
+                <a16:creationId xmlns:a16="http://schemas.microsoft.com/office/drawing/2014/main" id="{E82175CA-1152-4E09-B069-7C63143AB90A}"/>
               </a:ext>
             </a:extLst>
           </p:cNvPr>
@@ -1631,7 +1806,7 @@
           <a:p>
             <a:fld id="{C3BD6E91-CB9B-46DE-9DB7-C686754E38A3}" type="datetimeFigureOut">
               <a:rPr lang="en-US" smtClean="0"/>
-              <a:t>5/23/2021</a:t>
+              <a:t>5/24/2021</a:t>
             </a:fld>
             <a:endParaRPr lang="en-US"/>
           </a:p>
@@ -1642,7 +1817,7 @@
           <p:cNvPr id="5" name="Footer Placeholder 4">
             <a:extLst>
               <a:ext uri="{FF2B5EF4-FFF2-40B4-BE49-F238E27FC236}">
-                <a16:creationId xmlns:a16="http://schemas.microsoft.com/office/drawing/2014/main" xmlns="" id="{7C3D0274-1B40-4C9C-A850-04EA924C4C49}"/>
+                <a16:creationId xmlns:a16="http://schemas.microsoft.com/office/drawing/2014/main" id="{7C3D0274-1B40-4C9C-A850-04EA924C4C49}"/>
               </a:ext>
             </a:extLst>
           </p:cNvPr>
@@ -1667,7 +1842,7 @@
           <p:cNvPr id="6" name="Slide Number Placeholder 5">
             <a:extLst>
               <a:ext uri="{FF2B5EF4-FFF2-40B4-BE49-F238E27FC236}">
-                <a16:creationId xmlns:a16="http://schemas.microsoft.com/office/drawing/2014/main" xmlns="" id="{8CCE0232-7626-480E-A5D2-8F7B7D59FA7C}"/>
+                <a16:creationId xmlns:a16="http://schemas.microsoft.com/office/drawing/2014/main" id="{8CCE0232-7626-480E-A5D2-8F7B7D59FA7C}"/>
               </a:ext>
             </a:extLst>
           </p:cNvPr>
@@ -1726,7 +1901,7 @@
           <p:cNvPr id="2" name="Title 1">
             <a:extLst>
               <a:ext uri="{FF2B5EF4-FFF2-40B4-BE49-F238E27FC236}">
-                <a16:creationId xmlns:a16="http://schemas.microsoft.com/office/drawing/2014/main" xmlns="" id="{403B5A41-DB48-4D58-B734-CD5A27B3BF5D}"/>
+                <a16:creationId xmlns:a16="http://schemas.microsoft.com/office/drawing/2014/main" id="{403B5A41-DB48-4D58-B734-CD5A27B3BF5D}"/>
               </a:ext>
             </a:extLst>
           </p:cNvPr>
@@ -1763,7 +1938,7 @@
           <p:cNvPr id="3" name="Text Placeholder 2">
             <a:extLst>
               <a:ext uri="{FF2B5EF4-FFF2-40B4-BE49-F238E27FC236}">
-                <a16:creationId xmlns:a16="http://schemas.microsoft.com/office/drawing/2014/main" xmlns="" id="{6B5E4CE5-2446-472F-87AE-D3248C7EDC51}"/>
+                <a16:creationId xmlns:a16="http://schemas.microsoft.com/office/drawing/2014/main" id="{6B5E4CE5-2446-472F-87AE-D3248C7EDC51}"/>
               </a:ext>
             </a:extLst>
           </p:cNvPr>
@@ -1888,7 +2063,7 @@
           <p:cNvPr id="4" name="Date Placeholder 3">
             <a:extLst>
               <a:ext uri="{FF2B5EF4-FFF2-40B4-BE49-F238E27FC236}">
-                <a16:creationId xmlns:a16="http://schemas.microsoft.com/office/drawing/2014/main" xmlns="" id="{218F6907-0B05-458D-920C-B7C6A471D100}"/>
+                <a16:creationId xmlns:a16="http://schemas.microsoft.com/office/drawing/2014/main" id="{218F6907-0B05-458D-920C-B7C6A471D100}"/>
               </a:ext>
             </a:extLst>
           </p:cNvPr>
@@ -1906,7 +2081,7 @@
           <a:p>
             <a:fld id="{C3BD6E91-CB9B-46DE-9DB7-C686754E38A3}" type="datetimeFigureOut">
               <a:rPr lang="en-US" smtClean="0"/>
-              <a:t>5/23/2021</a:t>
+              <a:t>5/24/2021</a:t>
             </a:fld>
             <a:endParaRPr lang="en-US"/>
           </a:p>
@@ -1917,7 +2092,7 @@
           <p:cNvPr id="5" name="Footer Placeholder 4">
             <a:extLst>
               <a:ext uri="{FF2B5EF4-FFF2-40B4-BE49-F238E27FC236}">
-                <a16:creationId xmlns:a16="http://schemas.microsoft.com/office/drawing/2014/main" xmlns="" id="{2776CDB7-BB56-423E-B4E1-A5BCB5E674A4}"/>
+                <a16:creationId xmlns:a16="http://schemas.microsoft.com/office/drawing/2014/main" id="{2776CDB7-BB56-423E-B4E1-A5BCB5E674A4}"/>
               </a:ext>
             </a:extLst>
           </p:cNvPr>
@@ -1942,7 +2117,7 @@
           <p:cNvPr id="6" name="Slide Number Placeholder 5">
             <a:extLst>
               <a:ext uri="{FF2B5EF4-FFF2-40B4-BE49-F238E27FC236}">
-                <a16:creationId xmlns:a16="http://schemas.microsoft.com/office/drawing/2014/main" xmlns="" id="{0D5F2148-A805-4BF5-8E48-C85033659026}"/>
+                <a16:creationId xmlns:a16="http://schemas.microsoft.com/office/drawing/2014/main" id="{0D5F2148-A805-4BF5-8E48-C85033659026}"/>
               </a:ext>
             </a:extLst>
           </p:cNvPr>
@@ -2001,7 +2176,7 @@
           <p:cNvPr id="2" name="Title 1">
             <a:extLst>
               <a:ext uri="{FF2B5EF4-FFF2-40B4-BE49-F238E27FC236}">
-                <a16:creationId xmlns:a16="http://schemas.microsoft.com/office/drawing/2014/main" xmlns="" id="{5E2F8071-4DA6-4B90-B4A4-A438E6E03060}"/>
+                <a16:creationId xmlns:a16="http://schemas.microsoft.com/office/drawing/2014/main" id="{5E2F8071-4DA6-4B90-B4A4-A438E6E03060}"/>
               </a:ext>
             </a:extLst>
           </p:cNvPr>
@@ -2029,7 +2204,7 @@
           <p:cNvPr id="3" name="Content Placeholder 2">
             <a:extLst>
               <a:ext uri="{FF2B5EF4-FFF2-40B4-BE49-F238E27FC236}">
-                <a16:creationId xmlns:a16="http://schemas.microsoft.com/office/drawing/2014/main" xmlns="" id="{D5C105E5-9A0B-4E45-83F0-D4F884A2211D}"/>
+                <a16:creationId xmlns:a16="http://schemas.microsoft.com/office/drawing/2014/main" id="{D5C105E5-9A0B-4E45-83F0-D4F884A2211D}"/>
               </a:ext>
             </a:extLst>
           </p:cNvPr>
@@ -2091,7 +2266,7 @@
           <p:cNvPr id="4" name="Content Placeholder 3">
             <a:extLst>
               <a:ext uri="{FF2B5EF4-FFF2-40B4-BE49-F238E27FC236}">
-                <a16:creationId xmlns:a16="http://schemas.microsoft.com/office/drawing/2014/main" xmlns="" id="{0EF3A594-083A-4511-ACAA-DD0311225CD5}"/>
+                <a16:creationId xmlns:a16="http://schemas.microsoft.com/office/drawing/2014/main" id="{0EF3A594-083A-4511-ACAA-DD0311225CD5}"/>
               </a:ext>
             </a:extLst>
           </p:cNvPr>
@@ -2153,7 +2328,7 @@
           <p:cNvPr id="5" name="Date Placeholder 4">
             <a:extLst>
               <a:ext uri="{FF2B5EF4-FFF2-40B4-BE49-F238E27FC236}">
-                <a16:creationId xmlns:a16="http://schemas.microsoft.com/office/drawing/2014/main" xmlns="" id="{5626D3B0-1448-4750-83DF-45941F215A40}"/>
+                <a16:creationId xmlns:a16="http://schemas.microsoft.com/office/drawing/2014/main" id="{5626D3B0-1448-4750-83DF-45941F215A40}"/>
               </a:ext>
             </a:extLst>
           </p:cNvPr>
@@ -2171,7 +2346,7 @@
           <a:p>
             <a:fld id="{C3BD6E91-CB9B-46DE-9DB7-C686754E38A3}" type="datetimeFigureOut">
               <a:rPr lang="en-US" smtClean="0"/>
-              <a:t>5/23/2021</a:t>
+              <a:t>5/24/2021</a:t>
             </a:fld>
             <a:endParaRPr lang="en-US"/>
           </a:p>
@@ -2182,7 +2357,7 @@
           <p:cNvPr id="6" name="Footer Placeholder 5">
             <a:extLst>
               <a:ext uri="{FF2B5EF4-FFF2-40B4-BE49-F238E27FC236}">
-                <a16:creationId xmlns:a16="http://schemas.microsoft.com/office/drawing/2014/main" xmlns="" id="{115F5568-BDED-4F86-8B30-0A5852F0DB2C}"/>
+                <a16:creationId xmlns:a16="http://schemas.microsoft.com/office/drawing/2014/main" id="{115F5568-BDED-4F86-8B30-0A5852F0DB2C}"/>
               </a:ext>
             </a:extLst>
           </p:cNvPr>
@@ -2207,7 +2382,7 @@
           <p:cNvPr id="7" name="Slide Number Placeholder 6">
             <a:extLst>
               <a:ext uri="{FF2B5EF4-FFF2-40B4-BE49-F238E27FC236}">
-                <a16:creationId xmlns:a16="http://schemas.microsoft.com/office/drawing/2014/main" xmlns="" id="{C3273A3C-5C3D-4E56-A14A-B14196C43D94}"/>
+                <a16:creationId xmlns:a16="http://schemas.microsoft.com/office/drawing/2014/main" id="{C3273A3C-5C3D-4E56-A14A-B14196C43D94}"/>
               </a:ext>
             </a:extLst>
           </p:cNvPr>
@@ -2266,7 +2441,7 @@
           <p:cNvPr id="2" name="Title 1">
             <a:extLst>
               <a:ext uri="{FF2B5EF4-FFF2-40B4-BE49-F238E27FC236}">
-                <a16:creationId xmlns:a16="http://schemas.microsoft.com/office/drawing/2014/main" xmlns="" id="{DD4D31BD-5210-4743-84A6-584D2D19AAD6}"/>
+                <a16:creationId xmlns:a16="http://schemas.microsoft.com/office/drawing/2014/main" id="{DD4D31BD-5210-4743-84A6-584D2D19AAD6}"/>
               </a:ext>
             </a:extLst>
           </p:cNvPr>
@@ -2299,7 +2474,7 @@
           <p:cNvPr id="3" name="Text Placeholder 2">
             <a:extLst>
               <a:ext uri="{FF2B5EF4-FFF2-40B4-BE49-F238E27FC236}">
-                <a16:creationId xmlns:a16="http://schemas.microsoft.com/office/drawing/2014/main" xmlns="" id="{D63E8E0E-C674-406A-B572-DE447BCFCDBE}"/>
+                <a16:creationId xmlns:a16="http://schemas.microsoft.com/office/drawing/2014/main" id="{D63E8E0E-C674-406A-B572-DE447BCFCDBE}"/>
               </a:ext>
             </a:extLst>
           </p:cNvPr>
@@ -2370,7 +2545,7 @@
           <p:cNvPr id="4" name="Content Placeholder 3">
             <a:extLst>
               <a:ext uri="{FF2B5EF4-FFF2-40B4-BE49-F238E27FC236}">
-                <a16:creationId xmlns:a16="http://schemas.microsoft.com/office/drawing/2014/main" xmlns="" id="{A4C08255-4E10-4CCB-9155-86B8CE45167B}"/>
+                <a16:creationId xmlns:a16="http://schemas.microsoft.com/office/drawing/2014/main" id="{A4C08255-4E10-4CCB-9155-86B8CE45167B}"/>
               </a:ext>
             </a:extLst>
           </p:cNvPr>
@@ -2432,7 +2607,7 @@
           <p:cNvPr id="5" name="Text Placeholder 4">
             <a:extLst>
               <a:ext uri="{FF2B5EF4-FFF2-40B4-BE49-F238E27FC236}">
-                <a16:creationId xmlns:a16="http://schemas.microsoft.com/office/drawing/2014/main" xmlns="" id="{E28BD2CD-CF94-41FB-86B7-3F2C1222ADEE}"/>
+                <a16:creationId xmlns:a16="http://schemas.microsoft.com/office/drawing/2014/main" id="{E28BD2CD-CF94-41FB-86B7-3F2C1222ADEE}"/>
               </a:ext>
             </a:extLst>
           </p:cNvPr>
@@ -2503,7 +2678,7 @@
           <p:cNvPr id="6" name="Content Placeholder 5">
             <a:extLst>
               <a:ext uri="{FF2B5EF4-FFF2-40B4-BE49-F238E27FC236}">
-                <a16:creationId xmlns:a16="http://schemas.microsoft.com/office/drawing/2014/main" xmlns="" id="{7A2680D8-3757-45EF-85F9-8CA4CC15ECA2}"/>
+                <a16:creationId xmlns:a16="http://schemas.microsoft.com/office/drawing/2014/main" id="{7A2680D8-3757-45EF-85F9-8CA4CC15ECA2}"/>
               </a:ext>
             </a:extLst>
           </p:cNvPr>
@@ -2565,7 +2740,7 @@
           <p:cNvPr id="7" name="Date Placeholder 6">
             <a:extLst>
               <a:ext uri="{FF2B5EF4-FFF2-40B4-BE49-F238E27FC236}">
-                <a16:creationId xmlns:a16="http://schemas.microsoft.com/office/drawing/2014/main" xmlns="" id="{D27802DD-D22A-40CF-A1C1-18A87B9427F1}"/>
+                <a16:creationId xmlns:a16="http://schemas.microsoft.com/office/drawing/2014/main" id="{D27802DD-D22A-40CF-A1C1-18A87B9427F1}"/>
               </a:ext>
             </a:extLst>
           </p:cNvPr>
@@ -2583,7 +2758,7 @@
           <a:p>
             <a:fld id="{C3BD6E91-CB9B-46DE-9DB7-C686754E38A3}" type="datetimeFigureOut">
               <a:rPr lang="en-US" smtClean="0"/>
-              <a:t>5/23/2021</a:t>
+              <a:t>5/24/2021</a:t>
             </a:fld>
             <a:endParaRPr lang="en-US"/>
           </a:p>
@@ -2594,7 +2769,7 @@
           <p:cNvPr id="8" name="Footer Placeholder 7">
             <a:extLst>
               <a:ext uri="{FF2B5EF4-FFF2-40B4-BE49-F238E27FC236}">
-                <a16:creationId xmlns:a16="http://schemas.microsoft.com/office/drawing/2014/main" xmlns="" id="{BC2E926B-50C5-4E44-8907-C2656E33C275}"/>
+                <a16:creationId xmlns:a16="http://schemas.microsoft.com/office/drawing/2014/main" id="{BC2E926B-50C5-4E44-8907-C2656E33C275}"/>
               </a:ext>
             </a:extLst>
           </p:cNvPr>
@@ -2619,7 +2794,7 @@
           <p:cNvPr id="9" name="Slide Number Placeholder 8">
             <a:extLst>
               <a:ext uri="{FF2B5EF4-FFF2-40B4-BE49-F238E27FC236}">
-                <a16:creationId xmlns:a16="http://schemas.microsoft.com/office/drawing/2014/main" xmlns="" id="{125AC05D-95EB-474E-A347-56ACAA09B2F5}"/>
+                <a16:creationId xmlns:a16="http://schemas.microsoft.com/office/drawing/2014/main" id="{125AC05D-95EB-474E-A347-56ACAA09B2F5}"/>
               </a:ext>
             </a:extLst>
           </p:cNvPr>
@@ -2678,7 +2853,7 @@
           <p:cNvPr id="2" name="Title 1">
             <a:extLst>
               <a:ext uri="{FF2B5EF4-FFF2-40B4-BE49-F238E27FC236}">
-                <a16:creationId xmlns:a16="http://schemas.microsoft.com/office/drawing/2014/main" xmlns="" id="{FBACAC38-2DE6-448B-A0B0-DD87BAFAC1D2}"/>
+                <a16:creationId xmlns:a16="http://schemas.microsoft.com/office/drawing/2014/main" id="{FBACAC38-2DE6-448B-A0B0-DD87BAFAC1D2}"/>
               </a:ext>
             </a:extLst>
           </p:cNvPr>
@@ -2706,7 +2881,7 @@
           <p:cNvPr id="3" name="Date Placeholder 2">
             <a:extLst>
               <a:ext uri="{FF2B5EF4-FFF2-40B4-BE49-F238E27FC236}">
-                <a16:creationId xmlns:a16="http://schemas.microsoft.com/office/drawing/2014/main" xmlns="" id="{10AB678E-A63B-4E3D-A92B-0B87C743A98D}"/>
+                <a16:creationId xmlns:a16="http://schemas.microsoft.com/office/drawing/2014/main" id="{10AB678E-A63B-4E3D-A92B-0B87C743A98D}"/>
               </a:ext>
             </a:extLst>
           </p:cNvPr>
@@ -2724,7 +2899,7 @@
           <a:p>
             <a:fld id="{C3BD6E91-CB9B-46DE-9DB7-C686754E38A3}" type="datetimeFigureOut">
               <a:rPr lang="en-US" smtClean="0"/>
-              <a:t>5/23/2021</a:t>
+              <a:t>5/24/2021</a:t>
             </a:fld>
             <a:endParaRPr lang="en-US"/>
           </a:p>
@@ -2735,7 +2910,7 @@
           <p:cNvPr id="4" name="Footer Placeholder 3">
             <a:extLst>
               <a:ext uri="{FF2B5EF4-FFF2-40B4-BE49-F238E27FC236}">
-                <a16:creationId xmlns:a16="http://schemas.microsoft.com/office/drawing/2014/main" xmlns="" id="{68A48ACD-6140-45C7-A6E6-8349B6535666}"/>
+                <a16:creationId xmlns:a16="http://schemas.microsoft.com/office/drawing/2014/main" id="{68A48ACD-6140-45C7-A6E6-8349B6535666}"/>
               </a:ext>
             </a:extLst>
           </p:cNvPr>
@@ -2760,7 +2935,7 @@
           <p:cNvPr id="5" name="Slide Number Placeholder 4">
             <a:extLst>
               <a:ext uri="{FF2B5EF4-FFF2-40B4-BE49-F238E27FC236}">
-                <a16:creationId xmlns:a16="http://schemas.microsoft.com/office/drawing/2014/main" xmlns="" id="{3681DDBA-5555-4E55-B240-CC33344D9ED3}"/>
+                <a16:creationId xmlns:a16="http://schemas.microsoft.com/office/drawing/2014/main" id="{3681DDBA-5555-4E55-B240-CC33344D9ED3}"/>
               </a:ext>
             </a:extLst>
           </p:cNvPr>
@@ -2819,7 +2994,7 @@
           <p:cNvPr id="2" name="Date Placeholder 1">
             <a:extLst>
               <a:ext uri="{FF2B5EF4-FFF2-40B4-BE49-F238E27FC236}">
-                <a16:creationId xmlns:a16="http://schemas.microsoft.com/office/drawing/2014/main" xmlns="" id="{FD00BC90-E297-4742-9C66-749B52DB1B0D}"/>
+                <a16:creationId xmlns:a16="http://schemas.microsoft.com/office/drawing/2014/main" id="{FD00BC90-E297-4742-9C66-749B52DB1B0D}"/>
               </a:ext>
             </a:extLst>
           </p:cNvPr>
@@ -2837,7 +3012,7 @@
           <a:p>
             <a:fld id="{C3BD6E91-CB9B-46DE-9DB7-C686754E38A3}" type="datetimeFigureOut">
               <a:rPr lang="en-US" smtClean="0"/>
-              <a:t>5/23/2021</a:t>
+              <a:t>5/24/2021</a:t>
             </a:fld>
             <a:endParaRPr lang="en-US"/>
           </a:p>
@@ -2848,7 +3023,7 @@
           <p:cNvPr id="3" name="Footer Placeholder 2">
             <a:extLst>
               <a:ext uri="{FF2B5EF4-FFF2-40B4-BE49-F238E27FC236}">
-                <a16:creationId xmlns:a16="http://schemas.microsoft.com/office/drawing/2014/main" xmlns="" id="{33FC1C04-00E9-4794-BBA2-F350991B7E4A}"/>
+                <a16:creationId xmlns:a16="http://schemas.microsoft.com/office/drawing/2014/main" id="{33FC1C04-00E9-4794-BBA2-F350991B7E4A}"/>
               </a:ext>
             </a:extLst>
           </p:cNvPr>
@@ -2873,7 +3048,7 @@
           <p:cNvPr id="4" name="Slide Number Placeholder 3">
             <a:extLst>
               <a:ext uri="{FF2B5EF4-FFF2-40B4-BE49-F238E27FC236}">
-                <a16:creationId xmlns:a16="http://schemas.microsoft.com/office/drawing/2014/main" xmlns="" id="{F936D8EC-1555-41E7-A7D3-3395B856F657}"/>
+                <a16:creationId xmlns:a16="http://schemas.microsoft.com/office/drawing/2014/main" id="{F936D8EC-1555-41E7-A7D3-3395B856F657}"/>
               </a:ext>
             </a:extLst>
           </p:cNvPr>
@@ -2932,7 +3107,7 @@
           <p:cNvPr id="2" name="Title 1">
             <a:extLst>
               <a:ext uri="{FF2B5EF4-FFF2-40B4-BE49-F238E27FC236}">
-                <a16:creationId xmlns:a16="http://schemas.microsoft.com/office/drawing/2014/main" xmlns="" id="{6ABBF080-496F-4F5E-B7C1-FC40B07365BD}"/>
+                <a16:creationId xmlns:a16="http://schemas.microsoft.com/office/drawing/2014/main" id="{6ABBF080-496F-4F5E-B7C1-FC40B07365BD}"/>
               </a:ext>
             </a:extLst>
           </p:cNvPr>
@@ -2969,7 +3144,7 @@
           <p:cNvPr id="3" name="Content Placeholder 2">
             <a:extLst>
               <a:ext uri="{FF2B5EF4-FFF2-40B4-BE49-F238E27FC236}">
-                <a16:creationId xmlns:a16="http://schemas.microsoft.com/office/drawing/2014/main" xmlns="" id="{BF098739-ACD9-4A13-A69C-80FA70DF0E62}"/>
+                <a16:creationId xmlns:a16="http://schemas.microsoft.com/office/drawing/2014/main" id="{BF098739-ACD9-4A13-A69C-80FA70DF0E62}"/>
               </a:ext>
             </a:extLst>
           </p:cNvPr>
@@ -3059,7 +3234,7 @@
           <p:cNvPr id="4" name="Text Placeholder 3">
             <a:extLst>
               <a:ext uri="{FF2B5EF4-FFF2-40B4-BE49-F238E27FC236}">
-                <a16:creationId xmlns:a16="http://schemas.microsoft.com/office/drawing/2014/main" xmlns="" id="{DB9CADFF-F0A7-4E21-A23D-54D325371595}"/>
+                <a16:creationId xmlns:a16="http://schemas.microsoft.com/office/drawing/2014/main" id="{DB9CADFF-F0A7-4E21-A23D-54D325371595}"/>
               </a:ext>
             </a:extLst>
           </p:cNvPr>
@@ -3130,7 +3305,7 @@
           <p:cNvPr id="5" name="Date Placeholder 4">
             <a:extLst>
               <a:ext uri="{FF2B5EF4-FFF2-40B4-BE49-F238E27FC236}">
-                <a16:creationId xmlns:a16="http://schemas.microsoft.com/office/drawing/2014/main" xmlns="" id="{B5245E32-67A0-4577-8F89-B0395D3325FB}"/>
+                <a16:creationId xmlns:a16="http://schemas.microsoft.com/office/drawing/2014/main" id="{B5245E32-67A0-4577-8F89-B0395D3325FB}"/>
               </a:ext>
             </a:extLst>
           </p:cNvPr>
@@ -3148,7 +3323,7 @@
           <a:p>
             <a:fld id="{C3BD6E91-CB9B-46DE-9DB7-C686754E38A3}" type="datetimeFigureOut">
               <a:rPr lang="en-US" smtClean="0"/>
-              <a:t>5/23/2021</a:t>
+              <a:t>5/24/2021</a:t>
             </a:fld>
             <a:endParaRPr lang="en-US"/>
           </a:p>
@@ -3159,7 +3334,7 @@
           <p:cNvPr id="6" name="Footer Placeholder 5">
             <a:extLst>
               <a:ext uri="{FF2B5EF4-FFF2-40B4-BE49-F238E27FC236}">
-                <a16:creationId xmlns:a16="http://schemas.microsoft.com/office/drawing/2014/main" xmlns="" id="{79ABB268-E709-4534-916C-8432F3AD9A6A}"/>
+                <a16:creationId xmlns:a16="http://schemas.microsoft.com/office/drawing/2014/main" id="{79ABB268-E709-4534-916C-8432F3AD9A6A}"/>
               </a:ext>
             </a:extLst>
           </p:cNvPr>
@@ -3184,7 +3359,7 @@
           <p:cNvPr id="7" name="Slide Number Placeholder 6">
             <a:extLst>
               <a:ext uri="{FF2B5EF4-FFF2-40B4-BE49-F238E27FC236}">
-                <a16:creationId xmlns:a16="http://schemas.microsoft.com/office/drawing/2014/main" xmlns="" id="{6B900B76-DD52-49A7-8413-4F4AEDE50EC6}"/>
+                <a16:creationId xmlns:a16="http://schemas.microsoft.com/office/drawing/2014/main" id="{6B900B76-DD52-49A7-8413-4F4AEDE50EC6}"/>
               </a:ext>
             </a:extLst>
           </p:cNvPr>
@@ -3243,7 +3418,7 @@
           <p:cNvPr id="2" name="Title 1">
             <a:extLst>
               <a:ext uri="{FF2B5EF4-FFF2-40B4-BE49-F238E27FC236}">
-                <a16:creationId xmlns:a16="http://schemas.microsoft.com/office/drawing/2014/main" xmlns="" id="{EE86DDC4-1930-4487-B1E8-C942E7A1E117}"/>
+                <a16:creationId xmlns:a16="http://schemas.microsoft.com/office/drawing/2014/main" id="{EE86DDC4-1930-4487-B1E8-C942E7A1E117}"/>
               </a:ext>
             </a:extLst>
           </p:cNvPr>
@@ -3280,7 +3455,7 @@
           <p:cNvPr id="3" name="Picture Placeholder 2">
             <a:extLst>
               <a:ext uri="{FF2B5EF4-FFF2-40B4-BE49-F238E27FC236}">
-                <a16:creationId xmlns:a16="http://schemas.microsoft.com/office/drawing/2014/main" xmlns="" id="{01EF7F34-8D4F-40B2-815A-42BC78972862}"/>
+                <a16:creationId xmlns:a16="http://schemas.microsoft.com/office/drawing/2014/main" id="{01EF7F34-8D4F-40B2-815A-42BC78972862}"/>
               </a:ext>
             </a:extLst>
           </p:cNvPr>
@@ -3347,7 +3522,7 @@
           <p:cNvPr id="4" name="Text Placeholder 3">
             <a:extLst>
               <a:ext uri="{FF2B5EF4-FFF2-40B4-BE49-F238E27FC236}">
-                <a16:creationId xmlns:a16="http://schemas.microsoft.com/office/drawing/2014/main" xmlns="" id="{8AF11B40-10E4-4BB0-8718-B93FCE25D3AE}"/>
+                <a16:creationId xmlns:a16="http://schemas.microsoft.com/office/drawing/2014/main" id="{8AF11B40-10E4-4BB0-8718-B93FCE25D3AE}"/>
               </a:ext>
             </a:extLst>
           </p:cNvPr>
@@ -3418,7 +3593,7 @@
           <p:cNvPr id="5" name="Date Placeholder 4">
             <a:extLst>
               <a:ext uri="{FF2B5EF4-FFF2-40B4-BE49-F238E27FC236}">
-                <a16:creationId xmlns:a16="http://schemas.microsoft.com/office/drawing/2014/main" xmlns="" id="{ACBC4639-53C0-4008-8404-59B90461EDCF}"/>
+                <a16:creationId xmlns:a16="http://schemas.microsoft.com/office/drawing/2014/main" id="{ACBC4639-53C0-4008-8404-59B90461EDCF}"/>
               </a:ext>
             </a:extLst>
           </p:cNvPr>
@@ -3436,7 +3611,7 @@
           <a:p>
             <a:fld id="{C3BD6E91-CB9B-46DE-9DB7-C686754E38A3}" type="datetimeFigureOut">
               <a:rPr lang="en-US" smtClean="0"/>
-              <a:t>5/23/2021</a:t>
+              <a:t>5/24/2021</a:t>
             </a:fld>
             <a:endParaRPr lang="en-US"/>
           </a:p>
@@ -3447,7 +3622,7 @@
           <p:cNvPr id="6" name="Footer Placeholder 5">
             <a:extLst>
               <a:ext uri="{FF2B5EF4-FFF2-40B4-BE49-F238E27FC236}">
-                <a16:creationId xmlns:a16="http://schemas.microsoft.com/office/drawing/2014/main" xmlns="" id="{A567F339-CB88-46C0-BC66-10976D0E925D}"/>
+                <a16:creationId xmlns:a16="http://schemas.microsoft.com/office/drawing/2014/main" id="{A567F339-CB88-46C0-BC66-10976D0E925D}"/>
               </a:ext>
             </a:extLst>
           </p:cNvPr>
@@ -3472,7 +3647,7 @@
           <p:cNvPr id="7" name="Slide Number Placeholder 6">
             <a:extLst>
               <a:ext uri="{FF2B5EF4-FFF2-40B4-BE49-F238E27FC236}">
-                <a16:creationId xmlns:a16="http://schemas.microsoft.com/office/drawing/2014/main" xmlns="" id="{E8E38F07-4752-47F8-8313-1F41DEB48C94}"/>
+                <a16:creationId xmlns:a16="http://schemas.microsoft.com/office/drawing/2014/main" id="{E8E38F07-4752-47F8-8313-1F41DEB48C94}"/>
               </a:ext>
             </a:extLst>
           </p:cNvPr>
@@ -3536,7 +3711,7 @@
           <p:cNvPr id="2" name="Title Placeholder 1">
             <a:extLst>
               <a:ext uri="{FF2B5EF4-FFF2-40B4-BE49-F238E27FC236}">
-                <a16:creationId xmlns:a16="http://schemas.microsoft.com/office/drawing/2014/main" xmlns="" id="{F61B366B-F40A-4419-A4D7-5D004C94EBDE}"/>
+                <a16:creationId xmlns:a16="http://schemas.microsoft.com/office/drawing/2014/main" id="{F61B366B-F40A-4419-A4D7-5D004C94EBDE}"/>
               </a:ext>
             </a:extLst>
           </p:cNvPr>
@@ -3574,7 +3749,7 @@
           <p:cNvPr id="3" name="Text Placeholder 2">
             <a:extLst>
               <a:ext uri="{FF2B5EF4-FFF2-40B4-BE49-F238E27FC236}">
-                <a16:creationId xmlns:a16="http://schemas.microsoft.com/office/drawing/2014/main" xmlns="" id="{B40DAC84-2516-4982-BDD6-D65807112503}"/>
+                <a16:creationId xmlns:a16="http://schemas.microsoft.com/office/drawing/2014/main" id="{B40DAC84-2516-4982-BDD6-D65807112503}"/>
               </a:ext>
             </a:extLst>
           </p:cNvPr>
@@ -3641,7 +3816,7 @@
           <p:cNvPr id="4" name="Date Placeholder 3">
             <a:extLst>
               <a:ext uri="{FF2B5EF4-FFF2-40B4-BE49-F238E27FC236}">
-                <a16:creationId xmlns:a16="http://schemas.microsoft.com/office/drawing/2014/main" xmlns="" id="{AA15E1FE-A689-4C33-A970-770074DF0A0E}"/>
+                <a16:creationId xmlns:a16="http://schemas.microsoft.com/office/drawing/2014/main" id="{AA15E1FE-A689-4C33-A970-770074DF0A0E}"/>
               </a:ext>
             </a:extLst>
           </p:cNvPr>
@@ -3677,7 +3852,7 @@
           <a:p>
             <a:fld id="{C3BD6E91-CB9B-46DE-9DB7-C686754E38A3}" type="datetimeFigureOut">
               <a:rPr lang="en-US" smtClean="0"/>
-              <a:t>5/23/2021</a:t>
+              <a:t>5/24/2021</a:t>
             </a:fld>
             <a:endParaRPr lang="en-US"/>
           </a:p>
@@ -3688,7 +3863,7 @@
           <p:cNvPr id="5" name="Footer Placeholder 4">
             <a:extLst>
               <a:ext uri="{FF2B5EF4-FFF2-40B4-BE49-F238E27FC236}">
-                <a16:creationId xmlns:a16="http://schemas.microsoft.com/office/drawing/2014/main" xmlns="" id="{2888D4B7-C3FC-48A2-9CC7-F017D0CA3861}"/>
+                <a16:creationId xmlns:a16="http://schemas.microsoft.com/office/drawing/2014/main" id="{2888D4B7-C3FC-48A2-9CC7-F017D0CA3861}"/>
               </a:ext>
             </a:extLst>
           </p:cNvPr>
@@ -3731,7 +3906,7 @@
           <p:cNvPr id="6" name="Slide Number Placeholder 5">
             <a:extLst>
               <a:ext uri="{FF2B5EF4-FFF2-40B4-BE49-F238E27FC236}">
-                <a16:creationId xmlns:a16="http://schemas.microsoft.com/office/drawing/2014/main" xmlns="" id="{69A22127-F24C-48C8-BC78-D8F41EB3C2C0}"/>
+                <a16:creationId xmlns:a16="http://schemas.microsoft.com/office/drawing/2014/main" id="{69A22127-F24C-48C8-BC78-D8F41EB3C2C0}"/>
               </a:ext>
             </a:extLst>
           </p:cNvPr>
@@ -4099,7 +4274,7 @@
           <p:cNvPr id="19" name="Group 18">
             <a:extLst>
               <a:ext uri="{FF2B5EF4-FFF2-40B4-BE49-F238E27FC236}">
-                <a16:creationId xmlns:a16="http://schemas.microsoft.com/office/drawing/2014/main" xmlns="" id="{CDAC0C9A-D2F6-4B13-B41C-C8A5462750E0}"/>
+                <a16:creationId xmlns:a16="http://schemas.microsoft.com/office/drawing/2014/main" id="{CDAC0C9A-D2F6-4B13-B41C-C8A5462750E0}"/>
               </a:ext>
             </a:extLst>
           </p:cNvPr>
@@ -4119,7 +4294,7 @@
             <p:cNvPr id="14" name="Rectangle 13">
               <a:extLst>
                 <a:ext uri="{FF2B5EF4-FFF2-40B4-BE49-F238E27FC236}">
-                  <a16:creationId xmlns:a16="http://schemas.microsoft.com/office/drawing/2014/main" xmlns="" id="{A2584670-1767-4A16-80B5-C49984D69591}"/>
+                  <a16:creationId xmlns:a16="http://schemas.microsoft.com/office/drawing/2014/main" id="{A2584670-1767-4A16-80B5-C49984D69591}"/>
                 </a:ext>
               </a:extLst>
             </p:cNvPr>
@@ -4170,7 +4345,7 @@
             <p:cNvPr id="13" name="Rectangle 12">
               <a:extLst>
                 <a:ext uri="{FF2B5EF4-FFF2-40B4-BE49-F238E27FC236}">
-                  <a16:creationId xmlns:a16="http://schemas.microsoft.com/office/drawing/2014/main" xmlns="" id="{7AD5B5D8-5106-4F59-8417-20F6044A3999}"/>
+                  <a16:creationId xmlns:a16="http://schemas.microsoft.com/office/drawing/2014/main" id="{7AD5B5D8-5106-4F59-8417-20F6044A3999}"/>
                 </a:ext>
               </a:extLst>
             </p:cNvPr>
@@ -4221,7 +4396,7 @@
             <p:cNvPr id="12" name="Rectangle 11">
               <a:extLst>
                 <a:ext uri="{FF2B5EF4-FFF2-40B4-BE49-F238E27FC236}">
-                  <a16:creationId xmlns:a16="http://schemas.microsoft.com/office/drawing/2014/main" xmlns="" id="{446DAC06-4549-4071-B229-337D719B71FF}"/>
+                  <a16:creationId xmlns:a16="http://schemas.microsoft.com/office/drawing/2014/main" id="{446DAC06-4549-4071-B229-337D719B71FF}"/>
                 </a:ext>
               </a:extLst>
             </p:cNvPr>
@@ -4272,7 +4447,7 @@
             <p:cNvPr id="11" name="Rectangle 10">
               <a:extLst>
                 <a:ext uri="{FF2B5EF4-FFF2-40B4-BE49-F238E27FC236}">
-                  <a16:creationId xmlns:a16="http://schemas.microsoft.com/office/drawing/2014/main" xmlns="" id="{FD09FE59-1A50-462C-950A-BFB132B68F00}"/>
+                  <a16:creationId xmlns:a16="http://schemas.microsoft.com/office/drawing/2014/main" id="{FD09FE59-1A50-462C-950A-BFB132B68F00}"/>
                 </a:ext>
               </a:extLst>
             </p:cNvPr>
@@ -4323,7 +4498,7 @@
             <p:cNvPr id="15" name="TextBox 14">
               <a:extLst>
                 <a:ext uri="{FF2B5EF4-FFF2-40B4-BE49-F238E27FC236}">
-                  <a16:creationId xmlns:a16="http://schemas.microsoft.com/office/drawing/2014/main" xmlns="" id="{6AF20C2E-9D5B-4EEF-A299-C2E43FB7B026}"/>
+                  <a16:creationId xmlns:a16="http://schemas.microsoft.com/office/drawing/2014/main" id="{6AF20C2E-9D5B-4EEF-A299-C2E43FB7B026}"/>
                 </a:ext>
               </a:extLst>
             </p:cNvPr>
@@ -4358,7 +4533,7 @@
             <p:cNvPr id="16" name="TextBox 15">
               <a:extLst>
                 <a:ext uri="{FF2B5EF4-FFF2-40B4-BE49-F238E27FC236}">
-                  <a16:creationId xmlns:a16="http://schemas.microsoft.com/office/drawing/2014/main" xmlns="" id="{EA99F817-7753-4226-83A2-E9EC6C6C18BD}"/>
+                  <a16:creationId xmlns:a16="http://schemas.microsoft.com/office/drawing/2014/main" id="{EA99F817-7753-4226-83A2-E9EC6C6C18BD}"/>
                 </a:ext>
               </a:extLst>
             </p:cNvPr>
@@ -4393,7 +4568,7 @@
             <p:cNvPr id="17" name="TextBox 16">
               <a:extLst>
                 <a:ext uri="{FF2B5EF4-FFF2-40B4-BE49-F238E27FC236}">
-                  <a16:creationId xmlns:a16="http://schemas.microsoft.com/office/drawing/2014/main" xmlns="" id="{5DB1DDEF-723A-4BF2-8095-4E7FC45F8322}"/>
+                  <a16:creationId xmlns:a16="http://schemas.microsoft.com/office/drawing/2014/main" id="{5DB1DDEF-723A-4BF2-8095-4E7FC45F8322}"/>
                 </a:ext>
               </a:extLst>
             </p:cNvPr>
@@ -4434,7 +4609,7 @@
             <p:cNvPr id="18" name="TextBox 17">
               <a:extLst>
                 <a:ext uri="{FF2B5EF4-FFF2-40B4-BE49-F238E27FC236}">
-                  <a16:creationId xmlns:a16="http://schemas.microsoft.com/office/drawing/2014/main" xmlns="" id="{F4D85B1A-A46E-47A8-B472-A2156256C06F}"/>
+                  <a16:creationId xmlns:a16="http://schemas.microsoft.com/office/drawing/2014/main" id="{F4D85B1A-A46E-47A8-B472-A2156256C06F}"/>
                 </a:ext>
               </a:extLst>
             </p:cNvPr>
@@ -4476,7 +4651,7 @@
           <p:cNvPr id="2" name="TextBox 1">
             <a:extLst>
               <a:ext uri="{FF2B5EF4-FFF2-40B4-BE49-F238E27FC236}">
-                <a16:creationId xmlns:a16="http://schemas.microsoft.com/office/drawing/2014/main" xmlns="" id="{3EA5EFB2-8693-4730-8432-C8260C051ECC}"/>
+                <a16:creationId xmlns:a16="http://schemas.microsoft.com/office/drawing/2014/main" id="{3EA5EFB2-8693-4730-8432-C8260C051ECC}"/>
               </a:ext>
             </a:extLst>
           </p:cNvPr>
@@ -4516,7 +4691,7 @@
           <p:cNvPr id="3" name="TextBox 2">
             <a:extLst>
               <a:ext uri="{FF2B5EF4-FFF2-40B4-BE49-F238E27FC236}">
-                <a16:creationId xmlns:a16="http://schemas.microsoft.com/office/drawing/2014/main" xmlns="" id="{975EFDB7-C36E-410A-BB80-E2F67F809DA8}"/>
+                <a16:creationId xmlns:a16="http://schemas.microsoft.com/office/drawing/2014/main" id="{975EFDB7-C36E-410A-BB80-E2F67F809DA8}"/>
               </a:ext>
             </a:extLst>
           </p:cNvPr>
@@ -4556,7 +4731,7 @@
           <p:cNvPr id="4" name="TextBox 3">
             <a:extLst>
               <a:ext uri="{FF2B5EF4-FFF2-40B4-BE49-F238E27FC236}">
-                <a16:creationId xmlns:a16="http://schemas.microsoft.com/office/drawing/2014/main" xmlns="" id="{90A4A6F0-9C13-42C8-A659-F7FF5FE901D9}"/>
+                <a16:creationId xmlns:a16="http://schemas.microsoft.com/office/drawing/2014/main" id="{90A4A6F0-9C13-42C8-A659-F7FF5FE901D9}"/>
               </a:ext>
             </a:extLst>
           </p:cNvPr>
@@ -4596,7 +4771,7 @@
           <p:cNvPr id="5" name="TextBox 4">
             <a:extLst>
               <a:ext uri="{FF2B5EF4-FFF2-40B4-BE49-F238E27FC236}">
-                <a16:creationId xmlns:a16="http://schemas.microsoft.com/office/drawing/2014/main" xmlns="" id="{9617628B-6AA4-403C-AF7E-99442E816A0C}"/>
+                <a16:creationId xmlns:a16="http://schemas.microsoft.com/office/drawing/2014/main" id="{9617628B-6AA4-403C-AF7E-99442E816A0C}"/>
               </a:ext>
             </a:extLst>
           </p:cNvPr>
@@ -4642,7 +4817,7 @@
           <p:cNvPr id="6" name="TextBox 5">
             <a:extLst>
               <a:ext uri="{FF2B5EF4-FFF2-40B4-BE49-F238E27FC236}">
-                <a16:creationId xmlns:a16="http://schemas.microsoft.com/office/drawing/2014/main" xmlns="" id="{52C6614F-CD01-42B0-9AC2-D3A4FE8785D3}"/>
+                <a16:creationId xmlns:a16="http://schemas.microsoft.com/office/drawing/2014/main" id="{52C6614F-CD01-42B0-9AC2-D3A4FE8785D3}"/>
               </a:ext>
             </a:extLst>
           </p:cNvPr>
@@ -4682,7 +4857,7 @@
           <p:cNvPr id="7" name="TextBox 6">
             <a:extLst>
               <a:ext uri="{FF2B5EF4-FFF2-40B4-BE49-F238E27FC236}">
-                <a16:creationId xmlns:a16="http://schemas.microsoft.com/office/drawing/2014/main" xmlns="" id="{29AB6F83-6C19-4AD0-98C8-CF554F4012D6}"/>
+                <a16:creationId xmlns:a16="http://schemas.microsoft.com/office/drawing/2014/main" id="{29AB6F83-6C19-4AD0-98C8-CF554F4012D6}"/>
               </a:ext>
             </a:extLst>
           </p:cNvPr>
@@ -4728,7 +4903,7 @@
           <p:cNvPr id="8" name="TextBox 7">
             <a:extLst>
               <a:ext uri="{FF2B5EF4-FFF2-40B4-BE49-F238E27FC236}">
-                <a16:creationId xmlns:a16="http://schemas.microsoft.com/office/drawing/2014/main" xmlns="" id="{530BFE47-CB7D-4662-A3DE-05C77B558530}"/>
+                <a16:creationId xmlns:a16="http://schemas.microsoft.com/office/drawing/2014/main" id="{530BFE47-CB7D-4662-A3DE-05C77B558530}"/>
               </a:ext>
             </a:extLst>
           </p:cNvPr>
@@ -4768,7 +4943,7 @@
           <p:cNvPr id="9" name="TextBox 8">
             <a:extLst>
               <a:ext uri="{FF2B5EF4-FFF2-40B4-BE49-F238E27FC236}">
-                <a16:creationId xmlns:a16="http://schemas.microsoft.com/office/drawing/2014/main" xmlns="" id="{D3CE65D1-D33E-4D1F-BE4C-F8A348C8A6CA}"/>
+                <a16:creationId xmlns:a16="http://schemas.microsoft.com/office/drawing/2014/main" id="{D3CE65D1-D33E-4D1F-BE4C-F8A348C8A6CA}"/>
               </a:ext>
             </a:extLst>
           </p:cNvPr>
@@ -4808,7 +4983,7 @@
           <p:cNvPr id="10" name="TextBox 9">
             <a:extLst>
               <a:ext uri="{FF2B5EF4-FFF2-40B4-BE49-F238E27FC236}">
-                <a16:creationId xmlns:a16="http://schemas.microsoft.com/office/drawing/2014/main" xmlns="" id="{D4F871EE-4E63-4319-9C0C-27DB0606F08A}"/>
+                <a16:creationId xmlns:a16="http://schemas.microsoft.com/office/drawing/2014/main" id="{D4F871EE-4E63-4319-9C0C-27DB0606F08A}"/>
               </a:ext>
             </a:extLst>
           </p:cNvPr>
@@ -4884,7 +5059,7 @@
           <p:cNvPr id="2" name="Group 1">
             <a:extLst>
               <a:ext uri="{FF2B5EF4-FFF2-40B4-BE49-F238E27FC236}">
-                <a16:creationId xmlns:a16="http://schemas.microsoft.com/office/drawing/2014/main" xmlns="" id="{9CBC7E17-E67E-419B-B736-0C9BECE30E2E}"/>
+                <a16:creationId xmlns:a16="http://schemas.microsoft.com/office/drawing/2014/main" id="{9CBC7E17-E67E-419B-B736-0C9BECE30E2E}"/>
               </a:ext>
             </a:extLst>
           </p:cNvPr>
@@ -4933,7 +5108,7 @@
             <p:cNvPr id="3" name="Isosceles Triangle 2">
               <a:extLst>
                 <a:ext uri="{FF2B5EF4-FFF2-40B4-BE49-F238E27FC236}">
-                  <a16:creationId xmlns:a16="http://schemas.microsoft.com/office/drawing/2014/main" xmlns="" id="{F9F2BA27-5A95-4F29-82E3-52B61ED2CCD8}"/>
+                  <a16:creationId xmlns:a16="http://schemas.microsoft.com/office/drawing/2014/main" id="{F9F2BA27-5A95-4F29-82E3-52B61ED2CCD8}"/>
                 </a:ext>
               </a:extLst>
             </p:cNvPr>
@@ -4985,7 +5160,7 @@
             <p:cNvPr id="4" name="Flowchart: Delay 3">
               <a:extLst>
                 <a:ext uri="{FF2B5EF4-FFF2-40B4-BE49-F238E27FC236}">
-                  <a16:creationId xmlns:a16="http://schemas.microsoft.com/office/drawing/2014/main" xmlns="" id="{25E6FA35-9188-4626-B547-5B66266FFA98}"/>
+                  <a16:creationId xmlns:a16="http://schemas.microsoft.com/office/drawing/2014/main" id="{25E6FA35-9188-4626-B547-5B66266FFA98}"/>
                 </a:ext>
               </a:extLst>
             </p:cNvPr>
@@ -5037,7 +5212,7 @@
             <p:cNvPr id="5" name="Diagonal Stripe 4">
               <a:extLst>
                 <a:ext uri="{FF2B5EF4-FFF2-40B4-BE49-F238E27FC236}">
-                  <a16:creationId xmlns:a16="http://schemas.microsoft.com/office/drawing/2014/main" xmlns="" id="{9A9305CB-CB59-426A-9780-B68C5B3B1811}"/>
+                  <a16:creationId xmlns:a16="http://schemas.microsoft.com/office/drawing/2014/main" id="{9A9305CB-CB59-426A-9780-B68C5B3B1811}"/>
                 </a:ext>
               </a:extLst>
             </p:cNvPr>
@@ -5094,7 +5269,7 @@
           <p:cNvPr id="6" name="Group 5">
             <a:extLst>
               <a:ext uri="{FF2B5EF4-FFF2-40B4-BE49-F238E27FC236}">
-                <a16:creationId xmlns:a16="http://schemas.microsoft.com/office/drawing/2014/main" xmlns="" id="{6A92B15F-B9A9-456E-8FBF-263E655A31B5}"/>
+                <a16:creationId xmlns:a16="http://schemas.microsoft.com/office/drawing/2014/main" id="{6A92B15F-B9A9-456E-8FBF-263E655A31B5}"/>
               </a:ext>
             </a:extLst>
           </p:cNvPr>
@@ -5143,7 +5318,7 @@
             <p:cNvPr id="7" name="Isosceles Triangle 6">
               <a:extLst>
                 <a:ext uri="{FF2B5EF4-FFF2-40B4-BE49-F238E27FC236}">
-                  <a16:creationId xmlns:a16="http://schemas.microsoft.com/office/drawing/2014/main" xmlns="" id="{33C86C71-505E-469B-B14F-12CB0770B817}"/>
+                  <a16:creationId xmlns:a16="http://schemas.microsoft.com/office/drawing/2014/main" id="{33C86C71-505E-469B-B14F-12CB0770B817}"/>
                 </a:ext>
               </a:extLst>
             </p:cNvPr>
@@ -5195,7 +5370,7 @@
             <p:cNvPr id="8" name="Diagonal Stripe 7">
               <a:extLst>
                 <a:ext uri="{FF2B5EF4-FFF2-40B4-BE49-F238E27FC236}">
-                  <a16:creationId xmlns:a16="http://schemas.microsoft.com/office/drawing/2014/main" xmlns="" id="{CC7FDC70-F729-4C4B-8772-BDD117288BB5}"/>
+                  <a16:creationId xmlns:a16="http://schemas.microsoft.com/office/drawing/2014/main" id="{CC7FDC70-F729-4C4B-8772-BDD117288BB5}"/>
                 </a:ext>
               </a:extLst>
             </p:cNvPr>
@@ -5251,7 +5426,7 @@
             <p:cNvPr id="9" name="Isosceles Triangle 8">
               <a:extLst>
                 <a:ext uri="{FF2B5EF4-FFF2-40B4-BE49-F238E27FC236}">
-                  <a16:creationId xmlns:a16="http://schemas.microsoft.com/office/drawing/2014/main" xmlns="" id="{20124C48-9F6C-4C47-B59C-0BE9AADD9062}"/>
+                  <a16:creationId xmlns:a16="http://schemas.microsoft.com/office/drawing/2014/main" id="{20124C48-9F6C-4C47-B59C-0BE9AADD9062}"/>
                 </a:ext>
               </a:extLst>
             </p:cNvPr>
@@ -5303,7 +5478,7 @@
             <p:cNvPr id="10" name="Isosceles Triangle 9">
               <a:extLst>
                 <a:ext uri="{FF2B5EF4-FFF2-40B4-BE49-F238E27FC236}">
-                  <a16:creationId xmlns:a16="http://schemas.microsoft.com/office/drawing/2014/main" xmlns="" id="{D1FDB6C9-F8BC-4468-87C5-B27134656FCD}"/>
+                  <a16:creationId xmlns:a16="http://schemas.microsoft.com/office/drawing/2014/main" id="{D1FDB6C9-F8BC-4468-87C5-B27134656FCD}"/>
                 </a:ext>
               </a:extLst>
             </p:cNvPr>
@@ -5355,7 +5530,7 @@
             <p:cNvPr id="11" name="Isosceles Triangle 10">
               <a:extLst>
                 <a:ext uri="{FF2B5EF4-FFF2-40B4-BE49-F238E27FC236}">
-                  <a16:creationId xmlns:a16="http://schemas.microsoft.com/office/drawing/2014/main" xmlns="" id="{83C40DF0-D4A1-4BB8-B348-F5B85338E787}"/>
+                  <a16:creationId xmlns:a16="http://schemas.microsoft.com/office/drawing/2014/main" id="{83C40DF0-D4A1-4BB8-B348-F5B85338E787}"/>
                 </a:ext>
               </a:extLst>
             </p:cNvPr>
@@ -5438,7 +5613,7 @@
           <p:cNvPr id="4" name="Freeform: Shape 3">
             <a:extLst>
               <a:ext uri="{FF2B5EF4-FFF2-40B4-BE49-F238E27FC236}">
-                <a16:creationId xmlns:a16="http://schemas.microsoft.com/office/drawing/2014/main" xmlns="" id="{E3A9920C-41F8-4FC7-A83E-A1342FD3FFCF}"/>
+                <a16:creationId xmlns:a16="http://schemas.microsoft.com/office/drawing/2014/main" id="{E3A9920C-41F8-4FC7-A83E-A1342FD3FFCF}"/>
               </a:ext>
             </a:extLst>
           </p:cNvPr>
@@ -5600,7 +5775,7 @@
           <p:cNvPr id="6" name="Freeform: Shape 5">
             <a:extLst>
               <a:ext uri="{FF2B5EF4-FFF2-40B4-BE49-F238E27FC236}">
-                <a16:creationId xmlns:a16="http://schemas.microsoft.com/office/drawing/2014/main" xmlns="" id="{CCDE7DF1-EC7B-400A-AE8A-A616DDA29963}"/>
+                <a16:creationId xmlns:a16="http://schemas.microsoft.com/office/drawing/2014/main" id="{CCDE7DF1-EC7B-400A-AE8A-A616DDA29963}"/>
               </a:ext>
             </a:extLst>
           </p:cNvPr>
@@ -5718,7 +5893,7 @@
           <p:cNvPr id="8" name="Freeform: Shape 7">
             <a:extLst>
               <a:ext uri="{FF2B5EF4-FFF2-40B4-BE49-F238E27FC236}">
-                <a16:creationId xmlns:a16="http://schemas.microsoft.com/office/drawing/2014/main" xmlns="" id="{5E3B8C62-DFBB-4026-A44F-73D95F83A5A1}"/>
+                <a16:creationId xmlns:a16="http://schemas.microsoft.com/office/drawing/2014/main" id="{5E3B8C62-DFBB-4026-A44F-73D95F83A5A1}"/>
               </a:ext>
             </a:extLst>
           </p:cNvPr>
@@ -5844,7 +6019,7 @@
           <p:cNvPr id="9" name="Oval 8">
             <a:extLst>
               <a:ext uri="{FF2B5EF4-FFF2-40B4-BE49-F238E27FC236}">
-                <a16:creationId xmlns:a16="http://schemas.microsoft.com/office/drawing/2014/main" xmlns="" id="{9EDE3B36-3AF0-4437-AC1D-AE23D0354DF0}"/>
+                <a16:creationId xmlns:a16="http://schemas.microsoft.com/office/drawing/2014/main" id="{9EDE3B36-3AF0-4437-AC1D-AE23D0354DF0}"/>
               </a:ext>
             </a:extLst>
           </p:cNvPr>
@@ -5898,7 +6073,7 @@
           <p:cNvPr id="10" name="Freeform: Shape 9">
             <a:extLst>
               <a:ext uri="{FF2B5EF4-FFF2-40B4-BE49-F238E27FC236}">
-                <a16:creationId xmlns:a16="http://schemas.microsoft.com/office/drawing/2014/main" xmlns="" id="{46242A4C-70C8-45C0-B7CB-39596E5DA273}"/>
+                <a16:creationId xmlns:a16="http://schemas.microsoft.com/office/drawing/2014/main" id="{46242A4C-70C8-45C0-B7CB-39596E5DA273}"/>
               </a:ext>
             </a:extLst>
           </p:cNvPr>
@@ -6156,7 +6331,7 @@
           <p:cNvPr id="12" name="Straight Connector 11">
             <a:extLst>
               <a:ext uri="{FF2B5EF4-FFF2-40B4-BE49-F238E27FC236}">
-                <a16:creationId xmlns:a16="http://schemas.microsoft.com/office/drawing/2014/main" xmlns="" id="{D212E302-8B16-49D9-A33F-DC17C36374D3}"/>
+                <a16:creationId xmlns:a16="http://schemas.microsoft.com/office/drawing/2014/main" id="{D212E302-8B16-49D9-A33F-DC17C36374D3}"/>
               </a:ext>
             </a:extLst>
           </p:cNvPr>
@@ -6201,7 +6376,7 @@
           <p:cNvPr id="14" name="Straight Connector 13">
             <a:extLst>
               <a:ext uri="{FF2B5EF4-FFF2-40B4-BE49-F238E27FC236}">
-                <a16:creationId xmlns:a16="http://schemas.microsoft.com/office/drawing/2014/main" xmlns="" id="{66D9DD78-341F-42B5-8935-63D840ECA4B0}"/>
+                <a16:creationId xmlns:a16="http://schemas.microsoft.com/office/drawing/2014/main" id="{66D9DD78-341F-42B5-8935-63D840ECA4B0}"/>
               </a:ext>
             </a:extLst>
           </p:cNvPr>
@@ -6244,7 +6419,7 @@
           <p:cNvPr id="16" name="Straight Connector 15">
             <a:extLst>
               <a:ext uri="{FF2B5EF4-FFF2-40B4-BE49-F238E27FC236}">
-                <a16:creationId xmlns:a16="http://schemas.microsoft.com/office/drawing/2014/main" xmlns="" id="{D92AE430-F1EE-468C-A70D-D80E6CD6784C}"/>
+                <a16:creationId xmlns:a16="http://schemas.microsoft.com/office/drawing/2014/main" id="{D92AE430-F1EE-468C-A70D-D80E6CD6784C}"/>
               </a:ext>
             </a:extLst>
           </p:cNvPr>
@@ -6288,7 +6463,7 @@
           <p:cNvPr id="22" name="Arc 21">
             <a:extLst>
               <a:ext uri="{FF2B5EF4-FFF2-40B4-BE49-F238E27FC236}">
-                <a16:creationId xmlns:a16="http://schemas.microsoft.com/office/drawing/2014/main" xmlns="" id="{53D8F225-80A1-4BCE-A2F0-409733168AB9}"/>
+                <a16:creationId xmlns:a16="http://schemas.microsoft.com/office/drawing/2014/main" id="{53D8F225-80A1-4BCE-A2F0-409733168AB9}"/>
               </a:ext>
             </a:extLst>
           </p:cNvPr>
@@ -6340,7 +6515,7 @@
           <p:cNvPr id="24" name="TextBox 23">
             <a:extLst>
               <a:ext uri="{FF2B5EF4-FFF2-40B4-BE49-F238E27FC236}">
-                <a16:creationId xmlns:a16="http://schemas.microsoft.com/office/drawing/2014/main" xmlns="" id="{A592BFD6-EB81-4BED-AC61-BFD618415C20}"/>
+                <a16:creationId xmlns:a16="http://schemas.microsoft.com/office/drawing/2014/main" id="{A592BFD6-EB81-4BED-AC61-BFD618415C20}"/>
               </a:ext>
             </a:extLst>
           </p:cNvPr>
@@ -6381,7 +6556,7 @@
           <p:cNvPr id="25" name="TextBox 24">
             <a:extLst>
               <a:ext uri="{FF2B5EF4-FFF2-40B4-BE49-F238E27FC236}">
-                <a16:creationId xmlns:a16="http://schemas.microsoft.com/office/drawing/2014/main" xmlns="" id="{F8EB0CB4-9760-40A2-AEE1-D0FA2723F227}"/>
+                <a16:creationId xmlns:a16="http://schemas.microsoft.com/office/drawing/2014/main" id="{F8EB0CB4-9760-40A2-AEE1-D0FA2723F227}"/>
               </a:ext>
             </a:extLst>
           </p:cNvPr>
@@ -6416,7 +6591,7 @@
           <p:cNvPr id="27" name="TextBox 26">
             <a:extLst>
               <a:ext uri="{FF2B5EF4-FFF2-40B4-BE49-F238E27FC236}">
-                <a16:creationId xmlns:a16="http://schemas.microsoft.com/office/drawing/2014/main" xmlns="" id="{9438317C-FB4A-4576-8AB5-5A448DC9649B}"/>
+                <a16:creationId xmlns:a16="http://schemas.microsoft.com/office/drawing/2014/main" id="{9438317C-FB4A-4576-8AB5-5A448DC9649B}"/>
               </a:ext>
             </a:extLst>
           </p:cNvPr>
@@ -6451,7 +6626,7 @@
           <p:cNvPr id="28" name="TextBox 27">
             <a:extLst>
               <a:ext uri="{FF2B5EF4-FFF2-40B4-BE49-F238E27FC236}">
-                <a16:creationId xmlns:a16="http://schemas.microsoft.com/office/drawing/2014/main" xmlns="" id="{64D506B2-A438-42B3-9AFB-ECF214D50AD0}"/>
+                <a16:creationId xmlns:a16="http://schemas.microsoft.com/office/drawing/2014/main" id="{64D506B2-A438-42B3-9AFB-ECF214D50AD0}"/>
               </a:ext>
             </a:extLst>
           </p:cNvPr>
@@ -6486,7 +6661,7 @@
           <p:cNvPr id="29" name="Group 28">
             <a:extLst>
               <a:ext uri="{FF2B5EF4-FFF2-40B4-BE49-F238E27FC236}">
-                <a16:creationId xmlns:a16="http://schemas.microsoft.com/office/drawing/2014/main" xmlns="" id="{ADCBDEFE-691A-4FFF-A8AF-E13B023FDC49}"/>
+                <a16:creationId xmlns:a16="http://schemas.microsoft.com/office/drawing/2014/main" id="{ADCBDEFE-691A-4FFF-A8AF-E13B023FDC49}"/>
               </a:ext>
             </a:extLst>
           </p:cNvPr>
@@ -6535,7 +6710,7 @@
             <p:cNvPr id="30" name="Isosceles Triangle 29">
               <a:extLst>
                 <a:ext uri="{FF2B5EF4-FFF2-40B4-BE49-F238E27FC236}">
-                  <a16:creationId xmlns:a16="http://schemas.microsoft.com/office/drawing/2014/main" xmlns="" id="{094853E4-2A7C-4480-99BC-52E0E58CC951}"/>
+                  <a16:creationId xmlns:a16="http://schemas.microsoft.com/office/drawing/2014/main" id="{094853E4-2A7C-4480-99BC-52E0E58CC951}"/>
                 </a:ext>
               </a:extLst>
             </p:cNvPr>
@@ -6587,7 +6762,7 @@
             <p:cNvPr id="31" name="Flowchart: Delay 30">
               <a:extLst>
                 <a:ext uri="{FF2B5EF4-FFF2-40B4-BE49-F238E27FC236}">
-                  <a16:creationId xmlns:a16="http://schemas.microsoft.com/office/drawing/2014/main" xmlns="" id="{09265F01-94F1-447E-BCD4-3C8A53A3B853}"/>
+                  <a16:creationId xmlns:a16="http://schemas.microsoft.com/office/drawing/2014/main" id="{09265F01-94F1-447E-BCD4-3C8A53A3B853}"/>
                 </a:ext>
               </a:extLst>
             </p:cNvPr>
@@ -6639,7 +6814,7 @@
             <p:cNvPr id="32" name="Diagonal Stripe 31">
               <a:extLst>
                 <a:ext uri="{FF2B5EF4-FFF2-40B4-BE49-F238E27FC236}">
-                  <a16:creationId xmlns:a16="http://schemas.microsoft.com/office/drawing/2014/main" xmlns="" id="{F2E9A081-4FA7-4459-B4DC-46911436213A}"/>
+                  <a16:creationId xmlns:a16="http://schemas.microsoft.com/office/drawing/2014/main" id="{F2E9A081-4FA7-4459-B4DC-46911436213A}"/>
                 </a:ext>
               </a:extLst>
             </p:cNvPr>
@@ -6726,7 +6901,7 @@
           <p:cNvPr id="4" name="Freeform: Shape 3">
             <a:extLst>
               <a:ext uri="{FF2B5EF4-FFF2-40B4-BE49-F238E27FC236}">
-                <a16:creationId xmlns:a16="http://schemas.microsoft.com/office/drawing/2014/main" xmlns="" id="{E3A9920C-41F8-4FC7-A83E-A1342FD3FFCF}"/>
+                <a16:creationId xmlns:a16="http://schemas.microsoft.com/office/drawing/2014/main" id="{E3A9920C-41F8-4FC7-A83E-A1342FD3FFCF}"/>
               </a:ext>
             </a:extLst>
           </p:cNvPr>
@@ -6978,7 +7153,7 @@
           <p:cNvPr id="6" name="Freeform: Shape 5">
             <a:extLst>
               <a:ext uri="{FF2B5EF4-FFF2-40B4-BE49-F238E27FC236}">
-                <a16:creationId xmlns:a16="http://schemas.microsoft.com/office/drawing/2014/main" xmlns="" id="{CCDE7DF1-EC7B-400A-AE8A-A616DDA29963}"/>
+                <a16:creationId xmlns:a16="http://schemas.microsoft.com/office/drawing/2014/main" id="{CCDE7DF1-EC7B-400A-AE8A-A616DDA29963}"/>
               </a:ext>
             </a:extLst>
           </p:cNvPr>
@@ -7096,7 +7271,7 @@
           <p:cNvPr id="8" name="Freeform: Shape 7">
             <a:extLst>
               <a:ext uri="{FF2B5EF4-FFF2-40B4-BE49-F238E27FC236}">
-                <a16:creationId xmlns:a16="http://schemas.microsoft.com/office/drawing/2014/main" xmlns="" id="{5E3B8C62-DFBB-4026-A44F-73D95F83A5A1}"/>
+                <a16:creationId xmlns:a16="http://schemas.microsoft.com/office/drawing/2014/main" id="{5E3B8C62-DFBB-4026-A44F-73D95F83A5A1}"/>
               </a:ext>
             </a:extLst>
           </p:cNvPr>
@@ -7222,7 +7397,7 @@
           <p:cNvPr id="9" name="Oval 8">
             <a:extLst>
               <a:ext uri="{FF2B5EF4-FFF2-40B4-BE49-F238E27FC236}">
-                <a16:creationId xmlns:a16="http://schemas.microsoft.com/office/drawing/2014/main" xmlns="" id="{9EDE3B36-3AF0-4437-AC1D-AE23D0354DF0}"/>
+                <a16:creationId xmlns:a16="http://schemas.microsoft.com/office/drawing/2014/main" id="{9EDE3B36-3AF0-4437-AC1D-AE23D0354DF0}"/>
               </a:ext>
             </a:extLst>
           </p:cNvPr>
@@ -7276,7 +7451,7 @@
           <p:cNvPr id="10" name="Freeform: Shape 9">
             <a:extLst>
               <a:ext uri="{FF2B5EF4-FFF2-40B4-BE49-F238E27FC236}">
-                <a16:creationId xmlns:a16="http://schemas.microsoft.com/office/drawing/2014/main" xmlns="" id="{46242A4C-70C8-45C0-B7CB-39596E5DA273}"/>
+                <a16:creationId xmlns:a16="http://schemas.microsoft.com/office/drawing/2014/main" id="{46242A4C-70C8-45C0-B7CB-39596E5DA273}"/>
               </a:ext>
             </a:extLst>
           </p:cNvPr>
@@ -7574,7 +7749,7 @@
           <p:cNvPr id="12" name="Straight Connector 11">
             <a:extLst>
               <a:ext uri="{FF2B5EF4-FFF2-40B4-BE49-F238E27FC236}">
-                <a16:creationId xmlns:a16="http://schemas.microsoft.com/office/drawing/2014/main" xmlns="" id="{D212E302-8B16-49D9-A33F-DC17C36374D3}"/>
+                <a16:creationId xmlns:a16="http://schemas.microsoft.com/office/drawing/2014/main" id="{D212E302-8B16-49D9-A33F-DC17C36374D3}"/>
               </a:ext>
             </a:extLst>
           </p:cNvPr>
@@ -7619,7 +7794,7 @@
           <p:cNvPr id="14" name="Straight Connector 13">
             <a:extLst>
               <a:ext uri="{FF2B5EF4-FFF2-40B4-BE49-F238E27FC236}">
-                <a16:creationId xmlns:a16="http://schemas.microsoft.com/office/drawing/2014/main" xmlns="" id="{66D9DD78-341F-42B5-8935-63D840ECA4B0}"/>
+                <a16:creationId xmlns:a16="http://schemas.microsoft.com/office/drawing/2014/main" id="{66D9DD78-341F-42B5-8935-63D840ECA4B0}"/>
               </a:ext>
             </a:extLst>
           </p:cNvPr>
@@ -7662,7 +7837,7 @@
           <p:cNvPr id="16" name="Straight Connector 15">
             <a:extLst>
               <a:ext uri="{FF2B5EF4-FFF2-40B4-BE49-F238E27FC236}">
-                <a16:creationId xmlns:a16="http://schemas.microsoft.com/office/drawing/2014/main" xmlns="" id="{D92AE430-F1EE-468C-A70D-D80E6CD6784C}"/>
+                <a16:creationId xmlns:a16="http://schemas.microsoft.com/office/drawing/2014/main" id="{D92AE430-F1EE-468C-A70D-D80E6CD6784C}"/>
               </a:ext>
             </a:extLst>
           </p:cNvPr>
@@ -7706,7 +7881,7 @@
           <p:cNvPr id="22" name="Arc 21">
             <a:extLst>
               <a:ext uri="{FF2B5EF4-FFF2-40B4-BE49-F238E27FC236}">
-                <a16:creationId xmlns:a16="http://schemas.microsoft.com/office/drawing/2014/main" xmlns="" id="{53D8F225-80A1-4BCE-A2F0-409733168AB9}"/>
+                <a16:creationId xmlns:a16="http://schemas.microsoft.com/office/drawing/2014/main" id="{53D8F225-80A1-4BCE-A2F0-409733168AB9}"/>
               </a:ext>
             </a:extLst>
           </p:cNvPr>
@@ -7758,7 +7933,7 @@
           <p:cNvPr id="24" name="TextBox 23">
             <a:extLst>
               <a:ext uri="{FF2B5EF4-FFF2-40B4-BE49-F238E27FC236}">
-                <a16:creationId xmlns:a16="http://schemas.microsoft.com/office/drawing/2014/main" xmlns="" id="{A592BFD6-EB81-4BED-AC61-BFD618415C20}"/>
+                <a16:creationId xmlns:a16="http://schemas.microsoft.com/office/drawing/2014/main" id="{A592BFD6-EB81-4BED-AC61-BFD618415C20}"/>
               </a:ext>
             </a:extLst>
           </p:cNvPr>
@@ -7799,7 +7974,7 @@
           <p:cNvPr id="25" name="TextBox 24">
             <a:extLst>
               <a:ext uri="{FF2B5EF4-FFF2-40B4-BE49-F238E27FC236}">
-                <a16:creationId xmlns:a16="http://schemas.microsoft.com/office/drawing/2014/main" xmlns="" id="{F8EB0CB4-9760-40A2-AEE1-D0FA2723F227}"/>
+                <a16:creationId xmlns:a16="http://schemas.microsoft.com/office/drawing/2014/main" id="{F8EB0CB4-9760-40A2-AEE1-D0FA2723F227}"/>
               </a:ext>
             </a:extLst>
           </p:cNvPr>
@@ -7834,7 +8009,7 @@
           <p:cNvPr id="27" name="TextBox 26">
             <a:extLst>
               <a:ext uri="{FF2B5EF4-FFF2-40B4-BE49-F238E27FC236}">
-                <a16:creationId xmlns:a16="http://schemas.microsoft.com/office/drawing/2014/main" xmlns="" id="{9438317C-FB4A-4576-8AB5-5A448DC9649B}"/>
+                <a16:creationId xmlns:a16="http://schemas.microsoft.com/office/drawing/2014/main" id="{9438317C-FB4A-4576-8AB5-5A448DC9649B}"/>
               </a:ext>
             </a:extLst>
           </p:cNvPr>
@@ -7869,7 +8044,7 @@
           <p:cNvPr id="28" name="TextBox 27">
             <a:extLst>
               <a:ext uri="{FF2B5EF4-FFF2-40B4-BE49-F238E27FC236}">
-                <a16:creationId xmlns:a16="http://schemas.microsoft.com/office/drawing/2014/main" xmlns="" id="{64D506B2-A438-42B3-9AFB-ECF214D50AD0}"/>
+                <a16:creationId xmlns:a16="http://schemas.microsoft.com/office/drawing/2014/main" id="{64D506B2-A438-42B3-9AFB-ECF214D50AD0}"/>
               </a:ext>
             </a:extLst>
           </p:cNvPr>
@@ -7904,7 +8079,7 @@
           <p:cNvPr id="29" name="Group 28">
             <a:extLst>
               <a:ext uri="{FF2B5EF4-FFF2-40B4-BE49-F238E27FC236}">
-                <a16:creationId xmlns:a16="http://schemas.microsoft.com/office/drawing/2014/main" xmlns="" id="{ADCBDEFE-691A-4FFF-A8AF-E13B023FDC49}"/>
+                <a16:creationId xmlns:a16="http://schemas.microsoft.com/office/drawing/2014/main" id="{ADCBDEFE-691A-4FFF-A8AF-E13B023FDC49}"/>
               </a:ext>
             </a:extLst>
           </p:cNvPr>
@@ -7953,7 +8128,7 @@
             <p:cNvPr id="30" name="Isosceles Triangle 29">
               <a:extLst>
                 <a:ext uri="{FF2B5EF4-FFF2-40B4-BE49-F238E27FC236}">
-                  <a16:creationId xmlns:a16="http://schemas.microsoft.com/office/drawing/2014/main" xmlns="" id="{094853E4-2A7C-4480-99BC-52E0E58CC951}"/>
+                  <a16:creationId xmlns:a16="http://schemas.microsoft.com/office/drawing/2014/main" id="{094853E4-2A7C-4480-99BC-52E0E58CC951}"/>
                 </a:ext>
               </a:extLst>
             </p:cNvPr>
@@ -8005,7 +8180,7 @@
             <p:cNvPr id="31" name="Flowchart: Delay 30">
               <a:extLst>
                 <a:ext uri="{FF2B5EF4-FFF2-40B4-BE49-F238E27FC236}">
-                  <a16:creationId xmlns:a16="http://schemas.microsoft.com/office/drawing/2014/main" xmlns="" id="{09265F01-94F1-447E-BCD4-3C8A53A3B853}"/>
+                  <a16:creationId xmlns:a16="http://schemas.microsoft.com/office/drawing/2014/main" id="{09265F01-94F1-447E-BCD4-3C8A53A3B853}"/>
                 </a:ext>
               </a:extLst>
             </p:cNvPr>
@@ -8057,7 +8232,7 @@
             <p:cNvPr id="32" name="Diagonal Stripe 31">
               <a:extLst>
                 <a:ext uri="{FF2B5EF4-FFF2-40B4-BE49-F238E27FC236}">
-                  <a16:creationId xmlns:a16="http://schemas.microsoft.com/office/drawing/2014/main" xmlns="" id="{F2E9A081-4FA7-4459-B4DC-46911436213A}"/>
+                  <a16:creationId xmlns:a16="http://schemas.microsoft.com/office/drawing/2014/main" id="{F2E9A081-4FA7-4459-B4DC-46911436213A}"/>
                 </a:ext>
               </a:extLst>
             </p:cNvPr>
@@ -8114,7 +8289,7 @@
           <p:cNvPr id="19" name="Freeform: Shape 18">
             <a:extLst>
               <a:ext uri="{FF2B5EF4-FFF2-40B4-BE49-F238E27FC236}">
-                <a16:creationId xmlns:a16="http://schemas.microsoft.com/office/drawing/2014/main" xmlns="" id="{7D80AD1F-36AB-4458-A246-6DE6C1472133}"/>
+                <a16:creationId xmlns:a16="http://schemas.microsoft.com/office/drawing/2014/main" id="{7D80AD1F-36AB-4458-A246-6DE6C1472133}"/>
               </a:ext>
             </a:extLst>
           </p:cNvPr>
@@ -8232,7 +8407,7 @@
           <p:cNvPr id="20" name="Freeform: Shape 19">
             <a:extLst>
               <a:ext uri="{FF2B5EF4-FFF2-40B4-BE49-F238E27FC236}">
-                <a16:creationId xmlns:a16="http://schemas.microsoft.com/office/drawing/2014/main" xmlns="" id="{22D0991E-54C4-4E50-AB5A-C4B3808F2FE8}"/>
+                <a16:creationId xmlns:a16="http://schemas.microsoft.com/office/drawing/2014/main" id="{22D0991E-54C4-4E50-AB5A-C4B3808F2FE8}"/>
               </a:ext>
             </a:extLst>
           </p:cNvPr>
@@ -8358,7 +8533,7 @@
           <p:cNvPr id="21" name="TextBox 20">
             <a:extLst>
               <a:ext uri="{FF2B5EF4-FFF2-40B4-BE49-F238E27FC236}">
-                <a16:creationId xmlns:a16="http://schemas.microsoft.com/office/drawing/2014/main" xmlns="" id="{8B3DED73-C7C5-48EE-89B9-5BDA209B2EDA}"/>
+                <a16:creationId xmlns:a16="http://schemas.microsoft.com/office/drawing/2014/main" id="{8B3DED73-C7C5-48EE-89B9-5BDA209B2EDA}"/>
               </a:ext>
             </a:extLst>
           </p:cNvPr>
@@ -8393,7 +8568,7 @@
           <p:cNvPr id="23" name="Straight Connector 22">
             <a:extLst>
               <a:ext uri="{FF2B5EF4-FFF2-40B4-BE49-F238E27FC236}">
-                <a16:creationId xmlns:a16="http://schemas.microsoft.com/office/drawing/2014/main" xmlns="" id="{1D8955BC-2703-47D1-A58B-5D62C15BBB4F}"/>
+                <a16:creationId xmlns:a16="http://schemas.microsoft.com/office/drawing/2014/main" id="{1D8955BC-2703-47D1-A58B-5D62C15BBB4F}"/>
               </a:ext>
             </a:extLst>
           </p:cNvPr>
@@ -8438,7 +8613,7 @@
           <p:cNvPr id="3" name="Rectangle 2">
             <a:extLst>
               <a:ext uri="{FF2B5EF4-FFF2-40B4-BE49-F238E27FC236}">
-                <a16:creationId xmlns:a16="http://schemas.microsoft.com/office/drawing/2014/main" xmlns="" id="{FF1110AC-4887-4767-BBDF-C2A3BD57A548}"/>
+                <a16:creationId xmlns:a16="http://schemas.microsoft.com/office/drawing/2014/main" id="{FF1110AC-4887-4767-BBDF-C2A3BD57A548}"/>
               </a:ext>
             </a:extLst>
           </p:cNvPr>
@@ -8490,7 +8665,7 @@
           <p:cNvPr id="26" name="TextBox 25">
             <a:extLst>
               <a:ext uri="{FF2B5EF4-FFF2-40B4-BE49-F238E27FC236}">
-                <a16:creationId xmlns:a16="http://schemas.microsoft.com/office/drawing/2014/main" xmlns="" id="{3AD37B21-9EEF-4569-8F84-7CD5E4C2DE3D}"/>
+                <a16:creationId xmlns:a16="http://schemas.microsoft.com/office/drawing/2014/main" id="{3AD37B21-9EEF-4569-8F84-7CD5E4C2DE3D}"/>
               </a:ext>
             </a:extLst>
           </p:cNvPr>
@@ -8555,7 +8730,7 @@
           <p:cNvPr id="2" name="Table 2">
             <a:extLst>
               <a:ext uri="{FF2B5EF4-FFF2-40B4-BE49-F238E27FC236}">
-                <a16:creationId xmlns:a16="http://schemas.microsoft.com/office/drawing/2014/main" xmlns="" id="{50683AAC-C428-45B9-8C5F-69C8298D119F}"/>
+                <a16:creationId xmlns:a16="http://schemas.microsoft.com/office/drawing/2014/main" id="{50683AAC-C428-45B9-8C5F-69C8298D119F}"/>
               </a:ext>
             </a:extLst>
           </p:cNvPr>
@@ -8584,35 +8759,35 @@
                 <a:gridCol w="2235200">
                   <a:extLst>
                     <a:ext uri="{9D8B030D-6E8A-4147-A177-3AD203B41FA5}">
-                      <a16:colId xmlns:a16="http://schemas.microsoft.com/office/drawing/2014/main" xmlns="" val="1924441651"/>
+                      <a16:colId xmlns:a16="http://schemas.microsoft.com/office/drawing/2014/main" val="1924441651"/>
                     </a:ext>
                   </a:extLst>
                 </a:gridCol>
                 <a:gridCol w="1581150">
                   <a:extLst>
                     <a:ext uri="{9D8B030D-6E8A-4147-A177-3AD203B41FA5}">
-                      <a16:colId xmlns:a16="http://schemas.microsoft.com/office/drawing/2014/main" xmlns="" val="22700561"/>
+                      <a16:colId xmlns:a16="http://schemas.microsoft.com/office/drawing/2014/main" val="22700561"/>
                     </a:ext>
                   </a:extLst>
                 </a:gridCol>
                 <a:gridCol w="1428750">
                   <a:extLst>
                     <a:ext uri="{9D8B030D-6E8A-4147-A177-3AD203B41FA5}">
-                      <a16:colId xmlns:a16="http://schemas.microsoft.com/office/drawing/2014/main" xmlns="" val="2645291537"/>
+                      <a16:colId xmlns:a16="http://schemas.microsoft.com/office/drawing/2014/main" val="2645291537"/>
                     </a:ext>
                   </a:extLst>
                 </a:gridCol>
                 <a:gridCol w="1562100">
                   <a:extLst>
                     <a:ext uri="{9D8B030D-6E8A-4147-A177-3AD203B41FA5}">
-                      <a16:colId xmlns:a16="http://schemas.microsoft.com/office/drawing/2014/main" xmlns="" val="670994595"/>
+                      <a16:colId xmlns:a16="http://schemas.microsoft.com/office/drawing/2014/main" val="670994595"/>
                     </a:ext>
                   </a:extLst>
                 </a:gridCol>
                 <a:gridCol w="1320800">
                   <a:extLst>
                     <a:ext uri="{9D8B030D-6E8A-4147-A177-3AD203B41FA5}">
-                      <a16:colId xmlns:a16="http://schemas.microsoft.com/office/drawing/2014/main" xmlns="" val="2424154585"/>
+                      <a16:colId xmlns:a16="http://schemas.microsoft.com/office/drawing/2014/main" val="2424154585"/>
                     </a:ext>
                   </a:extLst>
                 </a:gridCol>
@@ -8682,7 +8857,7 @@
                 </a:tc>
                 <a:extLst>
                   <a:ext uri="{0D108BD9-81ED-4DB2-BD59-A6C34878D82A}">
-                    <a16:rowId xmlns:a16="http://schemas.microsoft.com/office/drawing/2014/main" xmlns="" val="566004689"/>
+                    <a16:rowId xmlns:a16="http://schemas.microsoft.com/office/drawing/2014/main" val="566004689"/>
                   </a:ext>
                 </a:extLst>
               </a:tr>
@@ -8754,7 +8929,7 @@
                 </a:tc>
                 <a:extLst>
                   <a:ext uri="{0D108BD9-81ED-4DB2-BD59-A6C34878D82A}">
-                    <a16:rowId xmlns:a16="http://schemas.microsoft.com/office/drawing/2014/main" xmlns="" val="568773808"/>
+                    <a16:rowId xmlns:a16="http://schemas.microsoft.com/office/drawing/2014/main" val="568773808"/>
                   </a:ext>
                 </a:extLst>
               </a:tr>
@@ -8826,7 +9001,7 @@
                 </a:tc>
                 <a:extLst>
                   <a:ext uri="{0D108BD9-81ED-4DB2-BD59-A6C34878D82A}">
-                    <a16:rowId xmlns:a16="http://schemas.microsoft.com/office/drawing/2014/main" xmlns="" val="1013138907"/>
+                    <a16:rowId xmlns:a16="http://schemas.microsoft.com/office/drawing/2014/main" val="1013138907"/>
                   </a:ext>
                 </a:extLst>
               </a:tr>
@@ -8898,7 +9073,7 @@
                 </a:tc>
                 <a:extLst>
                   <a:ext uri="{0D108BD9-81ED-4DB2-BD59-A6C34878D82A}">
-                    <a16:rowId xmlns:a16="http://schemas.microsoft.com/office/drawing/2014/main" xmlns="" val="336328220"/>
+                    <a16:rowId xmlns:a16="http://schemas.microsoft.com/office/drawing/2014/main" val="336328220"/>
                   </a:ext>
                 </a:extLst>
               </a:tr>
@@ -8911,7 +9086,7 @@
           <p:cNvPr id="3" name="Table 2">
             <a:extLst>
               <a:ext uri="{FF2B5EF4-FFF2-40B4-BE49-F238E27FC236}">
-                <a16:creationId xmlns:a16="http://schemas.microsoft.com/office/drawing/2014/main" xmlns="" id="{748745B1-7B3F-4E19-9C1F-62E82CD8E1EF}"/>
+                <a16:creationId xmlns:a16="http://schemas.microsoft.com/office/drawing/2014/main" id="{748745B1-7B3F-4E19-9C1F-62E82CD8E1EF}"/>
               </a:ext>
             </a:extLst>
           </p:cNvPr>
@@ -8940,35 +9115,35 @@
                 <a:gridCol w="2235200">
                   <a:extLst>
                     <a:ext uri="{9D8B030D-6E8A-4147-A177-3AD203B41FA5}">
-                      <a16:colId xmlns:a16="http://schemas.microsoft.com/office/drawing/2014/main" xmlns="" val="1924441651"/>
+                      <a16:colId xmlns:a16="http://schemas.microsoft.com/office/drawing/2014/main" val="1924441651"/>
                     </a:ext>
                   </a:extLst>
                 </a:gridCol>
                 <a:gridCol w="1581150">
                   <a:extLst>
                     <a:ext uri="{9D8B030D-6E8A-4147-A177-3AD203B41FA5}">
-                      <a16:colId xmlns:a16="http://schemas.microsoft.com/office/drawing/2014/main" xmlns="" val="22700561"/>
+                      <a16:colId xmlns:a16="http://schemas.microsoft.com/office/drawing/2014/main" val="22700561"/>
                     </a:ext>
                   </a:extLst>
                 </a:gridCol>
                 <a:gridCol w="1428750">
                   <a:extLst>
                     <a:ext uri="{9D8B030D-6E8A-4147-A177-3AD203B41FA5}">
-                      <a16:colId xmlns:a16="http://schemas.microsoft.com/office/drawing/2014/main" xmlns="" val="2645291537"/>
+                      <a16:colId xmlns:a16="http://schemas.microsoft.com/office/drawing/2014/main" val="2645291537"/>
                     </a:ext>
                   </a:extLst>
                 </a:gridCol>
                 <a:gridCol w="1562100">
                   <a:extLst>
                     <a:ext uri="{9D8B030D-6E8A-4147-A177-3AD203B41FA5}">
-                      <a16:colId xmlns:a16="http://schemas.microsoft.com/office/drawing/2014/main" xmlns="" val="670994595"/>
+                      <a16:colId xmlns:a16="http://schemas.microsoft.com/office/drawing/2014/main" val="670994595"/>
                     </a:ext>
                   </a:extLst>
                 </a:gridCol>
                 <a:gridCol w="1320800">
                   <a:extLst>
                     <a:ext uri="{9D8B030D-6E8A-4147-A177-3AD203B41FA5}">
-                      <a16:colId xmlns:a16="http://schemas.microsoft.com/office/drawing/2014/main" xmlns="" val="2424154585"/>
+                      <a16:colId xmlns:a16="http://schemas.microsoft.com/office/drawing/2014/main" val="2424154585"/>
                     </a:ext>
                   </a:extLst>
                 </a:gridCol>
@@ -9038,7 +9213,7 @@
                 </a:tc>
                 <a:extLst>
                   <a:ext uri="{0D108BD9-81ED-4DB2-BD59-A6C34878D82A}">
-                    <a16:rowId xmlns:a16="http://schemas.microsoft.com/office/drawing/2014/main" xmlns="" val="566004689"/>
+                    <a16:rowId xmlns:a16="http://schemas.microsoft.com/office/drawing/2014/main" val="566004689"/>
                   </a:ext>
                 </a:extLst>
               </a:tr>
@@ -9110,7 +9285,7 @@
                 </a:tc>
                 <a:extLst>
                   <a:ext uri="{0D108BD9-81ED-4DB2-BD59-A6C34878D82A}">
-                    <a16:rowId xmlns:a16="http://schemas.microsoft.com/office/drawing/2014/main" xmlns="" val="568773808"/>
+                    <a16:rowId xmlns:a16="http://schemas.microsoft.com/office/drawing/2014/main" val="568773808"/>
                   </a:ext>
                 </a:extLst>
               </a:tr>
@@ -9182,7 +9357,7 @@
                 </a:tc>
                 <a:extLst>
                   <a:ext uri="{0D108BD9-81ED-4DB2-BD59-A6C34878D82A}">
-                    <a16:rowId xmlns:a16="http://schemas.microsoft.com/office/drawing/2014/main" xmlns="" val="363519881"/>
+                    <a16:rowId xmlns:a16="http://schemas.microsoft.com/office/drawing/2014/main" val="363519881"/>
                   </a:ext>
                 </a:extLst>
               </a:tr>
@@ -9254,7 +9429,7 @@
                 </a:tc>
                 <a:extLst>
                   <a:ext uri="{0D108BD9-81ED-4DB2-BD59-A6C34878D82A}">
-                    <a16:rowId xmlns:a16="http://schemas.microsoft.com/office/drawing/2014/main" xmlns="" val="1013138907"/>
+                    <a16:rowId xmlns:a16="http://schemas.microsoft.com/office/drawing/2014/main" val="1013138907"/>
                   </a:ext>
                 </a:extLst>
               </a:tr>
@@ -9326,7 +9501,7 @@
                 </a:tc>
                 <a:extLst>
                   <a:ext uri="{0D108BD9-81ED-4DB2-BD59-A6C34878D82A}">
-                    <a16:rowId xmlns:a16="http://schemas.microsoft.com/office/drawing/2014/main" xmlns="" val="336328220"/>
+                    <a16:rowId xmlns:a16="http://schemas.microsoft.com/office/drawing/2014/main" val="336328220"/>
                   </a:ext>
                 </a:extLst>
               </a:tr>
@@ -9389,8 +9564,20 @@
                 <a:tableStyleId>{073A0DAA-6AF3-43AB-8588-CEC1D06C72B9}</a:tableStyleId>
               </a:tblPr>
               <a:tblGrid>
-                <a:gridCol w="6135007"/>
-                <a:gridCol w="1992993"/>
+                <a:gridCol w="6135007">
+                  <a:extLst>
+                    <a:ext uri="{9D8B030D-6E8A-4147-A177-3AD203B41FA5}">
+                      <a16:colId xmlns:a16="http://schemas.microsoft.com/office/drawing/2014/main" val="20000"/>
+                    </a:ext>
+                  </a:extLst>
+                </a:gridCol>
+                <a:gridCol w="1992993">
+                  <a:extLst>
+                    <a:ext uri="{9D8B030D-6E8A-4147-A177-3AD203B41FA5}">
+                      <a16:colId xmlns:a16="http://schemas.microsoft.com/office/drawing/2014/main" val="20001"/>
+                    </a:ext>
+                  </a:extLst>
+                </a:gridCol>
               </a:tblGrid>
               <a:tr h="370840">
                 <a:tc>
@@ -9400,10 +9587,9 @@
                     <a:p>
                       <a:pPr algn="ctr"/>
                       <a:r>
-                        <a:rPr lang="en-US" sz="2800" dirty="0" smtClean="0"/>
+                        <a:rPr lang="en-US" sz="2800" dirty="0"/>
                         <a:t>Parameter</a:t>
                       </a:r>
-                      <a:endParaRPr lang="en-US" sz="2800" dirty="0"/>
                     </a:p>
                   </a:txBody>
                   <a:tcPr/>
@@ -9415,14 +9601,18 @@
                     <a:p>
                       <a:pPr algn="ctr"/>
                       <a:r>
-                        <a:rPr lang="en-US" sz="2800" dirty="0" smtClean="0"/>
+                        <a:rPr lang="en-US" sz="2800" dirty="0"/>
                         <a:t>Value</a:t>
                       </a:r>
-                      <a:endParaRPr lang="en-US" sz="2800" dirty="0"/>
-                    </a:p>
-                  </a:txBody>
-                  <a:tcPr/>
-                </a:tc>
+                    </a:p>
+                  </a:txBody>
+                  <a:tcPr/>
+                </a:tc>
+                <a:extLst>
+                  <a:ext uri="{0D108BD9-81ED-4DB2-BD59-A6C34878D82A}">
+                    <a16:rowId xmlns:a16="http://schemas.microsoft.com/office/drawing/2014/main" val="10000"/>
+                  </a:ext>
+                </a:extLst>
               </a:tr>
               <a:tr h="370840">
                 <a:tc>
@@ -9432,10 +9622,9 @@
                     <a:p>
                       <a:pPr algn="l"/>
                       <a:r>
-                        <a:rPr lang="en-US" sz="2400" dirty="0" smtClean="0"/>
+                        <a:rPr lang="en-US" sz="2400" dirty="0"/>
                         <a:t>Initial Regularization Value, λ</a:t>
                       </a:r>
-                      <a:endParaRPr lang="en-US" sz="2400" dirty="0"/>
                     </a:p>
                   </a:txBody>
                   <a:tcPr/>
@@ -9447,14 +9636,18 @@
                     <a:p>
                       <a:pPr algn="ctr"/>
                       <a:r>
-                        <a:rPr lang="en-US" sz="2400" dirty="0" smtClean="0"/>
+                        <a:rPr lang="en-US" sz="2400" dirty="0"/>
                         <a:t>1</a:t>
                       </a:r>
-                      <a:endParaRPr lang="en-US" sz="2400" dirty="0"/>
-                    </a:p>
-                  </a:txBody>
-                  <a:tcPr/>
-                </a:tc>
+                    </a:p>
+                  </a:txBody>
+                  <a:tcPr/>
+                </a:tc>
+                <a:extLst>
+                  <a:ext uri="{0D108BD9-81ED-4DB2-BD59-A6C34878D82A}">
+                    <a16:rowId xmlns:a16="http://schemas.microsoft.com/office/drawing/2014/main" val="10001"/>
+                  </a:ext>
+                </a:extLst>
               </a:tr>
               <a:tr h="370840">
                 <a:tc>
@@ -9464,15 +9657,15 @@
                     <a:p>
                       <a:pPr algn="l"/>
                       <a:r>
-                        <a:rPr lang="en-US" sz="2400" dirty="0" smtClean="0"/>
+                        <a:rPr lang="en-US" sz="2400" dirty="0"/>
                         <a:t>Initial Regularization Multiplier,</a:t>
                       </a:r>
                       <a:r>
-                        <a:rPr lang="en-US" sz="2400" baseline="0" dirty="0" smtClean="0"/>
+                        <a:rPr lang="en-US" sz="2400" baseline="0" dirty="0"/>
                         <a:t> </a:t>
                       </a:r>
                       <a:r>
-                        <a:rPr lang="el-GR" sz="2400" dirty="0" smtClean="0"/>
+                        <a:rPr lang="el-GR" sz="2400" dirty="0"/>
                         <a:t>κ</a:t>
                       </a:r>
                       <a:endParaRPr lang="en-US" sz="2400" dirty="0"/>
@@ -9487,14 +9680,18 @@
                     <a:p>
                       <a:pPr algn="ctr"/>
                       <a:r>
-                        <a:rPr lang="en-US" sz="2400" dirty="0" smtClean="0"/>
+                        <a:rPr lang="en-US" sz="2400" dirty="0"/>
                         <a:t>1</a:t>
                       </a:r>
-                      <a:endParaRPr lang="en-US" sz="2400" dirty="0"/>
-                    </a:p>
-                  </a:txBody>
-                  <a:tcPr/>
-                </a:tc>
+                    </a:p>
+                  </a:txBody>
+                  <a:tcPr/>
+                </a:tc>
+                <a:extLst>
+                  <a:ext uri="{0D108BD9-81ED-4DB2-BD59-A6C34878D82A}">
+                    <a16:rowId xmlns:a16="http://schemas.microsoft.com/office/drawing/2014/main" val="10002"/>
+                  </a:ext>
+                </a:extLst>
               </a:tr>
               <a:tr h="370840">
                 <a:tc>
@@ -9504,11 +9701,11 @@
                     <a:p>
                       <a:pPr algn="l"/>
                       <a:r>
-                        <a:rPr lang="en-US" sz="2400" dirty="0" smtClean="0"/>
+                        <a:rPr lang="en-US" sz="2400" dirty="0"/>
                         <a:t>Scale Factor, </a:t>
                       </a:r>
                       <a:r>
-                        <a:rPr lang="el-GR" sz="2400" dirty="0" smtClean="0"/>
+                        <a:rPr lang="el-GR" sz="2400" dirty="0"/>
                         <a:t>η</a:t>
                       </a:r>
                       <a:endParaRPr lang="en-US" sz="2400" dirty="0"/>
@@ -9523,14 +9720,18 @@
                     <a:p>
                       <a:pPr algn="ctr"/>
                       <a:r>
-                        <a:rPr lang="en-US" sz="2400" dirty="0" smtClean="0"/>
+                        <a:rPr lang="en-US" sz="2400" dirty="0"/>
                         <a:t>1.8</a:t>
                       </a:r>
-                      <a:endParaRPr lang="en-US" sz="2400" dirty="0"/>
-                    </a:p>
-                  </a:txBody>
-                  <a:tcPr/>
-                </a:tc>
+                    </a:p>
+                  </a:txBody>
+                  <a:tcPr/>
+                </a:tc>
+                <a:extLst>
+                  <a:ext uri="{0D108BD9-81ED-4DB2-BD59-A6C34878D82A}">
+                    <a16:rowId xmlns:a16="http://schemas.microsoft.com/office/drawing/2014/main" val="10003"/>
+                  </a:ext>
+                </a:extLst>
               </a:tr>
               <a:tr h="370840">
                 <a:tc>
@@ -9556,19 +9757,19 @@
                         <a:defRPr/>
                       </a:pPr>
                       <a:r>
-                        <a:rPr lang="en-US" sz="2400" dirty="0" smtClean="0"/>
+                        <a:rPr lang="en-US" sz="2400" dirty="0"/>
                         <a:t>Minimum Regularization,</a:t>
                       </a:r>
                       <a:r>
-                        <a:rPr lang="en-US" sz="2400" baseline="0" dirty="0" smtClean="0"/>
+                        <a:rPr lang="en-US" sz="2400" baseline="0" dirty="0"/>
                         <a:t> </a:t>
                       </a:r>
                       <a:r>
-                        <a:rPr lang="en-US" sz="2400" dirty="0" smtClean="0"/>
+                        <a:rPr lang="en-US" sz="2400" dirty="0"/>
                         <a:t>λ</a:t>
                       </a:r>
                       <a:r>
-                        <a:rPr lang="en-US" sz="2400" baseline="-25000" dirty="0" smtClean="0"/>
+                        <a:rPr lang="en-US" sz="2400" baseline="-25000" dirty="0"/>
                         <a:t>min</a:t>
                       </a:r>
                     </a:p>
@@ -9598,17 +9799,22 @@
                         <a:defRPr/>
                       </a:pPr>
                       <a:r>
-                        <a:rPr lang="en-US" sz="2400" dirty="0" smtClean="0"/>
+                        <a:rPr lang="en-US" sz="2400" dirty="0"/>
                         <a:t>10</a:t>
                       </a:r>
                       <a:r>
-                        <a:rPr lang="en-US" sz="2400" baseline="30000" dirty="0" smtClean="0"/>
+                        <a:rPr lang="en-US" sz="2400" baseline="30000" dirty="0"/>
                         <a:t>-6</a:t>
                       </a:r>
                     </a:p>
                   </a:txBody>
                   <a:tcPr/>
                 </a:tc>
+                <a:extLst>
+                  <a:ext uri="{0D108BD9-81ED-4DB2-BD59-A6C34878D82A}">
+                    <a16:rowId xmlns:a16="http://schemas.microsoft.com/office/drawing/2014/main" val="10004"/>
+                  </a:ext>
+                </a:extLst>
               </a:tr>
               <a:tr h="370840">
                 <a:tc>
@@ -9618,22 +9824,21 @@
                     <a:p>
                       <a:pPr algn="l"/>
                       <a:r>
-                        <a:rPr lang="en-US" sz="2400" dirty="0" smtClean="0"/>
+                        <a:rPr lang="en-US" sz="2400" dirty="0"/>
                         <a:t>Maximum Regularization,</a:t>
                       </a:r>
                       <a:r>
-                        <a:rPr lang="en-US" sz="2400" baseline="0" dirty="0" smtClean="0"/>
+                        <a:rPr lang="en-US" sz="2400" baseline="0" dirty="0"/>
                         <a:t> </a:t>
                       </a:r>
                       <a:r>
-                        <a:rPr lang="en-US" sz="2400" dirty="0" smtClean="0"/>
+                        <a:rPr lang="en-US" sz="2400" dirty="0"/>
                         <a:t>λ</a:t>
                       </a:r>
                       <a:r>
-                        <a:rPr lang="en-US" sz="2400" baseline="-25000" dirty="0" smtClean="0"/>
+                        <a:rPr lang="en-US" sz="2400" baseline="-25000" dirty="0"/>
                         <a:t>max</a:t>
                       </a:r>
-                      <a:endParaRPr lang="en-US" sz="2400" baseline="-25000" dirty="0"/>
                     </a:p>
                   </a:txBody>
                   <a:tcPr/>
@@ -9661,11 +9866,11 @@
                         <a:defRPr/>
                       </a:pPr>
                       <a:r>
-                        <a:rPr lang="en-US" sz="2400" dirty="0" smtClean="0"/>
+                        <a:rPr lang="en-US" sz="2400" dirty="0"/>
                         <a:t>10</a:t>
                       </a:r>
                       <a:r>
-                        <a:rPr lang="en-US" sz="2400" baseline="30000" dirty="0" smtClean="0"/>
+                        <a:rPr lang="en-US" sz="2400" baseline="30000" dirty="0"/>
                         <a:t>8</a:t>
                       </a:r>
                       <a:endParaRPr lang="en-US" sz="2400" dirty="0"/>
@@ -9673,6 +9878,11 @@
                   </a:txBody>
                   <a:tcPr/>
                 </a:tc>
+                <a:extLst>
+                  <a:ext uri="{0D108BD9-81ED-4DB2-BD59-A6C34878D82A}">
+                    <a16:rowId xmlns:a16="http://schemas.microsoft.com/office/drawing/2014/main" val="10005"/>
+                  </a:ext>
+                </a:extLst>
               </a:tr>
               <a:tr h="370840">
                 <a:tc>
@@ -9698,18 +9908,17 @@
                         <a:defRPr/>
                       </a:pPr>
                       <a:r>
-                        <a:rPr lang="en-US" sz="2400" dirty="0" smtClean="0"/>
+                        <a:rPr lang="en-US" sz="2400" dirty="0"/>
                         <a:t>Cost Tolerance, </a:t>
                       </a:r>
                       <a:r>
-                        <a:rPr lang="el-GR" sz="2400" dirty="0" smtClean="0"/>
+                        <a:rPr lang="el-GR" sz="2400" dirty="0"/>
                         <a:t>ε</a:t>
                       </a:r>
                       <a:r>
-                        <a:rPr lang="en-US" sz="2400" baseline="-25000" dirty="0" smtClean="0"/>
+                        <a:rPr lang="en-US" sz="2400" baseline="-25000" dirty="0"/>
                         <a:t>J</a:t>
                       </a:r>
-                      <a:endParaRPr lang="en-US" sz="2400" baseline="-25000" dirty="0"/>
                     </a:p>
                   </a:txBody>
                   <a:tcPr/>
@@ -9721,18 +9930,22 @@
                     <a:p>
                       <a:pPr algn="ctr"/>
                       <a:r>
-                        <a:rPr lang="en-US" sz="2400" dirty="0" smtClean="0"/>
+                        <a:rPr lang="en-US" sz="2400" dirty="0"/>
                         <a:t>10</a:t>
                       </a:r>
                       <a:r>
-                        <a:rPr lang="en-US" sz="2400" baseline="30000" dirty="0" smtClean="0"/>
+                        <a:rPr lang="en-US" sz="2400" baseline="30000" dirty="0"/>
                         <a:t>-7</a:t>
                       </a:r>
-                      <a:endParaRPr lang="en-US" sz="2400" baseline="30000" dirty="0"/>
-                    </a:p>
-                  </a:txBody>
-                  <a:tcPr/>
-                </a:tc>
+                    </a:p>
+                  </a:txBody>
+                  <a:tcPr/>
+                </a:tc>
+                <a:extLst>
+                  <a:ext uri="{0D108BD9-81ED-4DB2-BD59-A6C34878D82A}">
+                    <a16:rowId xmlns:a16="http://schemas.microsoft.com/office/drawing/2014/main" val="10006"/>
+                  </a:ext>
+                </a:extLst>
               </a:tr>
               <a:tr h="370840">
                 <a:tc>
@@ -9758,15 +9971,15 @@
                         <a:defRPr/>
                       </a:pPr>
                       <a:r>
-                        <a:rPr lang="en-US" sz="2400" dirty="0" smtClean="0"/>
+                        <a:rPr lang="en-US" sz="2400" dirty="0"/>
                         <a:t>Gradient Tolerance, </a:t>
                       </a:r>
                       <a:r>
-                        <a:rPr lang="el-GR" sz="2400" dirty="0" smtClean="0"/>
+                        <a:rPr lang="el-GR" sz="2400" dirty="0"/>
                         <a:t>ε</a:t>
                       </a:r>
                       <a:r>
-                        <a:rPr lang="en-US" sz="2400" baseline="-25000" dirty="0" smtClean="0"/>
+                        <a:rPr lang="en-US" sz="2400" baseline="-25000" dirty="0"/>
                         <a:t>tol</a:t>
                       </a:r>
                     </a:p>
@@ -9796,17 +10009,22 @@
                         <a:defRPr/>
                       </a:pPr>
                       <a:r>
-                        <a:rPr lang="en-US" sz="2400" dirty="0" smtClean="0"/>
+                        <a:rPr lang="en-US" sz="2400" dirty="0"/>
                         <a:t>10</a:t>
                       </a:r>
                       <a:r>
-                        <a:rPr lang="en-US" sz="2400" baseline="30000" dirty="0" smtClean="0"/>
+                        <a:rPr lang="en-US" sz="2400" baseline="30000" dirty="0"/>
                         <a:t>-4</a:t>
                       </a:r>
                     </a:p>
                   </a:txBody>
                   <a:tcPr/>
                 </a:tc>
+                <a:extLst>
+                  <a:ext uri="{0D108BD9-81ED-4DB2-BD59-A6C34878D82A}">
+                    <a16:rowId xmlns:a16="http://schemas.microsoft.com/office/drawing/2014/main" val="10007"/>
+                  </a:ext>
+                </a:extLst>
               </a:tr>
               <a:tr h="370840">
                 <a:tc>
@@ -9816,18 +10034,17 @@
                     <a:p>
                       <a:pPr algn="l"/>
                       <a:r>
-                        <a:rPr lang="en-US" sz="2400" dirty="0" smtClean="0"/>
+                        <a:rPr lang="en-US" sz="2400" dirty="0"/>
                         <a:t>Minimum Stepsize, </a:t>
                       </a:r>
                       <a:r>
-                        <a:rPr lang="el-GR" sz="2400" dirty="0" smtClean="0"/>
+                        <a:rPr lang="el-GR" sz="2400" dirty="0"/>
                         <a:t>ε</a:t>
                       </a:r>
                       <a:r>
-                        <a:rPr lang="en-US" sz="2400" baseline="-25000" dirty="0" smtClean="0"/>
+                        <a:rPr lang="en-US" sz="2400" baseline="-25000" dirty="0"/>
                         <a:t>min</a:t>
                       </a:r>
-                      <a:endParaRPr lang="en-US" sz="2400" baseline="-25000" dirty="0"/>
                     </a:p>
                   </a:txBody>
                   <a:tcPr/>
@@ -9855,17 +10072,22 @@
                         <a:defRPr/>
                       </a:pPr>
                       <a:r>
-                        <a:rPr lang="en-US" sz="2400" dirty="0" smtClean="0"/>
+                        <a:rPr lang="en-US" sz="2400" dirty="0"/>
                         <a:t>10</a:t>
                       </a:r>
                       <a:r>
-                        <a:rPr lang="en-US" sz="2400" baseline="30000" dirty="0" smtClean="0"/>
+                        <a:rPr lang="en-US" sz="2400" baseline="30000" dirty="0"/>
                         <a:t>-3</a:t>
                       </a:r>
                     </a:p>
                   </a:txBody>
                   <a:tcPr/>
                 </a:tc>
+                <a:extLst>
+                  <a:ext uri="{0D108BD9-81ED-4DB2-BD59-A6C34878D82A}">
+                    <a16:rowId xmlns:a16="http://schemas.microsoft.com/office/drawing/2014/main" val="10008"/>
+                  </a:ext>
+                </a:extLst>
               </a:tr>
               <a:tr h="370840">
                 <a:tc>
@@ -9891,23 +10113,23 @@
                         <a:defRPr/>
                       </a:pPr>
                       <a:r>
-                        <a:rPr lang="en-US" sz="2400" dirty="0" smtClean="0"/>
+                        <a:rPr lang="en-US" sz="2400" dirty="0"/>
                         <a:t>Minimum Improvement</a:t>
                       </a:r>
                       <a:r>
-                        <a:rPr lang="en-US" sz="2400" baseline="0" dirty="0" smtClean="0"/>
+                        <a:rPr lang="en-US" sz="2400" baseline="0" dirty="0"/>
                         <a:t> Ratio</a:t>
                       </a:r>
                       <a:r>
-                        <a:rPr lang="en-US" sz="2400" dirty="0" smtClean="0"/>
+                        <a:rPr lang="en-US" sz="2400" dirty="0"/>
                         <a:t>, </a:t>
                       </a:r>
                       <a:r>
-                        <a:rPr lang="el-GR" sz="2400" dirty="0" smtClean="0"/>
+                        <a:rPr lang="el-GR" sz="2400" dirty="0"/>
                         <a:t>ε</a:t>
                       </a:r>
                       <a:r>
-                        <a:rPr lang="en-US" sz="2400" baseline="-25000" dirty="0" smtClean="0"/>
+                        <a:rPr lang="en-US" sz="2400" baseline="-25000" dirty="0"/>
                         <a:t>improve</a:t>
                       </a:r>
                     </a:p>
@@ -9937,17 +10159,22 @@
                         <a:defRPr/>
                       </a:pPr>
                       <a:r>
-                        <a:rPr lang="en-US" sz="2400" dirty="0" smtClean="0"/>
+                        <a:rPr lang="en-US" sz="2400" dirty="0"/>
                         <a:t>10</a:t>
                       </a:r>
                       <a:r>
-                        <a:rPr lang="en-US" sz="2400" baseline="30000" dirty="0" smtClean="0"/>
+                        <a:rPr lang="en-US" sz="2400" baseline="30000" dirty="0"/>
                         <a:t>-4</a:t>
                       </a:r>
                     </a:p>
                   </a:txBody>
                   <a:tcPr/>
                 </a:tc>
+                <a:extLst>
+                  <a:ext uri="{0D108BD9-81ED-4DB2-BD59-A6C34878D82A}">
+                    <a16:rowId xmlns:a16="http://schemas.microsoft.com/office/drawing/2014/main" val="10009"/>
+                  </a:ext>
+                </a:extLst>
               </a:tr>
             </a:tbl>
           </a:graphicData>
@@ -9992,14 +10219,14 @@
           <p:nvPr>
             <p:extLst>
               <p:ext uri="{D42A27DB-BD31-4B8C-83A1-F6EECF244321}">
-                <p14:modId xmlns:p14="http://schemas.microsoft.com/office/powerpoint/2010/main" val="3389298716"/>
+                <p14:modId xmlns:p14="http://schemas.microsoft.com/office/powerpoint/2010/main" val="3745951474"/>
               </p:ext>
             </p:extLst>
           </p:nvPr>
         </p:nvGraphicFramePr>
         <p:xfrm>
-          <a:off x="927100" y="1062566"/>
-          <a:ext cx="8128000" cy="1854200"/>
+          <a:off x="345574" y="407568"/>
+          <a:ext cx="7678244" cy="1854200"/>
         </p:xfrm>
         <a:graphic>
           <a:graphicData uri="http://schemas.openxmlformats.org/drawingml/2006/table">
@@ -10008,10 +10235,34 @@
                 <a:tableStyleId>{073A0DAA-6AF3-43AB-8588-CEC1D06C72B9}</a:tableStyleId>
               </a:tblPr>
               <a:tblGrid>
-                <a:gridCol w="2032000"/>
-                <a:gridCol w="2032000"/>
-                <a:gridCol w="2032000"/>
-                <a:gridCol w="2032000"/>
+                <a:gridCol w="2002659">
+                  <a:extLst>
+                    <a:ext uri="{9D8B030D-6E8A-4147-A177-3AD203B41FA5}">
+                      <a16:colId xmlns:a16="http://schemas.microsoft.com/office/drawing/2014/main" val="20000"/>
+                    </a:ext>
+                  </a:extLst>
+                </a:gridCol>
+                <a:gridCol w="2017986">
+                  <a:extLst>
+                    <a:ext uri="{9D8B030D-6E8A-4147-A177-3AD203B41FA5}">
+                      <a16:colId xmlns:a16="http://schemas.microsoft.com/office/drawing/2014/main" val="20001"/>
+                    </a:ext>
+                  </a:extLst>
+                </a:gridCol>
+                <a:gridCol w="2081048">
+                  <a:extLst>
+                    <a:ext uri="{9D8B030D-6E8A-4147-A177-3AD203B41FA5}">
+                      <a16:colId xmlns:a16="http://schemas.microsoft.com/office/drawing/2014/main" val="20002"/>
+                    </a:ext>
+                  </a:extLst>
+                </a:gridCol>
+                <a:gridCol w="1576551">
+                  <a:extLst>
+                    <a:ext uri="{9D8B030D-6E8A-4147-A177-3AD203B41FA5}">
+                      <a16:colId xmlns:a16="http://schemas.microsoft.com/office/drawing/2014/main" val="20003"/>
+                    </a:ext>
+                  </a:extLst>
+                </a:gridCol>
               </a:tblGrid>
               <a:tr h="370840">
                 <a:tc>
@@ -10021,10 +10272,9 @@
                     <a:p>
                       <a:pPr algn="ctr"/>
                       <a:r>
-                        <a:rPr lang="en-US" dirty="0" smtClean="0"/>
+                        <a:rPr lang="en-US" dirty="0"/>
                         <a:t>State Variable</a:t>
                       </a:r>
-                      <a:endParaRPr lang="en-US" dirty="0"/>
                     </a:p>
                   </a:txBody>
                   <a:tcPr/>
@@ -10036,10 +10286,9 @@
                     <a:p>
                       <a:pPr algn="ctr"/>
                       <a:r>
-                        <a:rPr lang="en-US" dirty="0" smtClean="0"/>
+                        <a:rPr lang="en-US" dirty="0"/>
                         <a:t>Mean Value</a:t>
                       </a:r>
-                      <a:endParaRPr lang="en-US" dirty="0"/>
                     </a:p>
                   </a:txBody>
                   <a:tcPr/>
@@ -10051,10 +10300,9 @@
                     <a:p>
                       <a:pPr algn="ctr"/>
                       <a:r>
-                        <a:rPr lang="en-US" dirty="0" smtClean="0"/>
+                        <a:rPr lang="en-US" dirty="0"/>
                         <a:t>Standard Deviation</a:t>
                       </a:r>
-                      <a:endParaRPr lang="en-US" dirty="0"/>
                     </a:p>
                   </a:txBody>
                   <a:tcPr/>
@@ -10066,14 +10314,18 @@
                     <a:p>
                       <a:pPr algn="ctr"/>
                       <a:r>
-                        <a:rPr lang="en-US" dirty="0" smtClean="0"/>
+                        <a:rPr lang="en-US" dirty="0"/>
                         <a:t>Units</a:t>
                       </a:r>
-                      <a:endParaRPr lang="en-US" dirty="0"/>
-                    </a:p>
-                  </a:txBody>
-                  <a:tcPr/>
-                </a:tc>
+                    </a:p>
+                  </a:txBody>
+                  <a:tcPr/>
+                </a:tc>
+                <a:extLst>
+                  <a:ext uri="{0D108BD9-81ED-4DB2-BD59-A6C34878D82A}">
+                    <a16:rowId xmlns:a16="http://schemas.microsoft.com/office/drawing/2014/main" val="10000"/>
+                  </a:ext>
+                </a:extLst>
               </a:tr>
               <a:tr h="370840">
                 <a:tc>
@@ -10083,10 +10335,9 @@
                     <a:p>
                       <a:pPr algn="ctr"/>
                       <a:r>
-                        <a:rPr lang="en-US" dirty="0" smtClean="0"/>
+                        <a:rPr lang="en-US" dirty="0"/>
                         <a:t>Altitude</a:t>
                       </a:r>
-                      <a:endParaRPr lang="en-US" dirty="0"/>
                     </a:p>
                   </a:txBody>
                   <a:tcPr/>
@@ -10098,10 +10349,9 @@
                     <a:p>
                       <a:pPr algn="ctr"/>
                       <a:r>
-                        <a:rPr lang="en-US" dirty="0" smtClean="0"/>
+                        <a:rPr lang="en-US" dirty="0"/>
                         <a:t>120</a:t>
                       </a:r>
-                      <a:endParaRPr lang="en-US" dirty="0"/>
                     </a:p>
                   </a:txBody>
                   <a:tcPr/>
@@ -10113,10 +10363,9 @@
                     <a:p>
                       <a:pPr algn="ctr"/>
                       <a:r>
-                        <a:rPr lang="en-US" dirty="0" smtClean="0"/>
+                        <a:rPr lang="en-US" dirty="0"/>
                         <a:t>-</a:t>
                       </a:r>
-                      <a:endParaRPr lang="en-US" dirty="0"/>
                     </a:p>
                   </a:txBody>
                   <a:tcPr/>
@@ -10128,14 +10377,18 @@
                     <a:p>
                       <a:pPr algn="ctr"/>
                       <a:r>
-                        <a:rPr lang="en-US" dirty="0" smtClean="0"/>
+                        <a:rPr lang="en-US" dirty="0"/>
                         <a:t>km</a:t>
                       </a:r>
-                      <a:endParaRPr lang="en-US" dirty="0"/>
-                    </a:p>
-                  </a:txBody>
-                  <a:tcPr/>
-                </a:tc>
+                    </a:p>
+                  </a:txBody>
+                  <a:tcPr/>
+                </a:tc>
+                <a:extLst>
+                  <a:ext uri="{0D108BD9-81ED-4DB2-BD59-A6C34878D82A}">
+                    <a16:rowId xmlns:a16="http://schemas.microsoft.com/office/drawing/2014/main" val="10001"/>
+                  </a:ext>
+                </a:extLst>
               </a:tr>
               <a:tr h="370840">
                 <a:tc>
@@ -10145,10 +10398,9 @@
                     <a:p>
                       <a:pPr algn="ctr"/>
                       <a:r>
-                        <a:rPr lang="en-US" dirty="0" smtClean="0"/>
+                        <a:rPr lang="en-US" dirty="0"/>
                         <a:t>Velocity</a:t>
                       </a:r>
-                      <a:endParaRPr lang="en-US" dirty="0"/>
                     </a:p>
                   </a:txBody>
                   <a:tcPr/>
@@ -10160,10 +10412,9 @@
                     <a:p>
                       <a:pPr algn="ctr"/>
                       <a:r>
-                        <a:rPr lang="en-US" dirty="0" smtClean="0"/>
+                        <a:rPr lang="en-US" dirty="0"/>
                         <a:t>5505</a:t>
                       </a:r>
-                      <a:endParaRPr lang="en-US" dirty="0"/>
                     </a:p>
                   </a:txBody>
                   <a:tcPr/>
@@ -10175,10 +10426,9 @@
                     <a:p>
                       <a:pPr algn="ctr"/>
                       <a:r>
-                        <a:rPr lang="en-US" dirty="0" smtClean="0"/>
+                        <a:rPr lang="en-US" dirty="0"/>
                         <a:t>1</a:t>
                       </a:r>
-                      <a:endParaRPr lang="en-US" dirty="0"/>
                     </a:p>
                   </a:txBody>
                   <a:tcPr/>
@@ -10190,14 +10440,18 @@
                     <a:p>
                       <a:pPr algn="ctr"/>
                       <a:r>
-                        <a:rPr lang="en-US" dirty="0" smtClean="0"/>
+                        <a:rPr lang="en-US" dirty="0"/>
                         <a:t>m/s</a:t>
                       </a:r>
-                      <a:endParaRPr lang="en-US" dirty="0"/>
-                    </a:p>
-                  </a:txBody>
-                  <a:tcPr/>
-                </a:tc>
+                    </a:p>
+                  </a:txBody>
+                  <a:tcPr/>
+                </a:tc>
+                <a:extLst>
+                  <a:ext uri="{0D108BD9-81ED-4DB2-BD59-A6C34878D82A}">
+                    <a16:rowId xmlns:a16="http://schemas.microsoft.com/office/drawing/2014/main" val="10002"/>
+                  </a:ext>
+                </a:extLst>
               </a:tr>
               <a:tr h="370840">
                 <a:tc>
@@ -10207,10 +10461,9 @@
                     <a:p>
                       <a:pPr algn="ctr"/>
                       <a:r>
-                        <a:rPr lang="en-US" dirty="0" smtClean="0"/>
+                        <a:rPr lang="en-US" dirty="0"/>
                         <a:t>Range</a:t>
                       </a:r>
-                      <a:endParaRPr lang="en-US" dirty="0"/>
                     </a:p>
                   </a:txBody>
                   <a:tcPr/>
@@ -10222,10 +10475,9 @@
                     <a:p>
                       <a:pPr algn="ctr"/>
                       <a:r>
-                        <a:rPr lang="en-US" dirty="0" smtClean="0"/>
+                        <a:rPr lang="en-US" dirty="0"/>
                         <a:t>0</a:t>
                       </a:r>
-                      <a:endParaRPr lang="en-US" dirty="0"/>
                     </a:p>
                   </a:txBody>
                   <a:tcPr/>
@@ -10237,10 +10489,9 @@
                     <a:p>
                       <a:pPr algn="ctr"/>
                       <a:r>
-                        <a:rPr lang="en-US" dirty="0" smtClean="0"/>
-                        <a:t>5</a:t>
-                      </a:r>
-                      <a:endParaRPr lang="en-US" dirty="0"/>
+                        <a:rPr lang="en-US" dirty="0"/>
+                        <a:t>8</a:t>
+                      </a:r>
                     </a:p>
                   </a:txBody>
                   <a:tcPr/>
@@ -10252,14 +10503,18 @@
                     <a:p>
                       <a:pPr algn="ctr"/>
                       <a:r>
-                        <a:rPr lang="en-US" dirty="0" smtClean="0"/>
+                        <a:rPr lang="en-US" dirty="0"/>
                         <a:t>km</a:t>
                       </a:r>
-                      <a:endParaRPr lang="en-US" dirty="0"/>
-                    </a:p>
-                  </a:txBody>
-                  <a:tcPr/>
-                </a:tc>
+                    </a:p>
+                  </a:txBody>
+                  <a:tcPr/>
+                </a:tc>
+                <a:extLst>
+                  <a:ext uri="{0D108BD9-81ED-4DB2-BD59-A6C34878D82A}">
+                    <a16:rowId xmlns:a16="http://schemas.microsoft.com/office/drawing/2014/main" val="10003"/>
+                  </a:ext>
+                </a:extLst>
               </a:tr>
               <a:tr h="370840">
                 <a:tc>
@@ -10269,10 +10524,9 @@
                     <a:p>
                       <a:pPr algn="ctr"/>
                       <a:r>
-                        <a:rPr lang="en-US" dirty="0" smtClean="0"/>
+                        <a:rPr lang="en-US" dirty="0"/>
                         <a:t>FPA</a:t>
                       </a:r>
-                      <a:endParaRPr lang="en-US" dirty="0"/>
                     </a:p>
                   </a:txBody>
                   <a:tcPr/>
@@ -10284,10 +10538,9 @@
                     <a:p>
                       <a:pPr algn="ctr"/>
                       <a:r>
-                        <a:rPr lang="en-US" dirty="0" smtClean="0"/>
+                        <a:rPr lang="en-US" dirty="0"/>
                         <a:t>-15.5</a:t>
                       </a:r>
-                      <a:endParaRPr lang="en-US" dirty="0"/>
                     </a:p>
                   </a:txBody>
                   <a:tcPr/>
@@ -10299,10 +10552,9 @@
                     <a:p>
                       <a:pPr algn="ctr"/>
                       <a:r>
-                        <a:rPr lang="en-US" dirty="0" smtClean="0"/>
+                        <a:rPr lang="en-US" dirty="0"/>
                         <a:t>0.2</a:t>
                       </a:r>
-                      <a:endParaRPr lang="en-US" dirty="0"/>
                     </a:p>
                   </a:txBody>
                   <a:tcPr/>
@@ -10314,14 +10566,18 @@
                     <a:p>
                       <a:pPr algn="ctr"/>
                       <a:r>
-                        <a:rPr lang="en-US" dirty="0" smtClean="0"/>
+                        <a:rPr lang="en-US" dirty="0"/>
                         <a:t>deg</a:t>
                       </a:r>
-                      <a:endParaRPr lang="en-US" dirty="0"/>
-                    </a:p>
-                  </a:txBody>
-                  <a:tcPr/>
-                </a:tc>
+                    </a:p>
+                  </a:txBody>
+                  <a:tcPr/>
+                </a:tc>
+                <a:extLst>
+                  <a:ext uri="{0D108BD9-81ED-4DB2-BD59-A6C34878D82A}">
+                    <a16:rowId xmlns:a16="http://schemas.microsoft.com/office/drawing/2014/main" val="10004"/>
+                  </a:ext>
+                </a:extLst>
               </a:tr>
             </a:tbl>
           </a:graphicData>
@@ -10336,14 +10592,14 @@
           <p:nvPr>
             <p:extLst>
               <p:ext uri="{D42A27DB-BD31-4B8C-83A1-F6EECF244321}">
-                <p14:modId xmlns:p14="http://schemas.microsoft.com/office/powerpoint/2010/main" val="3890765575"/>
+                <p14:modId xmlns:p14="http://schemas.microsoft.com/office/powerpoint/2010/main" val="3508539009"/>
               </p:ext>
             </p:extLst>
           </p:nvPr>
         </p:nvGraphicFramePr>
         <p:xfrm>
-          <a:off x="850900" y="4110566"/>
-          <a:ext cx="8128000" cy="1854200"/>
+          <a:off x="345574" y="2947237"/>
+          <a:ext cx="7678244" cy="1854200"/>
         </p:xfrm>
         <a:graphic>
           <a:graphicData uri="http://schemas.openxmlformats.org/drawingml/2006/table">
@@ -10352,10 +10608,34 @@
                 <a:tableStyleId>{073A0DAA-6AF3-43AB-8588-CEC1D06C72B9}</a:tableStyleId>
               </a:tblPr>
               <a:tblGrid>
-                <a:gridCol w="2032000"/>
-                <a:gridCol w="2032000"/>
-                <a:gridCol w="2032000"/>
-                <a:gridCol w="2032000"/>
+                <a:gridCol w="2018424">
+                  <a:extLst>
+                    <a:ext uri="{9D8B030D-6E8A-4147-A177-3AD203B41FA5}">
+                      <a16:colId xmlns:a16="http://schemas.microsoft.com/office/drawing/2014/main" val="20000"/>
+                    </a:ext>
+                  </a:extLst>
+                </a:gridCol>
+                <a:gridCol w="2002221">
+                  <a:extLst>
+                    <a:ext uri="{9D8B030D-6E8A-4147-A177-3AD203B41FA5}">
+                      <a16:colId xmlns:a16="http://schemas.microsoft.com/office/drawing/2014/main" val="20001"/>
+                    </a:ext>
+                  </a:extLst>
+                </a:gridCol>
+                <a:gridCol w="2049517">
+                  <a:extLst>
+                    <a:ext uri="{9D8B030D-6E8A-4147-A177-3AD203B41FA5}">
+                      <a16:colId xmlns:a16="http://schemas.microsoft.com/office/drawing/2014/main" val="20002"/>
+                    </a:ext>
+                  </a:extLst>
+                </a:gridCol>
+                <a:gridCol w="1608082">
+                  <a:extLst>
+                    <a:ext uri="{9D8B030D-6E8A-4147-A177-3AD203B41FA5}">
+                      <a16:colId xmlns:a16="http://schemas.microsoft.com/office/drawing/2014/main" val="20003"/>
+                    </a:ext>
+                  </a:extLst>
+                </a:gridCol>
               </a:tblGrid>
               <a:tr h="370840">
                 <a:tc>
@@ -10365,10 +10645,9 @@
                     <a:p>
                       <a:pPr algn="ctr"/>
                       <a:r>
-                        <a:rPr lang="en-US" dirty="0" smtClean="0"/>
+                        <a:rPr lang="en-US" dirty="0"/>
                         <a:t>State Variable</a:t>
                       </a:r>
-                      <a:endParaRPr lang="en-US" dirty="0"/>
                     </a:p>
                   </a:txBody>
                   <a:tcPr/>
@@ -10380,10 +10659,9 @@
                     <a:p>
                       <a:pPr algn="ctr"/>
                       <a:r>
-                        <a:rPr lang="en-US" dirty="0" smtClean="0"/>
+                        <a:rPr lang="en-US" dirty="0"/>
                         <a:t>Mean Value</a:t>
                       </a:r>
-                      <a:endParaRPr lang="en-US" dirty="0"/>
                     </a:p>
                   </a:txBody>
                   <a:tcPr/>
@@ -10395,10 +10673,9 @@
                     <a:p>
                       <a:pPr algn="ctr"/>
                       <a:r>
-                        <a:rPr lang="en-US" dirty="0" smtClean="0"/>
+                        <a:rPr lang="en-US" dirty="0"/>
                         <a:t>Standard Deviation</a:t>
                       </a:r>
-                      <a:endParaRPr lang="en-US" dirty="0"/>
                     </a:p>
                   </a:txBody>
                   <a:tcPr/>
@@ -10410,14 +10687,18 @@
                     <a:p>
                       <a:pPr algn="ctr"/>
                       <a:r>
-                        <a:rPr lang="en-US" dirty="0" smtClean="0"/>
+                        <a:rPr lang="en-US" dirty="0"/>
                         <a:t>Units</a:t>
                       </a:r>
-                      <a:endParaRPr lang="en-US" dirty="0"/>
-                    </a:p>
-                  </a:txBody>
-                  <a:tcPr/>
-                </a:tc>
+                    </a:p>
+                  </a:txBody>
+                  <a:tcPr/>
+                </a:tc>
+                <a:extLst>
+                  <a:ext uri="{0D108BD9-81ED-4DB2-BD59-A6C34878D82A}">
+                    <a16:rowId xmlns:a16="http://schemas.microsoft.com/office/drawing/2014/main" val="10000"/>
+                  </a:ext>
+                </a:extLst>
               </a:tr>
               <a:tr h="370840">
                 <a:tc>
@@ -10427,10 +10708,9 @@
                     <a:p>
                       <a:pPr algn="ctr"/>
                       <a:r>
-                        <a:rPr lang="en-US" dirty="0" smtClean="0"/>
+                        <a:rPr lang="en-US" dirty="0"/>
                         <a:t>Altitude </a:t>
                       </a:r>
-                      <a:endParaRPr lang="en-US" dirty="0"/>
                     </a:p>
                   </a:txBody>
                   <a:tcPr/>
@@ -10442,10 +10722,9 @@
                     <a:p>
                       <a:pPr algn="ctr"/>
                       <a:r>
-                        <a:rPr lang="en-US" dirty="0" smtClean="0"/>
-                        <a:t>39.5</a:t>
-                      </a:r>
-                      <a:endParaRPr lang="en-US" dirty="0"/>
+                        <a:rPr lang="en-US" dirty="0"/>
+                        <a:t>53.5</a:t>
+                      </a:r>
                     </a:p>
                   </a:txBody>
                   <a:tcPr/>
@@ -10457,10 +10736,9 @@
                     <a:p>
                       <a:pPr algn="ctr"/>
                       <a:r>
-                        <a:rPr lang="en-US" dirty="0" smtClean="0"/>
-                        <a:t>2.5</a:t>
-                      </a:r>
-                      <a:endParaRPr lang="en-US" dirty="0"/>
+                        <a:rPr lang="en-US" dirty="0"/>
+                        <a:t>1.0</a:t>
+                      </a:r>
                     </a:p>
                   </a:txBody>
                   <a:tcPr/>
@@ -10472,14 +10750,18 @@
                     <a:p>
                       <a:pPr algn="ctr"/>
                       <a:r>
-                        <a:rPr lang="en-US" dirty="0" smtClean="0"/>
+                        <a:rPr lang="en-US" dirty="0"/>
                         <a:t>km</a:t>
                       </a:r>
-                      <a:endParaRPr lang="en-US" dirty="0"/>
-                    </a:p>
-                  </a:txBody>
-                  <a:tcPr/>
-                </a:tc>
+                    </a:p>
+                  </a:txBody>
+                  <a:tcPr/>
+                </a:tc>
+                <a:extLst>
+                  <a:ext uri="{0D108BD9-81ED-4DB2-BD59-A6C34878D82A}">
+                    <a16:rowId xmlns:a16="http://schemas.microsoft.com/office/drawing/2014/main" val="10001"/>
+                  </a:ext>
+                </a:extLst>
               </a:tr>
               <a:tr h="370840">
                 <a:tc>
@@ -10489,10 +10771,9 @@
                     <a:p>
                       <a:pPr algn="ctr"/>
                       <a:r>
-                        <a:rPr lang="en-US" dirty="0" smtClean="0"/>
+                        <a:rPr lang="en-US" dirty="0"/>
                         <a:t>Velocity </a:t>
                       </a:r>
-                      <a:endParaRPr lang="en-US" dirty="0"/>
                     </a:p>
                   </a:txBody>
                   <a:tcPr/>
@@ -10504,10 +10785,9 @@
                     <a:p>
                       <a:pPr algn="ctr"/>
                       <a:r>
-                        <a:rPr lang="en-US" dirty="0" smtClean="0"/>
-                        <a:t>5460</a:t>
-                      </a:r>
-                      <a:endParaRPr lang="en-US" dirty="0"/>
+                        <a:rPr lang="en-US" dirty="0"/>
+                        <a:t>5500</a:t>
+                      </a:r>
                     </a:p>
                   </a:txBody>
                   <a:tcPr/>
@@ -10519,10 +10799,9 @@
                     <a:p>
                       <a:pPr algn="ctr"/>
                       <a:r>
-                        <a:rPr lang="en-US" dirty="0" smtClean="0"/>
+                        <a:rPr lang="en-US" dirty="0"/>
                         <a:t>-</a:t>
                       </a:r>
-                      <a:endParaRPr lang="en-US" dirty="0"/>
                     </a:p>
                   </a:txBody>
                   <a:tcPr/>
@@ -10534,14 +10813,18 @@
                     <a:p>
                       <a:pPr algn="ctr"/>
                       <a:r>
-                        <a:rPr lang="en-US" dirty="0" smtClean="0"/>
+                        <a:rPr lang="en-US" dirty="0"/>
                         <a:t>m/s</a:t>
                       </a:r>
-                      <a:endParaRPr lang="en-US" dirty="0"/>
-                    </a:p>
-                  </a:txBody>
-                  <a:tcPr/>
-                </a:tc>
+                    </a:p>
+                  </a:txBody>
+                  <a:tcPr/>
+                </a:tc>
+                <a:extLst>
+                  <a:ext uri="{0D108BD9-81ED-4DB2-BD59-A6C34878D82A}">
+                    <a16:rowId xmlns:a16="http://schemas.microsoft.com/office/drawing/2014/main" val="10002"/>
+                  </a:ext>
+                </a:extLst>
               </a:tr>
               <a:tr h="370840">
                 <a:tc>
@@ -10551,9 +10834,41 @@
                     <a:p>
                       <a:pPr algn="ctr"/>
                       <a:r>
-                        <a:rPr lang="en-US" dirty="0" smtClean="0"/>
+                        <a:rPr lang="en-US" dirty="0"/>
                         <a:t>Range </a:t>
                       </a:r>
+                    </a:p>
+                  </a:txBody>
+                  <a:tcPr/>
+                </a:tc>
+                <a:tc>
+                  <a:txBody>
+                    <a:bodyPr/>
+                    <a:lstStyle/>
+                    <a:p>
+                      <a:pPr algn="ctr"/>
+                      <a:r>
+                        <a:rPr lang="en-US" dirty="0"/>
+                        <a:t>0</a:t>
+                      </a:r>
+                    </a:p>
+                  </a:txBody>
+                  <a:tcPr/>
+                </a:tc>
+                <a:tc>
+                  <a:txBody>
+                    <a:bodyPr/>
+                    <a:lstStyle/>
+                    <a:p>
+                      <a:pPr algn="ctr"/>
+                      <a:r>
+                        <a:rPr lang="en-US" dirty="0"/>
+                        <a:t>10</a:t>
+                      </a:r>
+                      <a:r>
+                        <a:rPr lang="en-US" baseline="0" dirty="0"/>
+                        <a:t> </a:t>
+                      </a:r>
                       <a:endParaRPr lang="en-US" dirty="0"/>
                     </a:p>
                   </a:txBody>
@@ -10566,48 +10881,18 @@
                     <a:p>
                       <a:pPr algn="ctr"/>
                       <a:r>
-                        <a:rPr lang="en-US" dirty="0" smtClean="0"/>
-                        <a:t>0</a:t>
-                      </a:r>
-                      <a:endParaRPr lang="en-US" dirty="0"/>
-                    </a:p>
-                  </a:txBody>
-                  <a:tcPr/>
-                </a:tc>
-                <a:tc>
-                  <a:txBody>
-                    <a:bodyPr/>
-                    <a:lstStyle/>
-                    <a:p>
-                      <a:pPr algn="ctr"/>
-                      <a:r>
-                        <a:rPr lang="en-US" dirty="0" smtClean="0"/>
-                        <a:t>10</a:t>
-                      </a:r>
-                      <a:r>
-                        <a:rPr lang="en-US" baseline="0" dirty="0" smtClean="0"/>
-                        <a:t> </a:t>
-                      </a:r>
-                      <a:endParaRPr lang="en-US" dirty="0"/>
-                    </a:p>
-                  </a:txBody>
-                  <a:tcPr/>
-                </a:tc>
-                <a:tc>
-                  <a:txBody>
-                    <a:bodyPr/>
-                    <a:lstStyle/>
-                    <a:p>
-                      <a:pPr algn="ctr"/>
-                      <a:r>
-                        <a:rPr lang="en-US" dirty="0" smtClean="0"/>
+                        <a:rPr lang="en-US" dirty="0"/>
                         <a:t>km</a:t>
                       </a:r>
-                      <a:endParaRPr lang="en-US" dirty="0"/>
-                    </a:p>
-                  </a:txBody>
-                  <a:tcPr/>
-                </a:tc>
+                    </a:p>
+                  </a:txBody>
+                  <a:tcPr/>
+                </a:tc>
+                <a:extLst>
+                  <a:ext uri="{0D108BD9-81ED-4DB2-BD59-A6C34878D82A}">
+                    <a16:rowId xmlns:a16="http://schemas.microsoft.com/office/drawing/2014/main" val="10003"/>
+                  </a:ext>
+                </a:extLst>
               </a:tr>
               <a:tr h="370840">
                 <a:tc>
@@ -10617,10 +10902,9 @@
                     <a:p>
                       <a:pPr algn="ctr"/>
                       <a:r>
-                        <a:rPr lang="en-US" dirty="0" smtClean="0"/>
+                        <a:rPr lang="en-US" dirty="0"/>
                         <a:t>FPA </a:t>
                       </a:r>
-                      <a:endParaRPr lang="en-US" dirty="0"/>
                     </a:p>
                   </a:txBody>
                   <a:tcPr/>
@@ -10632,10 +10916,9 @@
                     <a:p>
                       <a:pPr algn="ctr"/>
                       <a:r>
-                        <a:rPr lang="en-US" dirty="0" smtClean="0"/>
-                        <a:t>-10.6</a:t>
-                      </a:r>
-                      <a:endParaRPr lang="en-US" dirty="0"/>
+                        <a:rPr lang="en-US" dirty="0"/>
+                        <a:t>-13.0</a:t>
+                      </a:r>
                     </a:p>
                   </a:txBody>
                   <a:tcPr/>
@@ -10647,10 +10930,9 @@
                     <a:p>
                       <a:pPr algn="ctr"/>
                       <a:r>
-                        <a:rPr lang="en-US" dirty="0" smtClean="0"/>
+                        <a:rPr lang="en-US" dirty="0"/>
                         <a:t>0.25</a:t>
                       </a:r>
-                      <a:endParaRPr lang="en-US" dirty="0"/>
                     </a:p>
                   </a:txBody>
                   <a:tcPr/>
@@ -10662,14 +10944,18 @@
                     <a:p>
                       <a:pPr algn="ctr"/>
                       <a:r>
-                        <a:rPr lang="en-US" dirty="0" smtClean="0"/>
+                        <a:rPr lang="en-US" dirty="0"/>
                         <a:t>deg</a:t>
                       </a:r>
-                      <a:endParaRPr lang="en-US" dirty="0"/>
-                    </a:p>
-                  </a:txBody>
-                  <a:tcPr/>
-                </a:tc>
+                    </a:p>
+                  </a:txBody>
+                  <a:tcPr/>
+                </a:tc>
+                <a:extLst>
+                  <a:ext uri="{0D108BD9-81ED-4DB2-BD59-A6C34878D82A}">
+                    <a16:rowId xmlns:a16="http://schemas.microsoft.com/office/drawing/2014/main" val="10004"/>
+                  </a:ext>
+                </a:extLst>
               </a:tr>
             </a:tbl>
           </a:graphicData>
@@ -10679,6 +10965,656 @@
     <p:extLst>
       <p:ext uri="{BB962C8B-B14F-4D97-AF65-F5344CB8AC3E}">
         <p14:creationId xmlns:p14="http://schemas.microsoft.com/office/powerpoint/2010/main" val="288396584"/>
+      </p:ext>
+    </p:extLst>
+  </p:cSld>
+  <p:clrMapOvr>
+    <a:masterClrMapping/>
+  </p:clrMapOvr>
+</p:sld>
+</file>
+
+<file path=ppt/slides/slide8.xml><?xml version="1.0" encoding="utf-8"?>
+<p:sld xmlns:a="http://schemas.openxmlformats.org/drawingml/2006/main" xmlns:r="http://schemas.openxmlformats.org/officeDocument/2006/relationships" xmlns:p="http://schemas.openxmlformats.org/presentationml/2006/main">
+  <p:cSld>
+    <p:spTree>
+      <p:nvGrpSpPr>
+        <p:cNvPr id="1" name=""/>
+        <p:cNvGrpSpPr/>
+        <p:nvPr/>
+      </p:nvGrpSpPr>
+      <p:grpSpPr>
+        <a:xfrm>
+          <a:off x="0" y="0"/>
+          <a:ext cx="0" cy="0"/>
+          <a:chOff x="0" y="0"/>
+          <a:chExt cx="0" cy="0"/>
+        </a:xfrm>
+      </p:grpSpPr>
+      <p:graphicFrame>
+        <p:nvGraphicFramePr>
+          <p:cNvPr id="2" name="Table 1"/>
+          <p:cNvGraphicFramePr>
+            <a:graphicFrameLocks noGrp="1"/>
+          </p:cNvGraphicFramePr>
+          <p:nvPr>
+            <p:extLst>
+              <p:ext uri="{D42A27DB-BD31-4B8C-83A1-F6EECF244321}">
+                <p14:modId xmlns:p14="http://schemas.microsoft.com/office/powerpoint/2010/main" val="1733646473"/>
+              </p:ext>
+            </p:extLst>
+          </p:nvPr>
+        </p:nvGraphicFramePr>
+        <p:xfrm>
+          <a:off x="345574" y="1379621"/>
+          <a:ext cx="7678244" cy="2941320"/>
+        </p:xfrm>
+        <a:graphic>
+          <a:graphicData uri="http://schemas.openxmlformats.org/drawingml/2006/table">
+            <a:tbl>
+              <a:tblPr firstRow="1" bandRow="1">
+                <a:tableStyleId>{073A0DAA-6AF3-43AB-8588-CEC1D06C72B9}</a:tableStyleId>
+              </a:tblPr>
+              <a:tblGrid>
+                <a:gridCol w="2002659">
+                  <a:extLst>
+                    <a:ext uri="{9D8B030D-6E8A-4147-A177-3AD203B41FA5}">
+                      <a16:colId xmlns:a16="http://schemas.microsoft.com/office/drawing/2014/main" val="20000"/>
+                    </a:ext>
+                  </a:extLst>
+                </a:gridCol>
+                <a:gridCol w="2017986">
+                  <a:extLst>
+                    <a:ext uri="{9D8B030D-6E8A-4147-A177-3AD203B41FA5}">
+                      <a16:colId xmlns:a16="http://schemas.microsoft.com/office/drawing/2014/main" val="20001"/>
+                    </a:ext>
+                  </a:extLst>
+                </a:gridCol>
+                <a:gridCol w="2081048">
+                  <a:extLst>
+                    <a:ext uri="{9D8B030D-6E8A-4147-A177-3AD203B41FA5}">
+                      <a16:colId xmlns:a16="http://schemas.microsoft.com/office/drawing/2014/main" val="20002"/>
+                    </a:ext>
+                  </a:extLst>
+                </a:gridCol>
+                <a:gridCol w="1576551">
+                  <a:extLst>
+                    <a:ext uri="{9D8B030D-6E8A-4147-A177-3AD203B41FA5}">
+                      <a16:colId xmlns:a16="http://schemas.microsoft.com/office/drawing/2014/main" val="20003"/>
+                    </a:ext>
+                  </a:extLst>
+                </a:gridCol>
+              </a:tblGrid>
+              <a:tr h="249019">
+                <a:tc gridSpan="2">
+                  <a:txBody>
+                    <a:bodyPr/>
+                    <a:lstStyle/>
+                    <a:p>
+                      <a:pPr algn="ctr"/>
+                      <a:r>
+                        <a:rPr lang="en-US" b="1" dirty="0"/>
+                        <a:t>Low Altitude</a:t>
+                      </a:r>
+                    </a:p>
+                  </a:txBody>
+                  <a:tcPr/>
+                </a:tc>
+                <a:tc hMerge="1">
+                  <a:txBody>
+                    <a:bodyPr/>
+                    <a:lstStyle/>
+                    <a:p>
+                      <a:pPr algn="ctr"/>
+                      <a:r>
+                        <a:rPr lang="en-US" dirty="0"/>
+                        <a:t>Mean Value</a:t>
+                      </a:r>
+                    </a:p>
+                  </a:txBody>
+                  <a:tcPr/>
+                </a:tc>
+                <a:tc gridSpan="2">
+                  <a:txBody>
+                    <a:bodyPr/>
+                    <a:lstStyle/>
+                    <a:p>
+                      <a:pPr algn="ctr"/>
+                      <a:r>
+                        <a:rPr lang="en-US" b="1" dirty="0"/>
+                        <a:t>High Range Error</a:t>
+                      </a:r>
+                    </a:p>
+                  </a:txBody>
+                  <a:tcPr/>
+                </a:tc>
+                <a:tc hMerge="1">
+                  <a:txBody>
+                    <a:bodyPr/>
+                    <a:lstStyle/>
+                    <a:p>
+                      <a:pPr algn="ctr"/>
+                      <a:r>
+                        <a:rPr lang="en-US" dirty="0"/>
+                        <a:t>Units</a:t>
+                      </a:r>
+                    </a:p>
+                  </a:txBody>
+                  <a:tcPr/>
+                </a:tc>
+                <a:extLst>
+                  <a:ext uri="{0D108BD9-81ED-4DB2-BD59-A6C34878D82A}">
+                    <a16:rowId xmlns:a16="http://schemas.microsoft.com/office/drawing/2014/main" val="10000"/>
+                  </a:ext>
+                </a:extLst>
+              </a:tr>
+              <a:tr h="370840">
+                <a:tc>
+                  <a:txBody>
+                    <a:bodyPr/>
+                    <a:lstStyle/>
+                    <a:p>
+                      <a:pPr algn="ctr"/>
+                      <a:r>
+                        <a:rPr lang="en-US" b="1" dirty="0"/>
+                        <a:t>Uncertainty</a:t>
+                      </a:r>
+                    </a:p>
+                  </a:txBody>
+                  <a:tcPr/>
+                </a:tc>
+                <a:tc>
+                  <a:txBody>
+                    <a:bodyPr/>
+                    <a:lstStyle/>
+                    <a:p>
+                      <a:pPr algn="ctr"/>
+                      <a:r>
+                        <a:rPr lang="en-US" b="1" dirty="0"/>
+                        <a:t>KS Statistic</a:t>
+                      </a:r>
+                    </a:p>
+                  </a:txBody>
+                  <a:tcPr/>
+                </a:tc>
+                <a:tc>
+                  <a:txBody>
+                    <a:bodyPr/>
+                    <a:lstStyle/>
+                    <a:p>
+                      <a:pPr algn="ctr"/>
+                      <a:r>
+                        <a:rPr lang="en-US" b="1" dirty="0"/>
+                        <a:t>Uncertainty</a:t>
+                      </a:r>
+                    </a:p>
+                  </a:txBody>
+                  <a:tcPr/>
+                </a:tc>
+                <a:tc>
+                  <a:txBody>
+                    <a:bodyPr/>
+                    <a:lstStyle/>
+                    <a:p>
+                      <a:pPr algn="ctr"/>
+                      <a:r>
+                        <a:rPr lang="en-US" b="1" dirty="0"/>
+                        <a:t>KS Statistic</a:t>
+                      </a:r>
+                    </a:p>
+                  </a:txBody>
+                  <a:tcPr/>
+                </a:tc>
+                <a:extLst>
+                  <a:ext uri="{0D108BD9-81ED-4DB2-BD59-A6C34878D82A}">
+                    <a16:rowId xmlns:a16="http://schemas.microsoft.com/office/drawing/2014/main" val="10001"/>
+                  </a:ext>
+                </a:extLst>
+              </a:tr>
+              <a:tr h="370840">
+                <a:tc>
+                  <a:txBody>
+                    <a:bodyPr/>
+                    <a:lstStyle/>
+                    <a:p>
+                      <a:pPr algn="ctr"/>
+                      <a:r>
+                        <a:rPr lang="en-US" dirty="0"/>
+                        <a:t>δ</a:t>
+                      </a:r>
+                      <a:r>
+                        <a:rPr lang="el-GR" dirty="0"/>
+                        <a:t>ρ</a:t>
+                      </a:r>
+                      <a:endParaRPr lang="en-US" dirty="0"/>
+                    </a:p>
+                  </a:txBody>
+                  <a:tcPr/>
+                </a:tc>
+                <a:tc>
+                  <a:txBody>
+                    <a:bodyPr/>
+                    <a:lstStyle/>
+                    <a:p>
+                      <a:pPr algn="ctr"/>
+                      <a:r>
+                        <a:rPr lang="en-US" dirty="0"/>
+                        <a:t>0.52</a:t>
+                      </a:r>
+                    </a:p>
+                  </a:txBody>
+                  <a:tcPr/>
+                </a:tc>
+                <a:tc>
+                  <a:txBody>
+                    <a:bodyPr/>
+                    <a:lstStyle/>
+                    <a:p>
+                      <a:pPr algn="ctr"/>
+                      <a:r>
+                        <a:rPr lang="en-US" dirty="0"/>
+                        <a:t>s</a:t>
+                      </a:r>
+                      <a:r>
+                        <a:rPr lang="en-US" baseline="-25000" dirty="0"/>
+                        <a:t>0</a:t>
+                      </a:r>
+                      <a:endParaRPr lang="en-US" dirty="0"/>
+                    </a:p>
+                  </a:txBody>
+                  <a:tcPr/>
+                </a:tc>
+                <a:tc>
+                  <a:txBody>
+                    <a:bodyPr/>
+                    <a:lstStyle/>
+                    <a:p>
+                      <a:pPr algn="ctr"/>
+                      <a:r>
+                        <a:rPr lang="en-US" dirty="0"/>
+                        <a:t>0.41</a:t>
+                      </a:r>
+                    </a:p>
+                  </a:txBody>
+                  <a:tcPr/>
+                </a:tc>
+                <a:extLst>
+                  <a:ext uri="{0D108BD9-81ED-4DB2-BD59-A6C34878D82A}">
+                    <a16:rowId xmlns:a16="http://schemas.microsoft.com/office/drawing/2014/main" val="10002"/>
+                  </a:ext>
+                </a:extLst>
+              </a:tr>
+              <a:tr h="370840">
+                <a:tc>
+                  <a:txBody>
+                    <a:bodyPr/>
+                    <a:lstStyle/>
+                    <a:p>
+                      <a:pPr algn="ctr"/>
+                      <a:r>
+                        <a:rPr lang="en-US" dirty="0"/>
+                        <a:t>δ</a:t>
+                      </a:r>
+                      <a:r>
+                        <a:rPr lang="el-GR" dirty="0"/>
+                        <a:t>β</a:t>
+                      </a:r>
+                      <a:endParaRPr lang="en-US" dirty="0"/>
+                    </a:p>
+                  </a:txBody>
+                  <a:tcPr/>
+                </a:tc>
+                <a:tc>
+                  <a:txBody>
+                    <a:bodyPr/>
+                    <a:lstStyle/>
+                    <a:p>
+                      <a:pPr algn="ctr"/>
+                      <a:r>
+                        <a:rPr lang="en-US" dirty="0"/>
+                        <a:t>0.36</a:t>
+                      </a:r>
+                    </a:p>
+                  </a:txBody>
+                  <a:tcPr/>
+                </a:tc>
+                <a:tc>
+                  <a:txBody>
+                    <a:bodyPr/>
+                    <a:lstStyle/>
+                    <a:p>
+                      <a:pPr algn="ctr"/>
+                      <a:r>
+                        <a:rPr lang="en-US" dirty="0"/>
+                        <a:t>h</a:t>
+                      </a:r>
+                      <a:r>
+                        <a:rPr lang="en-US" baseline="-25000" dirty="0"/>
+                        <a:t>0</a:t>
+                      </a:r>
+                      <a:endParaRPr lang="en-US" dirty="0"/>
+                    </a:p>
+                  </a:txBody>
+                  <a:tcPr/>
+                </a:tc>
+                <a:tc>
+                  <a:txBody>
+                    <a:bodyPr/>
+                    <a:lstStyle/>
+                    <a:p>
+                      <a:pPr algn="ctr"/>
+                      <a:r>
+                        <a:rPr lang="en-US" dirty="0"/>
+                        <a:t>0.22</a:t>
+                      </a:r>
+                    </a:p>
+                  </a:txBody>
+                  <a:tcPr/>
+                </a:tc>
+                <a:extLst>
+                  <a:ext uri="{0D108BD9-81ED-4DB2-BD59-A6C34878D82A}">
+                    <a16:rowId xmlns:a16="http://schemas.microsoft.com/office/drawing/2014/main" val="10003"/>
+                  </a:ext>
+                </a:extLst>
+              </a:tr>
+              <a:tr h="0">
+                <a:tc>
+                  <a:txBody>
+                    <a:bodyPr/>
+                    <a:lstStyle/>
+                    <a:p>
+                      <a:pPr algn="ctr"/>
+                      <a:r>
+                        <a:rPr lang="en-US" dirty="0"/>
+                        <a:t>h</a:t>
+                      </a:r>
+                      <a:r>
+                        <a:rPr lang="en-US" baseline="-25000" dirty="0"/>
+                        <a:t>0</a:t>
+                      </a:r>
+                    </a:p>
+                  </a:txBody>
+                  <a:tcPr/>
+                </a:tc>
+                <a:tc>
+                  <a:txBody>
+                    <a:bodyPr/>
+                    <a:lstStyle/>
+                    <a:p>
+                      <a:pPr algn="ctr"/>
+                      <a:r>
+                        <a:rPr lang="en-US" dirty="0"/>
+                        <a:t>0.15</a:t>
+                      </a:r>
+                    </a:p>
+                  </a:txBody>
+                  <a:tcPr/>
+                </a:tc>
+                <a:tc>
+                  <a:txBody>
+                    <a:bodyPr/>
+                    <a:lstStyle/>
+                    <a:p>
+                      <a:pPr algn="ctr"/>
+                      <a:r>
+                        <a:rPr lang="el-GR" dirty="0"/>
+                        <a:t>γ</a:t>
+                      </a:r>
+                      <a:r>
+                        <a:rPr lang="en-US" baseline="-25000" dirty="0"/>
+                        <a:t>0</a:t>
+                      </a:r>
+                      <a:endParaRPr lang="en-US" dirty="0"/>
+                    </a:p>
+                  </a:txBody>
+                  <a:tcPr/>
+                </a:tc>
+                <a:tc>
+                  <a:txBody>
+                    <a:bodyPr/>
+                    <a:lstStyle/>
+                    <a:p>
+                      <a:pPr algn="ctr"/>
+                      <a:r>
+                        <a:rPr lang="en-US" dirty="0"/>
+                        <a:t>0.11</a:t>
+                      </a:r>
+                    </a:p>
+                  </a:txBody>
+                  <a:tcPr/>
+                </a:tc>
+                <a:extLst>
+                  <a:ext uri="{0D108BD9-81ED-4DB2-BD59-A6C34878D82A}">
+                    <a16:rowId xmlns:a16="http://schemas.microsoft.com/office/drawing/2014/main" val="10004"/>
+                  </a:ext>
+                </a:extLst>
+              </a:tr>
+              <a:tr h="273050">
+                <a:tc>
+                  <a:txBody>
+                    <a:bodyPr/>
+                    <a:lstStyle/>
+                    <a:p>
+                      <a:pPr algn="ctr"/>
+                      <a:r>
+                        <a:rPr lang="en-US" dirty="0"/>
+                        <a:t>s</a:t>
+                      </a:r>
+                      <a:r>
+                        <a:rPr lang="en-US" baseline="-25000" dirty="0"/>
+                        <a:t>0</a:t>
+                      </a:r>
+                      <a:endParaRPr lang="en-US" dirty="0"/>
+                    </a:p>
+                  </a:txBody>
+                  <a:tcPr/>
+                </a:tc>
+                <a:tc>
+                  <a:txBody>
+                    <a:bodyPr/>
+                    <a:lstStyle/>
+                    <a:p>
+                      <a:pPr algn="ctr"/>
+                      <a:r>
+                        <a:rPr lang="en-US" dirty="0"/>
+                        <a:t>0.14</a:t>
+                      </a:r>
+                    </a:p>
+                  </a:txBody>
+                  <a:tcPr/>
+                </a:tc>
+                <a:tc>
+                  <a:txBody>
+                    <a:bodyPr/>
+                    <a:lstStyle/>
+                    <a:p>
+                      <a:pPr algn="ctr"/>
+                      <a:r>
+                        <a:rPr lang="el-GR" dirty="0"/>
+                        <a:t>δ</a:t>
+                      </a:r>
+                      <a:r>
+                        <a:rPr lang="en-US" dirty="0"/>
+                        <a:t>(L/D)</a:t>
+                      </a:r>
+                    </a:p>
+                  </a:txBody>
+                  <a:tcPr/>
+                </a:tc>
+                <a:tc>
+                  <a:txBody>
+                    <a:bodyPr/>
+                    <a:lstStyle/>
+                    <a:p>
+                      <a:pPr algn="ctr"/>
+                      <a:r>
+                        <a:rPr lang="en-US" dirty="0"/>
+                        <a:t>0.10</a:t>
+                      </a:r>
+                    </a:p>
+                  </a:txBody>
+                  <a:tcPr/>
+                </a:tc>
+                <a:extLst>
+                  <a:ext uri="{0D108BD9-81ED-4DB2-BD59-A6C34878D82A}">
+                    <a16:rowId xmlns:a16="http://schemas.microsoft.com/office/drawing/2014/main" val="1215908531"/>
+                  </a:ext>
+                </a:extLst>
+              </a:tr>
+              <a:tr h="180340">
+                <a:tc>
+                  <a:txBody>
+                    <a:bodyPr/>
+                    <a:lstStyle/>
+                    <a:p>
+                      <a:pPr algn="ctr"/>
+                      <a:r>
+                        <a:rPr lang="el-GR" dirty="0"/>
+                        <a:t>δ</a:t>
+                      </a:r>
+                      <a:r>
+                        <a:rPr lang="en-US" dirty="0"/>
+                        <a:t>(L/D)</a:t>
+                      </a:r>
+                    </a:p>
+                  </a:txBody>
+                  <a:tcPr/>
+                </a:tc>
+                <a:tc>
+                  <a:txBody>
+                    <a:bodyPr/>
+                    <a:lstStyle/>
+                    <a:p>
+                      <a:pPr algn="ctr"/>
+                      <a:r>
+                        <a:rPr lang="en-US" dirty="0"/>
+                        <a:t>0.11</a:t>
+                      </a:r>
+                    </a:p>
+                  </a:txBody>
+                  <a:tcPr/>
+                </a:tc>
+                <a:tc>
+                  <a:txBody>
+                    <a:bodyPr/>
+                    <a:lstStyle/>
+                    <a:p>
+                      <a:pPr algn="ctr"/>
+                      <a:r>
+                        <a:rPr lang="en-US" dirty="0"/>
+                        <a:t>δ</a:t>
+                      </a:r>
+                      <a:r>
+                        <a:rPr lang="el-GR" dirty="0"/>
+                        <a:t>ρ</a:t>
+                      </a:r>
+                      <a:endParaRPr lang="en-US" dirty="0"/>
+                    </a:p>
+                  </a:txBody>
+                  <a:tcPr/>
+                </a:tc>
+                <a:tc>
+                  <a:txBody>
+                    <a:bodyPr/>
+                    <a:lstStyle/>
+                    <a:p>
+                      <a:pPr algn="ctr"/>
+                      <a:r>
+                        <a:rPr lang="en-US" dirty="0"/>
+                        <a:t>0.05</a:t>
+                      </a:r>
+                    </a:p>
+                  </a:txBody>
+                  <a:tcPr/>
+                </a:tc>
+                <a:extLst>
+                  <a:ext uri="{0D108BD9-81ED-4DB2-BD59-A6C34878D82A}">
+                    <a16:rowId xmlns:a16="http://schemas.microsoft.com/office/drawing/2014/main" val="3777670536"/>
+                  </a:ext>
+                </a:extLst>
+              </a:tr>
+              <a:tr h="0">
+                <a:tc>
+                  <a:txBody>
+                    <a:bodyPr/>
+                    <a:lstStyle/>
+                    <a:p>
+                      <a:pPr algn="ctr"/>
+                      <a:r>
+                        <a:rPr lang="el-GR" dirty="0"/>
+                        <a:t>γ</a:t>
+                      </a:r>
+                      <a:r>
+                        <a:rPr lang="en-US" baseline="-25000" dirty="0"/>
+                        <a:t>0</a:t>
+                      </a:r>
+                      <a:endParaRPr lang="en-US" dirty="0"/>
+                    </a:p>
+                  </a:txBody>
+                  <a:tcPr/>
+                </a:tc>
+                <a:tc>
+                  <a:txBody>
+                    <a:bodyPr/>
+                    <a:lstStyle/>
+                    <a:p>
+                      <a:pPr algn="ctr"/>
+                      <a:r>
+                        <a:rPr lang="en-US" dirty="0"/>
+                        <a:t>0.05</a:t>
+                      </a:r>
+                    </a:p>
+                  </a:txBody>
+                  <a:tcPr/>
+                </a:tc>
+                <a:tc>
+                  <a:txBody>
+                    <a:bodyPr/>
+                    <a:lstStyle/>
+                    <a:p>
+                      <a:pPr algn="ctr"/>
+                      <a:r>
+                        <a:rPr lang="en-US" dirty="0"/>
+                        <a:t>δ</a:t>
+                      </a:r>
+                      <a:r>
+                        <a:rPr lang="el-GR" dirty="0"/>
+                        <a:t>β</a:t>
+                      </a:r>
+                      <a:endParaRPr lang="en-US" dirty="0"/>
+                    </a:p>
+                  </a:txBody>
+                  <a:tcPr/>
+                </a:tc>
+                <a:tc>
+                  <a:txBody>
+                    <a:bodyPr/>
+                    <a:lstStyle/>
+                    <a:p>
+                      <a:pPr algn="ctr"/>
+                      <a:r>
+                        <a:rPr lang="en-US"/>
+                        <a:t>0.04</a:t>
+                      </a:r>
+                      <a:endParaRPr lang="en-US" dirty="0"/>
+                    </a:p>
+                  </a:txBody>
+                  <a:tcPr/>
+                </a:tc>
+                <a:extLst>
+                  <a:ext uri="{0D108BD9-81ED-4DB2-BD59-A6C34878D82A}">
+                    <a16:rowId xmlns:a16="http://schemas.microsoft.com/office/drawing/2014/main" val="987047204"/>
+                  </a:ext>
+                </a:extLst>
+              </a:tr>
+            </a:tbl>
+          </a:graphicData>
+        </a:graphic>
+      </p:graphicFrame>
+    </p:spTree>
+    <p:extLst>
+      <p:ext uri="{BB962C8B-B14F-4D97-AF65-F5344CB8AC3E}">
+        <p14:creationId xmlns:p14="http://schemas.microsoft.com/office/powerpoint/2010/main" val="731848038"/>
       </p:ext>
     </p:extLst>
   </p:cSld>
@@ -10977,7 +11913,7 @@
   <a:extraClrSchemeLst/>
   <a:extLst>
     <a:ext uri="{05A4C25C-085E-4340-85A3-A5531E510DB2}">
-      <thm15:themeFamily xmlns:thm15="http://schemas.microsoft.com/office/thememl/2012/main" xmlns="" name="Office Theme" id="{62F939B6-93AF-4DB8-9C6B-D6C7DFDC589F}" vid="{4A3C46E8-61CC-4603-A589-7422A47A8E4A}"/>
+      <thm15:themeFamily xmlns:thm15="http://schemas.microsoft.com/office/thememl/2012/main" name="Office Theme" id="{62F939B6-93AF-4DB8-9C6B-D6C7DFDC589F}" vid="{4A3C46E8-61CC-4603-A589-7422A47A8E4A}"/>
     </a:ext>
   </a:extLst>
 </a:theme>
@@ -11272,7 +12208,7 @@
   <a:extraClrSchemeLst/>
   <a:extLst>
     <a:ext uri="{05A4C25C-085E-4340-85A3-A5531E510DB2}">
-      <thm15:themeFamily xmlns:thm15="http://schemas.microsoft.com/office/thememl/2012/main" xmlns="" name="Office Theme" id="{62F939B6-93AF-4DB8-9C6B-D6C7DFDC589F}" vid="{4A3C46E8-61CC-4603-A589-7422A47A8E4A}"/>
+      <thm15:themeFamily xmlns:thm15="http://schemas.microsoft.com/office/thememl/2012/main" name="Office Theme" id="{62F939B6-93AF-4DB8-9C6B-D6C7DFDC589F}" vid="{4A3C46E8-61CC-4603-A589-7422A47A8E4A}"/>
     </a:ext>
   </a:extLst>
 </a:theme>

</xml_diff>